<commit_message>
Changes to editted presentation.
</commit_message>
<xml_diff>
--- a/adeline/Adeline_TOST_edit.pptx
+++ b/adeline/Adeline_TOST_edit.pptx
@@ -13,7 +13,8 @@
     <p:sldId id="268" r:id="rId7"/>
     <p:sldId id="265" r:id="rId8"/>
     <p:sldId id="257" r:id="rId9"/>
-    <p:sldId id="267" r:id="rId10"/>
+    <p:sldId id="270" r:id="rId10"/>
+    <p:sldId id="267" r:id="rId11"/>
   </p:sldIdLst>
   <p:sldSz cx="9144000" cy="6858000" type="screen4x3"/>
   <p:notesSz cx="6858000" cy="9144000"/>
@@ -310,7 +311,7 @@
           <a:p>
             <a:fld id="{241EB5C9-1307-BA42-ABA2-0BC069CD8E7F}" type="datetimeFigureOut">
               <a:rPr lang="en-US" smtClean="0"/>
-              <a:t>6/15/20</a:t>
+              <a:t>6/16/20</a:t>
             </a:fld>
             <a:endParaRPr lang="en-US"/>
           </a:p>
@@ -478,7 +479,7 @@
           <a:p>
             <a:fld id="{241EB5C9-1307-BA42-ABA2-0BC069CD8E7F}" type="datetimeFigureOut">
               <a:rPr lang="en-US" smtClean="0"/>
-              <a:t>6/15/20</a:t>
+              <a:t>6/16/20</a:t>
             </a:fld>
             <a:endParaRPr lang="en-US"/>
           </a:p>
@@ -656,7 +657,7 @@
           <a:p>
             <a:fld id="{241EB5C9-1307-BA42-ABA2-0BC069CD8E7F}" type="datetimeFigureOut">
               <a:rPr lang="en-US" smtClean="0"/>
-              <a:t>6/15/20</a:t>
+              <a:t>6/16/20</a:t>
             </a:fld>
             <a:endParaRPr lang="en-US"/>
           </a:p>
@@ -824,7 +825,7 @@
           <a:p>
             <a:fld id="{241EB5C9-1307-BA42-ABA2-0BC069CD8E7F}" type="datetimeFigureOut">
               <a:rPr lang="en-US" smtClean="0"/>
-              <a:t>6/15/20</a:t>
+              <a:t>6/16/20</a:t>
             </a:fld>
             <a:endParaRPr lang="en-US"/>
           </a:p>
@@ -1069,7 +1070,7 @@
           <a:p>
             <a:fld id="{241EB5C9-1307-BA42-ABA2-0BC069CD8E7F}" type="datetimeFigureOut">
               <a:rPr lang="en-US" smtClean="0"/>
-              <a:t>6/15/20</a:t>
+              <a:t>6/16/20</a:t>
             </a:fld>
             <a:endParaRPr lang="en-US"/>
           </a:p>
@@ -1354,7 +1355,7 @@
           <a:p>
             <a:fld id="{241EB5C9-1307-BA42-ABA2-0BC069CD8E7F}" type="datetimeFigureOut">
               <a:rPr lang="en-US" smtClean="0"/>
-              <a:t>6/15/20</a:t>
+              <a:t>6/16/20</a:t>
             </a:fld>
             <a:endParaRPr lang="en-US"/>
           </a:p>
@@ -1773,7 +1774,7 @@
           <a:p>
             <a:fld id="{241EB5C9-1307-BA42-ABA2-0BC069CD8E7F}" type="datetimeFigureOut">
               <a:rPr lang="en-US" smtClean="0"/>
-              <a:t>6/15/20</a:t>
+              <a:t>6/16/20</a:t>
             </a:fld>
             <a:endParaRPr lang="en-US"/>
           </a:p>
@@ -1890,7 +1891,7 @@
           <a:p>
             <a:fld id="{241EB5C9-1307-BA42-ABA2-0BC069CD8E7F}" type="datetimeFigureOut">
               <a:rPr lang="en-US" smtClean="0"/>
-              <a:t>6/15/20</a:t>
+              <a:t>6/16/20</a:t>
             </a:fld>
             <a:endParaRPr lang="en-US"/>
           </a:p>
@@ -1985,7 +1986,7 @@
           <a:p>
             <a:fld id="{241EB5C9-1307-BA42-ABA2-0BC069CD8E7F}" type="datetimeFigureOut">
               <a:rPr lang="en-US" smtClean="0"/>
-              <a:t>6/15/20</a:t>
+              <a:t>6/16/20</a:t>
             </a:fld>
             <a:endParaRPr lang="en-US"/>
           </a:p>
@@ -2260,7 +2261,7 @@
           <a:p>
             <a:fld id="{241EB5C9-1307-BA42-ABA2-0BC069CD8E7F}" type="datetimeFigureOut">
               <a:rPr lang="en-US" smtClean="0"/>
-              <a:t>6/15/20</a:t>
+              <a:t>6/16/20</a:t>
             </a:fld>
             <a:endParaRPr lang="en-US"/>
           </a:p>
@@ -2512,7 +2513,7 @@
           <a:p>
             <a:fld id="{241EB5C9-1307-BA42-ABA2-0BC069CD8E7F}" type="datetimeFigureOut">
               <a:rPr lang="en-US" smtClean="0"/>
-              <a:t>6/15/20</a:t>
+              <a:t>6/16/20</a:t>
             </a:fld>
             <a:endParaRPr lang="en-US"/>
           </a:p>
@@ -2723,7 +2724,7 @@
           <a:p>
             <a:fld id="{241EB5C9-1307-BA42-ABA2-0BC069CD8E7F}" type="datetimeFigureOut">
               <a:rPr lang="en-US" smtClean="0"/>
-              <a:t>6/15/20</a:t>
+              <a:t>6/16/20</a:t>
             </a:fld>
             <a:endParaRPr lang="en-US"/>
           </a:p>
@@ -3181,6 +3182,183 @@
             </a:pPr>
             <a:r>
               <a:t>15 June, 2020</a:t>
+            </a:r>
+          </a:p>
+        </p:txBody>
+      </p:sp>
+    </p:spTree>
+  </p:cSld>
+  <p:clrMapOvr>
+    <a:masterClrMapping/>
+  </p:clrMapOvr>
+</p:sld>
+</file>
+
+<file path=ppt/slides/slide10.xml><?xml version="1.0" encoding="utf-8"?>
+<p:sld xmlns:a="http://schemas.openxmlformats.org/drawingml/2006/main" xmlns:r="http://schemas.openxmlformats.org/officeDocument/2006/relationships" xmlns:p="http://schemas.openxmlformats.org/presentationml/2006/main">
+  <p:cSld>
+    <p:spTree>
+      <p:nvGrpSpPr>
+        <p:cNvPr id="1" name=""/>
+        <p:cNvGrpSpPr/>
+        <p:nvPr/>
+      </p:nvGrpSpPr>
+      <p:grpSpPr>
+        <a:xfrm>
+          <a:off x="0" y="0"/>
+          <a:ext cx="0" cy="0"/>
+          <a:chOff x="0" y="0"/>
+          <a:chExt cx="0" cy="0"/>
+        </a:xfrm>
+      </p:grpSpPr>
+      <p:sp>
+        <p:nvSpPr>
+          <p:cNvPr id="2" name="Title 1"/>
+          <p:cNvSpPr>
+            <a:spLocks noGrp="1"/>
+          </p:cNvSpPr>
+          <p:nvPr>
+            <p:ph type="title"/>
+          </p:nvPr>
+        </p:nvSpPr>
+        <p:spPr/>
+        <p:txBody>
+          <a:bodyPr>
+            <a:normAutofit fontScale="90000"/>
+          </a:bodyPr>
+          <a:lstStyle/>
+          <a:p>
+            <a:pPr marL="0" lvl="0" indent="0">
+              <a:buNone/>
+            </a:pPr>
+            <a:r>
+              <a:t>Choice of smallest effect size of interest (SESOI)</a:t>
+            </a:r>
+          </a:p>
+        </p:txBody>
+      </p:sp>
+      <p:sp>
+        <p:nvSpPr>
+          <p:cNvPr id="3" name="Content Placeholder 2"/>
+          <p:cNvSpPr>
+            <a:spLocks noGrp="1"/>
+          </p:cNvSpPr>
+          <p:nvPr>
+            <p:ph idx="1"/>
+          </p:nvPr>
+        </p:nvSpPr>
+        <p:spPr/>
+        <p:txBody>
+          <a:bodyPr>
+            <a:normAutofit fontScale="62500" lnSpcReduction="20000"/>
+          </a:bodyPr>
+          <a:lstStyle/>
+          <a:p>
+            <a:pPr marL="0" lvl="0" indent="0">
+              <a:buNone/>
+            </a:pPr>
+            <a:r>
+              <a:t>Tutorial (Lakëns et al., 2018) discussion.</a:t>
+            </a:r>
+          </a:p>
+          <a:p>
+            <a:pPr marL="0" lvl="0" indent="0">
+              <a:spcBef>
+                <a:spcPts val="3000"/>
+              </a:spcBef>
+              <a:buNone/>
+            </a:pPr>
+            <a:r>
+              <a:rPr b="1"/>
+              <a:t>Just-noticeable difference. Burriss et al., 2015:</a:t>
+            </a:r>
+          </a:p>
+          <a:p>
+            <a:pPr marL="0" lvl="0" indent="0">
+              <a:buNone/>
+            </a:pPr>
+            <a:r>
+              <a:t>Research question: Do ovulating women signal men by becoming more flush in the face?</a:t>
+            </a:r>
+          </a:p>
+          <a:p>
+            <a:pPr lvl="1"/>
+            <a:r>
+              <a:t>NIH funded research?</a:t>
+            </a:r>
+          </a:p>
+          <a:p>
+            <a:pPr lvl="1"/>
+            <a:r>
+              <a:t>Maybelline?</a:t>
+            </a:r>
+          </a:p>
+          <a:p>
+            <a:pPr marL="0" lvl="0" indent="0">
+              <a:buNone/>
+            </a:pPr>
+            <a:r>
+              <a:t>Just-noticeable difference: Change in face redness perceptable by men.</a:t>
+            </a:r>
+          </a:p>
+          <a:p>
+            <a:pPr marL="0" lvl="0" indent="0">
+              <a:buNone/>
+            </a:pPr>
+            <a:r>
+              <a:t>Authors’ conclusions: women do become more flush, but not enough to be discernable by the naked eye. (Maybelline withdraws funding)</a:t>
+            </a:r>
+          </a:p>
+          <a:p>
+            <a:pPr marL="0" lvl="0" indent="0">
+              <a:spcBef>
+                <a:spcPts val="3000"/>
+              </a:spcBef>
+              <a:buNone/>
+            </a:pPr>
+            <a:r>
+              <a:rPr b="1"/>
+              <a:t>Statistical Power, no laughing matter</a:t>
+            </a:r>
+          </a:p>
+          <a:p>
+            <a:pPr lvl="1"/>
+            <a:r>
+              <a:t>What </a:t>
+            </a:r>
+            <a:r>
+              <a:rPr b="1"/>
+              <a:t>effect size</a:t>
+            </a:r>
+            <a:r>
+              <a:t> can we detect at alpha=.05, sample size n, power=.8?</a:t>
+            </a:r>
+          </a:p>
+          <a:p>
+            <a:pPr lvl="1"/>
+            <a:r>
+              <a:rPr b="1"/>
+              <a:t>Effect size</a:t>
+            </a:r>
+            <a:r>
+              <a:t> in units of </a:t>
+            </a:r>
+            <a:r>
+              <a:rPr i="1"/>
+              <a:t>Cohen’s d.</a:t>
+            </a:r>
+          </a:p>
+          <a:p>
+            <a:pPr lvl="1"/>
+            <a:r>
+              <a:t>Run TOST using </a:t>
+            </a:r>
+            <a:r>
+              <a:rPr b="1"/>
+              <a:t>effect size</a:t>
+            </a:r>
+            <a:r>
+              <a:t>, rather than raw value.</a:t>
             </a:r>
           </a:p>
         </p:txBody>
@@ -4118,9 +4296,54 @@
           <a:chExt cx="0" cy="0"/>
         </a:xfrm>
       </p:grpSpPr>
+      <p:sp>
+        <p:nvSpPr>
+          <p:cNvPr id="3" name="Content Placeholder 2">
+            <a:extLst>
+              <a:ext uri="{FF2B5EF4-FFF2-40B4-BE49-F238E27FC236}">
+                <a16:creationId xmlns:a16="http://schemas.microsoft.com/office/drawing/2014/main" id="{1AA4CB17-E6CD-434D-AC55-D197447C789A}"/>
+              </a:ext>
+            </a:extLst>
+          </p:cNvPr>
+          <p:cNvSpPr>
+            <a:spLocks noGrp="1"/>
+          </p:cNvSpPr>
+          <p:nvPr>
+            <p:ph idx="1"/>
+          </p:nvPr>
+        </p:nvSpPr>
+        <p:spPr>
+          <a:xfrm>
+            <a:off x="446315" y="359229"/>
+            <a:ext cx="8229600" cy="751114"/>
+          </a:xfrm>
+        </p:spPr>
+        <p:txBody>
+          <a:bodyPr/>
+          <a:lstStyle/>
+          <a:p>
+            <a:pPr marL="0" lvl="0" indent="0">
+              <a:spcBef>
+                <a:spcPts val="3000"/>
+              </a:spcBef>
+              <a:buNone/>
+            </a:pPr>
+            <a:r>
+              <a:rPr b="1" dirty="0"/>
+              <a:t>T-test (unequal means)</a:t>
+            </a:r>
+          </a:p>
+        </p:txBody>
+      </p:sp>
       <p:pic>
         <p:nvPicPr>
-          <p:cNvPr id="2" name="Picture 1" descr="Adeline_TOST_files/figure-pptx/t-test-1.png"/>
+          <p:cNvPr id="4" name="Picture 3" descr="Adeline_TOST_files/figure-pptx/t-test-1.png">
+            <a:extLst>
+              <a:ext uri="{FF2B5EF4-FFF2-40B4-BE49-F238E27FC236}">
+                <a16:creationId xmlns:a16="http://schemas.microsoft.com/office/drawing/2014/main" id="{D72F6A73-0E72-F841-AD01-553AA2540622}"/>
+              </a:ext>
+            </a:extLst>
+          </p:cNvPr>
           <p:cNvPicPr>
             <a:picLocks noGrp="1" noChangeAspect="1"/>
           </p:cNvPicPr>
@@ -4150,39 +4373,39 @@
       </p:pic>
       <p:sp>
         <p:nvSpPr>
-          <p:cNvPr id="3" name="Content Placeholder 2">
+          <p:cNvPr id="5" name="TextBox 4">
             <a:extLst>
               <a:ext uri="{FF2B5EF4-FFF2-40B4-BE49-F238E27FC236}">
-                <a16:creationId xmlns:a16="http://schemas.microsoft.com/office/drawing/2014/main" id="{1AA4CB17-E6CD-434D-AC55-D197447C789A}"/>
+                <a16:creationId xmlns:a16="http://schemas.microsoft.com/office/drawing/2014/main" id="{4E8EE393-2253-5D40-8AC8-64C7CDC9E4C0}"/>
               </a:ext>
             </a:extLst>
           </p:cNvPr>
-          <p:cNvSpPr>
-            <a:spLocks noGrp="1"/>
-          </p:cNvSpPr>
-          <p:nvPr>
-            <p:ph idx="1"/>
-          </p:nvPr>
+          <p:cNvSpPr txBox="1"/>
+          <p:nvPr/>
         </p:nvSpPr>
         <p:spPr>
-          <a:xfrm>
-            <a:off x="446315" y="359229"/>
-            <a:ext cx="8229600" cy="751114"/>
+          <a:xfrm rot="16200000">
+            <a:off x="5120641" y="3357153"/>
+            <a:ext cx="1423851" cy="276999"/>
           </a:xfrm>
+          <a:prstGeom prst="rect">
+            <a:avLst/>
+          </a:prstGeom>
+          <a:noFill/>
         </p:spPr>
         <p:txBody>
-          <a:bodyPr/>
+          <a:bodyPr wrap="square" rtlCol="0">
+            <a:spAutoFit/>
+          </a:bodyPr>
           <a:lstStyle/>
           <a:p>
-            <a:pPr marL="0" lvl="0" indent="0">
-              <a:spcBef>
-                <a:spcPts val="3000"/>
-              </a:spcBef>
-              <a:buNone/>
-            </a:pPr>
-            <a:r>
-              <a:rPr b="1" dirty="0"/>
-              <a:t>T-test (unequal means)</a:t>
+            <a:r>
+              <a:rPr lang="en-US" sz="1200" dirty="0">
+                <a:solidFill>
+                  <a:srgbClr val="EB5556"/>
+                </a:solidFill>
+              </a:rPr>
+              <a:t>observed difference</a:t>
             </a:r>
           </a:p>
         </p:txBody>
@@ -4212,36 +4435,6 @@
           <a:chExt cx="0" cy="0"/>
         </a:xfrm>
       </p:grpSpPr>
-      <p:pic>
-        <p:nvPicPr>
-          <p:cNvPr id="2" name="Picture 1" descr="Adeline_TOST_files/figure-pptx/visualize-cis-1.png"/>
-          <p:cNvPicPr>
-            <a:picLocks noGrp="1" noChangeAspect="1"/>
-          </p:cNvPicPr>
-          <p:nvPr/>
-        </p:nvPicPr>
-        <p:blipFill>
-          <a:blip r:embed="rId2"/>
-          <a:stretch>
-            <a:fillRect/>
-          </a:stretch>
-        </p:blipFill>
-        <p:spPr bwMode="auto">
-          <a:xfrm>
-            <a:off x="1752600" y="1251856"/>
-            <a:ext cx="5651500" cy="4521200"/>
-          </a:xfrm>
-          <a:prstGeom prst="rect">
-            <a:avLst/>
-          </a:prstGeom>
-          <a:noFill/>
-          <a:ln w="9525">
-            <a:noFill/>
-            <a:headEnd/>
-            <a:tailEnd/>
-          </a:ln>
-        </p:spPr>
-      </p:pic>
       <p:sp>
         <p:nvSpPr>
           <p:cNvPr id="3" name="Content Placeholder 2">
@@ -4461,6 +4654,81 @@
           </a:p>
         </p:txBody>
       </p:sp>
+      <p:pic>
+        <p:nvPicPr>
+          <p:cNvPr id="5" name="Picture 4" descr="Adeline_TOST_files/figure-pptx/visualize-cis-1.png">
+            <a:extLst>
+              <a:ext uri="{FF2B5EF4-FFF2-40B4-BE49-F238E27FC236}">
+                <a16:creationId xmlns:a16="http://schemas.microsoft.com/office/drawing/2014/main" id="{5C637060-AC96-0B46-8369-6F9151BDC3BC}"/>
+              </a:ext>
+            </a:extLst>
+          </p:cNvPr>
+          <p:cNvPicPr>
+            <a:picLocks noGrp="1" noChangeAspect="1"/>
+          </p:cNvPicPr>
+          <p:nvPr/>
+        </p:nvPicPr>
+        <p:blipFill>
+          <a:blip r:embed="rId2"/>
+          <a:stretch>
+            <a:fillRect/>
+          </a:stretch>
+        </p:blipFill>
+        <p:spPr bwMode="auto">
+          <a:xfrm>
+            <a:off x="1752600" y="1600200"/>
+            <a:ext cx="5651500" cy="4521200"/>
+          </a:xfrm>
+          <a:prstGeom prst="rect">
+            <a:avLst/>
+          </a:prstGeom>
+          <a:noFill/>
+          <a:ln w="9525">
+            <a:noFill/>
+            <a:headEnd/>
+            <a:tailEnd/>
+          </a:ln>
+        </p:spPr>
+      </p:pic>
+      <p:sp>
+        <p:nvSpPr>
+          <p:cNvPr id="6" name="TextBox 5">
+            <a:extLst>
+              <a:ext uri="{FF2B5EF4-FFF2-40B4-BE49-F238E27FC236}">
+                <a16:creationId xmlns:a16="http://schemas.microsoft.com/office/drawing/2014/main" id="{422009D4-630E-D348-90A3-FFA628FC1AD4}"/>
+              </a:ext>
+            </a:extLst>
+          </p:cNvPr>
+          <p:cNvSpPr txBox="1"/>
+          <p:nvPr/>
+        </p:nvSpPr>
+        <p:spPr>
+          <a:xfrm rot="16200000">
+            <a:off x="5120641" y="3357153"/>
+            <a:ext cx="1423851" cy="276999"/>
+          </a:xfrm>
+          <a:prstGeom prst="rect">
+            <a:avLst/>
+          </a:prstGeom>
+          <a:noFill/>
+        </p:spPr>
+        <p:txBody>
+          <a:bodyPr wrap="square" rtlCol="0">
+            <a:spAutoFit/>
+          </a:bodyPr>
+          <a:lstStyle/>
+          <a:p>
+            <a:r>
+              <a:rPr lang="en-US" sz="1200" dirty="0">
+                <a:solidFill>
+                  <a:srgbClr val="EB5556"/>
+                </a:solidFill>
+              </a:rPr>
+              <a:t>observed difference</a:t>
+            </a:r>
+          </a:p>
+        </p:txBody>
+      </p:sp>
     </p:spTree>
   </p:cSld>
   <p:clrMapOvr>
@@ -4488,10 +4756,10 @@
       </p:grpSpPr>
       <p:pic>
         <p:nvPicPr>
-          <p:cNvPr id="5" name="Picture 4" descr="Adeline_TOST_files/figure-pptx/Two%20One-Sided%20Test-1.png">
+          <p:cNvPr id="8" name="Picture 7">
             <a:extLst>
               <a:ext uri="{FF2B5EF4-FFF2-40B4-BE49-F238E27FC236}">
-                <a16:creationId xmlns:a16="http://schemas.microsoft.com/office/drawing/2014/main" id="{7907D590-183C-0943-B873-2060FB015A18}"/>
+                <a16:creationId xmlns:a16="http://schemas.microsoft.com/office/drawing/2014/main" id="{3830B7BC-5BED-2A4D-AF1F-4BFACAA51B26}"/>
               </a:ext>
             </a:extLst>
           </p:cNvPr>
@@ -4500,15 +4768,15 @@
           </p:cNvPicPr>
           <p:nvPr/>
         </p:nvPicPr>
-        <p:blipFill rotWithShape="1">
+        <p:blipFill>
           <a:blip r:embed="rId2"/>
-          <a:srcRect l="14894" r="10030"/>
+          <a:srcRect/>
           <a:stretch/>
         </p:blipFill>
         <p:spPr bwMode="auto">
           <a:xfrm>
-            <a:off x="2013856" y="381000"/>
-            <a:ext cx="5377543" cy="4876801"/>
+            <a:off x="1002891" y="311119"/>
+            <a:ext cx="7098890" cy="4277538"/>
           </a:xfrm>
           <a:prstGeom prst="rect">
             <a:avLst/>
@@ -4521,70 +4789,6 @@
           </a:ln>
         </p:spPr>
       </p:pic>
-      <p:pic>
-        <p:nvPicPr>
-          <p:cNvPr id="2" name="Picture 1" descr="Adeline_TOST_files/figure-pptx/visualize-cis-1.png"/>
-          <p:cNvPicPr>
-            <a:picLocks noGrp="1" noChangeAspect="1"/>
-          </p:cNvPicPr>
-          <p:nvPr/>
-        </p:nvPicPr>
-        <p:blipFill rotWithShape="1">
-          <a:blip r:embed="rId3"/>
-          <a:srcRect t="12762" b="10915"/>
-          <a:stretch/>
-        </p:blipFill>
-        <p:spPr bwMode="auto">
-          <a:xfrm>
-            <a:off x="1752600" y="2830287"/>
-            <a:ext cx="5651500" cy="3450771"/>
-          </a:xfrm>
-          <a:prstGeom prst="rect">
-            <a:avLst/>
-          </a:prstGeom>
-          <a:noFill/>
-          <a:ln w="9525">
-            <a:noFill/>
-            <a:headEnd/>
-            <a:tailEnd/>
-          </a:ln>
-        </p:spPr>
-      </p:pic>
-      <p:pic>
-        <p:nvPicPr>
-          <p:cNvPr id="8" name="Picture 7" descr="Adeline_TOST_files/figure-pptx/Two%20One-Sided%20Test-1.png">
-            <a:extLst>
-              <a:ext uri="{FF2B5EF4-FFF2-40B4-BE49-F238E27FC236}">
-                <a16:creationId xmlns:a16="http://schemas.microsoft.com/office/drawing/2014/main" id="{3830B7BC-5BED-2A4D-AF1F-4BFACAA51B26}"/>
-              </a:ext>
-            </a:extLst>
-          </p:cNvPr>
-          <p:cNvPicPr>
-            <a:picLocks noGrp="1" noChangeAspect="1"/>
-          </p:cNvPicPr>
-          <p:nvPr/>
-        </p:nvPicPr>
-        <p:blipFill rotWithShape="1">
-          <a:blip r:embed="rId2"/>
-          <a:srcRect t="38988" b="39360"/>
-          <a:stretch/>
-        </p:blipFill>
-        <p:spPr bwMode="auto">
-          <a:xfrm>
-            <a:off x="947056" y="1796143"/>
-            <a:ext cx="7162800" cy="1055915"/>
-          </a:xfrm>
-          <a:prstGeom prst="rect">
-            <a:avLst/>
-          </a:prstGeom>
-          <a:noFill/>
-          <a:ln w="9525">
-            <a:noFill/>
-            <a:headEnd/>
-            <a:tailEnd/>
-          </a:ln>
-        </p:spPr>
-      </p:pic>
       <p:sp>
         <p:nvSpPr>
           <p:cNvPr id="9" name="TextBox 8">
@@ -4599,8 +4803,8 @@
         </p:nvSpPr>
         <p:spPr>
           <a:xfrm>
-            <a:off x="130630" y="1523999"/>
-            <a:ext cx="1817914" cy="1200329"/>
+            <a:off x="0" y="1485899"/>
+            <a:ext cx="2053770" cy="923330"/>
           </a:xfrm>
           <a:prstGeom prst="rect">
             <a:avLst/>
@@ -4613,18 +4817,14 @@
           </a:bodyPr>
           <a:lstStyle/>
           <a:p>
+            <a:pPr algn="ctr"/>
             <a:r>
               <a:rPr lang="en-US" dirty="0"/>
-              <a:t>TOST output:</a:t>
-            </a:r>
-          </a:p>
-          <a:p>
-            <a:r>
-              <a:rPr lang="en-US" dirty="0"/>
-              <a:t>Same concept in</a:t>
-            </a:r>
-          </a:p>
-          <a:p>
+              <a:t>TOSTER package (R) output:</a:t>
+            </a:r>
+          </a:p>
+          <a:p>
+            <a:pPr algn="ctr"/>
             <a:r>
               <a:rPr lang="en-US" dirty="0"/>
               <a:t>confidence intervals</a:t>
@@ -4632,6 +4832,450 @@
           </a:p>
         </p:txBody>
       </p:sp>
+      <p:grpSp>
+        <p:nvGrpSpPr>
+          <p:cNvPr id="11" name="Group 10">
+            <a:extLst>
+              <a:ext uri="{FF2B5EF4-FFF2-40B4-BE49-F238E27FC236}">
+                <a16:creationId xmlns:a16="http://schemas.microsoft.com/office/drawing/2014/main" id="{5E9A2EDF-645C-FA46-9238-7B525EEA7F91}"/>
+              </a:ext>
+            </a:extLst>
+          </p:cNvPr>
+          <p:cNvGrpSpPr/>
+          <p:nvPr/>
+        </p:nvGrpSpPr>
+        <p:grpSpPr>
+          <a:xfrm>
+            <a:off x="4798145" y="2331473"/>
+            <a:ext cx="3185649" cy="810556"/>
+            <a:chOff x="4798145" y="2331473"/>
+            <a:chExt cx="3185649" cy="810556"/>
+          </a:xfrm>
+        </p:grpSpPr>
+        <p:sp>
+          <p:nvSpPr>
+            <p:cNvPr id="16" name="Left Brace 15">
+              <a:extLst>
+                <a:ext uri="{FF2B5EF4-FFF2-40B4-BE49-F238E27FC236}">
+                  <a16:creationId xmlns:a16="http://schemas.microsoft.com/office/drawing/2014/main" id="{3ED1CA87-ECBA-CD44-A65D-C3DC42493311}"/>
+                </a:ext>
+              </a:extLst>
+            </p:cNvPr>
+            <p:cNvSpPr/>
+            <p:nvPr/>
+          </p:nvSpPr>
+          <p:spPr>
+            <a:xfrm rot="16200000">
+              <a:off x="5629585" y="1500033"/>
+              <a:ext cx="460887" cy="2123768"/>
+            </a:xfrm>
+            <a:prstGeom prst="leftBrace">
+              <a:avLst>
+                <a:gd name="adj1" fmla="val 59534"/>
+                <a:gd name="adj2" fmla="val 48649"/>
+              </a:avLst>
+            </a:prstGeom>
+            <a:ln>
+              <a:solidFill>
+                <a:schemeClr val="accent2">
+                  <a:lumMod val="75000"/>
+                </a:schemeClr>
+              </a:solidFill>
+            </a:ln>
+          </p:spPr>
+          <p:style>
+            <a:lnRef idx="2">
+              <a:schemeClr val="accent1"/>
+            </a:lnRef>
+            <a:fillRef idx="0">
+              <a:schemeClr val="accent1"/>
+            </a:fillRef>
+            <a:effectRef idx="1">
+              <a:schemeClr val="accent1"/>
+            </a:effectRef>
+            <a:fontRef idx="minor">
+              <a:schemeClr val="tx1"/>
+            </a:fontRef>
+          </p:style>
+          <p:txBody>
+            <a:bodyPr rtlCol="0" anchor="ctr"/>
+            <a:lstStyle/>
+            <a:p>
+              <a:pPr algn="ctr"/>
+              <a:endParaRPr lang="en-US"/>
+            </a:p>
+          </p:txBody>
+        </p:sp>
+        <p:sp>
+          <p:nvSpPr>
+            <p:cNvPr id="6" name="TextBox 5">
+              <a:extLst>
+                <a:ext uri="{FF2B5EF4-FFF2-40B4-BE49-F238E27FC236}">
+                  <a16:creationId xmlns:a16="http://schemas.microsoft.com/office/drawing/2014/main" id="{DDF1A02A-8DBA-1447-BBF5-E80F242B7700}"/>
+                </a:ext>
+              </a:extLst>
+            </p:cNvPr>
+            <p:cNvSpPr txBox="1"/>
+            <p:nvPr/>
+          </p:nvSpPr>
+          <p:spPr>
+            <a:xfrm>
+              <a:off x="5034116" y="2772697"/>
+              <a:ext cx="2949678" cy="369332"/>
+            </a:xfrm>
+            <a:prstGeom prst="rect">
+              <a:avLst/>
+            </a:prstGeom>
+            <a:noFill/>
+          </p:spPr>
+          <p:txBody>
+            <a:bodyPr wrap="square" rtlCol="0">
+              <a:spAutoFit/>
+            </a:bodyPr>
+            <a:lstStyle/>
+            <a:p>
+              <a:r>
+                <a:rPr lang="en-US" dirty="0">
+                  <a:solidFill>
+                    <a:schemeClr val="accent2">
+                      <a:lumMod val="75000"/>
+                    </a:schemeClr>
+                  </a:solidFill>
+                </a:rPr>
+                <a:t>95% </a:t>
+              </a:r>
+              <a:r>
+                <a:rPr lang="en-US" dirty="0" err="1">
+                  <a:solidFill>
+                    <a:schemeClr val="accent2">
+                      <a:lumMod val="75000"/>
+                    </a:schemeClr>
+                  </a:solidFill>
+                </a:rPr>
+                <a:t>c.i.</a:t>
+              </a:r>
+              <a:r>
+                <a:rPr lang="en-US" dirty="0">
+                  <a:solidFill>
+                    <a:schemeClr val="accent2">
+                      <a:lumMod val="75000"/>
+                    </a:schemeClr>
+                  </a:solidFill>
+                </a:rPr>
+                <a:t> includes 0; test fails.</a:t>
+              </a:r>
+            </a:p>
+          </p:txBody>
+        </p:sp>
+      </p:grpSp>
+      <p:grpSp>
+        <p:nvGrpSpPr>
+          <p:cNvPr id="7" name="Group 6">
+            <a:extLst>
+              <a:ext uri="{FF2B5EF4-FFF2-40B4-BE49-F238E27FC236}">
+                <a16:creationId xmlns:a16="http://schemas.microsoft.com/office/drawing/2014/main" id="{89B85FA1-48D4-054F-A46B-85338DDBC578}"/>
+              </a:ext>
+            </a:extLst>
+          </p:cNvPr>
+          <p:cNvGrpSpPr/>
+          <p:nvPr/>
+        </p:nvGrpSpPr>
+        <p:grpSpPr>
+          <a:xfrm>
+            <a:off x="4296696" y="1526456"/>
+            <a:ext cx="3726426" cy="610833"/>
+            <a:chOff x="4296696" y="1526456"/>
+            <a:chExt cx="3726426" cy="610833"/>
+          </a:xfrm>
+        </p:grpSpPr>
+        <p:sp>
+          <p:nvSpPr>
+            <p:cNvPr id="17" name="Left Brace 16">
+              <a:extLst>
+                <a:ext uri="{FF2B5EF4-FFF2-40B4-BE49-F238E27FC236}">
+                  <a16:creationId xmlns:a16="http://schemas.microsoft.com/office/drawing/2014/main" id="{F86C09AE-E757-9B4E-AB81-515DB6BFA700}"/>
+                </a:ext>
+              </a:extLst>
+            </p:cNvPr>
+            <p:cNvSpPr/>
+            <p:nvPr/>
+          </p:nvSpPr>
+          <p:spPr>
+            <a:xfrm rot="5400000">
+              <a:off x="5740192" y="1132554"/>
+              <a:ext cx="229831" cy="1779639"/>
+            </a:xfrm>
+            <a:prstGeom prst="leftBrace">
+              <a:avLst>
+                <a:gd name="adj1" fmla="val 53134"/>
+                <a:gd name="adj2" fmla="val 48649"/>
+              </a:avLst>
+            </a:prstGeom>
+            <a:ln>
+              <a:solidFill>
+                <a:schemeClr val="accent4">
+                  <a:lumMod val="75000"/>
+                </a:schemeClr>
+              </a:solidFill>
+            </a:ln>
+          </p:spPr>
+          <p:style>
+            <a:lnRef idx="2">
+              <a:schemeClr val="accent1"/>
+            </a:lnRef>
+            <a:fillRef idx="0">
+              <a:schemeClr val="accent1"/>
+            </a:fillRef>
+            <a:effectRef idx="1">
+              <a:schemeClr val="accent1"/>
+            </a:effectRef>
+            <a:fontRef idx="minor">
+              <a:schemeClr val="tx1"/>
+            </a:fontRef>
+          </p:style>
+          <p:txBody>
+            <a:bodyPr rtlCol="0" anchor="ctr"/>
+            <a:lstStyle/>
+            <a:p>
+              <a:pPr algn="ctr"/>
+              <a:endParaRPr lang="en-US"/>
+            </a:p>
+          </p:txBody>
+        </p:sp>
+        <p:sp>
+          <p:nvSpPr>
+            <p:cNvPr id="18" name="TextBox 17">
+              <a:extLst>
+                <a:ext uri="{FF2B5EF4-FFF2-40B4-BE49-F238E27FC236}">
+                  <a16:creationId xmlns:a16="http://schemas.microsoft.com/office/drawing/2014/main" id="{27B3639D-9381-5B45-BFAC-851A001E91B2}"/>
+                </a:ext>
+              </a:extLst>
+            </p:cNvPr>
+            <p:cNvSpPr txBox="1"/>
+            <p:nvPr/>
+          </p:nvSpPr>
+          <p:spPr>
+            <a:xfrm>
+              <a:off x="4296696" y="1526456"/>
+              <a:ext cx="3726426" cy="369332"/>
+            </a:xfrm>
+            <a:prstGeom prst="rect">
+              <a:avLst/>
+            </a:prstGeom>
+            <a:noFill/>
+          </p:spPr>
+          <p:txBody>
+            <a:bodyPr wrap="square" rtlCol="0">
+              <a:spAutoFit/>
+            </a:bodyPr>
+            <a:lstStyle/>
+            <a:p>
+              <a:r>
+                <a:rPr lang="en-US" dirty="0">
+                  <a:solidFill>
+                    <a:schemeClr val="accent4">
+                      <a:lumMod val="75000"/>
+                    </a:schemeClr>
+                  </a:solidFill>
+                </a:rPr>
+                <a:t>90% </a:t>
+              </a:r>
+              <a:r>
+                <a:rPr lang="en-US" dirty="0" err="1">
+                  <a:solidFill>
+                    <a:schemeClr val="accent4">
+                      <a:lumMod val="75000"/>
+                    </a:schemeClr>
+                  </a:solidFill>
+                </a:rPr>
+                <a:t>c.i.</a:t>
+              </a:r>
+              <a:r>
+                <a:rPr lang="en-US" dirty="0">
+                  <a:solidFill>
+                    <a:schemeClr val="accent4">
+                      <a:lumMod val="75000"/>
+                    </a:schemeClr>
+                  </a:solidFill>
+                </a:rPr>
+                <a:t> within [-1,1]; TOST passes.</a:t>
+              </a:r>
+            </a:p>
+          </p:txBody>
+        </p:sp>
+      </p:grpSp>
+      <p:grpSp>
+        <p:nvGrpSpPr>
+          <p:cNvPr id="25" name="Group 24">
+            <a:extLst>
+              <a:ext uri="{FF2B5EF4-FFF2-40B4-BE49-F238E27FC236}">
+                <a16:creationId xmlns:a16="http://schemas.microsoft.com/office/drawing/2014/main" id="{402A6AF4-C7C2-4246-AF7E-3D3A6E9432BD}"/>
+              </a:ext>
+            </a:extLst>
+          </p:cNvPr>
+          <p:cNvGrpSpPr/>
+          <p:nvPr/>
+        </p:nvGrpSpPr>
+        <p:grpSpPr>
+          <a:xfrm>
+            <a:off x="139700" y="3848510"/>
+            <a:ext cx="7078816" cy="1475181"/>
+            <a:chOff x="139700" y="3848510"/>
+            <a:chExt cx="7078816" cy="1475181"/>
+          </a:xfrm>
+        </p:grpSpPr>
+        <p:pic>
+          <p:nvPicPr>
+            <p:cNvPr id="20" name="Picture 19">
+              <a:extLst>
+                <a:ext uri="{FF2B5EF4-FFF2-40B4-BE49-F238E27FC236}">
+                  <a16:creationId xmlns:a16="http://schemas.microsoft.com/office/drawing/2014/main" id="{140D2BC4-C25D-0C4D-95B5-7164156C8DF2}"/>
+                </a:ext>
+              </a:extLst>
+            </p:cNvPr>
+            <p:cNvPicPr>
+              <a:picLocks noChangeAspect="1"/>
+            </p:cNvPicPr>
+            <p:nvPr/>
+          </p:nvPicPr>
+          <p:blipFill rotWithShape="1">
+            <a:blip r:embed="rId3"/>
+            <a:srcRect l="3945" t="22464" b="9509"/>
+            <a:stretch/>
+          </p:blipFill>
+          <p:spPr>
+            <a:xfrm>
+              <a:off x="2234791" y="3848510"/>
+              <a:ext cx="4983725" cy="1475181"/>
+            </a:xfrm>
+            <a:prstGeom prst="rect">
+              <a:avLst/>
+            </a:prstGeom>
+          </p:spPr>
+        </p:pic>
+        <p:sp>
+          <p:nvSpPr>
+            <p:cNvPr id="23" name="TextBox 22">
+              <a:extLst>
+                <a:ext uri="{FF2B5EF4-FFF2-40B4-BE49-F238E27FC236}">
+                  <a16:creationId xmlns:a16="http://schemas.microsoft.com/office/drawing/2014/main" id="{C3E95ADD-51A0-E643-89CE-ECA9EAF69B47}"/>
+                </a:ext>
+              </a:extLst>
+            </p:cNvPr>
+            <p:cNvSpPr txBox="1"/>
+            <p:nvPr/>
+          </p:nvSpPr>
+          <p:spPr>
+            <a:xfrm>
+              <a:off x="139700" y="4013200"/>
+              <a:ext cx="1926770" cy="646331"/>
+            </a:xfrm>
+            <a:prstGeom prst="rect">
+              <a:avLst/>
+            </a:prstGeom>
+            <a:noFill/>
+          </p:spPr>
+          <p:txBody>
+            <a:bodyPr wrap="square" rtlCol="0">
+              <a:spAutoFit/>
+            </a:bodyPr>
+            <a:lstStyle/>
+            <a:p>
+              <a:pPr algn="ctr"/>
+              <a:r>
+                <a:rPr lang="en-US" dirty="0"/>
+                <a:t>Two one-sided t-test distributions </a:t>
+              </a:r>
+            </a:p>
+          </p:txBody>
+        </p:sp>
+      </p:grpSp>
+      <p:grpSp>
+        <p:nvGrpSpPr>
+          <p:cNvPr id="26" name="Group 25">
+            <a:extLst>
+              <a:ext uri="{FF2B5EF4-FFF2-40B4-BE49-F238E27FC236}">
+                <a16:creationId xmlns:a16="http://schemas.microsoft.com/office/drawing/2014/main" id="{71B32CE1-3AC3-1844-A8F8-7097D2340D6B}"/>
+              </a:ext>
+            </a:extLst>
+          </p:cNvPr>
+          <p:cNvGrpSpPr/>
+          <p:nvPr/>
+        </p:nvGrpSpPr>
+        <p:grpSpPr>
+          <a:xfrm>
+            <a:off x="139700" y="5478906"/>
+            <a:ext cx="7078064" cy="1197837"/>
+            <a:chOff x="139700" y="5478906"/>
+            <a:chExt cx="7078064" cy="1197837"/>
+          </a:xfrm>
+        </p:grpSpPr>
+        <p:pic>
+          <p:nvPicPr>
+            <p:cNvPr id="22" name="Picture 21">
+              <a:extLst>
+                <a:ext uri="{FF2B5EF4-FFF2-40B4-BE49-F238E27FC236}">
+                  <a16:creationId xmlns:a16="http://schemas.microsoft.com/office/drawing/2014/main" id="{A771DA70-47E1-9842-814E-96140A7B073F}"/>
+                </a:ext>
+              </a:extLst>
+            </p:cNvPr>
+            <p:cNvPicPr>
+              <a:picLocks noChangeAspect="1"/>
+            </p:cNvPicPr>
+            <p:nvPr/>
+          </p:nvPicPr>
+          <p:blipFill rotWithShape="1">
+            <a:blip r:embed="rId4"/>
+            <a:srcRect l="4359" t="23729" b="18588"/>
+            <a:stretch/>
+          </p:blipFill>
+          <p:spPr>
+            <a:xfrm>
+              <a:off x="2252579" y="5478906"/>
+              <a:ext cx="4965185" cy="1197837"/>
+            </a:xfrm>
+            <a:prstGeom prst="rect">
+              <a:avLst/>
+            </a:prstGeom>
+          </p:spPr>
+        </p:pic>
+        <p:sp>
+          <p:nvSpPr>
+            <p:cNvPr id="24" name="TextBox 23">
+              <a:extLst>
+                <a:ext uri="{FF2B5EF4-FFF2-40B4-BE49-F238E27FC236}">
+                  <a16:creationId xmlns:a16="http://schemas.microsoft.com/office/drawing/2014/main" id="{8107FE8D-3205-8749-A3E4-DA966E38558A}"/>
+                </a:ext>
+              </a:extLst>
+            </p:cNvPr>
+            <p:cNvSpPr txBox="1"/>
+            <p:nvPr/>
+          </p:nvSpPr>
+          <p:spPr>
+            <a:xfrm>
+              <a:off x="139700" y="5549900"/>
+              <a:ext cx="1926770" cy="923330"/>
+            </a:xfrm>
+            <a:prstGeom prst="rect">
+              <a:avLst/>
+            </a:prstGeom>
+            <a:noFill/>
+          </p:spPr>
+          <p:txBody>
+            <a:bodyPr wrap="square" rtlCol="0">
+              <a:spAutoFit/>
+            </a:bodyPr>
+            <a:lstStyle/>
+            <a:p>
+              <a:pPr algn="ctr"/>
+              <a:r>
+                <a:rPr lang="en-US" dirty="0"/>
+                <a:t>Original two-sided t-test against 0: distribution </a:t>
+              </a:r>
+            </a:p>
+          </p:txBody>
+        </p:sp>
+      </p:grpSp>
       <p:grpSp>
         <p:nvGrpSpPr>
           <p:cNvPr id="14" name="Group 13">
@@ -4646,7 +5290,7 @@
         </p:nvGrpSpPr>
         <p:grpSpPr>
           <a:xfrm>
-            <a:off x="-255731" y="3450772"/>
+            <a:off x="-369224" y="0"/>
             <a:ext cx="14320074" cy="1581253"/>
             <a:chOff x="-1692645" y="3091543"/>
             <a:chExt cx="14320074" cy="1581253"/>
@@ -4667,7 +5311,7 @@
             <p:nvPr/>
           </p:nvPicPr>
           <p:blipFill rotWithShape="1">
-            <a:blip r:embed="rId4"/>
+            <a:blip r:embed="rId5"/>
             <a:srcRect t="30956" r="29643"/>
             <a:stretch/>
           </p:blipFill>
@@ -4717,6 +5361,84 @@
           </p:txBody>
         </p:sp>
       </p:grpSp>
+      <p:sp>
+        <p:nvSpPr>
+          <p:cNvPr id="27" name="TextBox 26">
+            <a:extLst>
+              <a:ext uri="{FF2B5EF4-FFF2-40B4-BE49-F238E27FC236}">
+                <a16:creationId xmlns:a16="http://schemas.microsoft.com/office/drawing/2014/main" id="{6C6FA957-8A6A-DD46-A16C-4B8F6D79F38B}"/>
+              </a:ext>
+            </a:extLst>
+          </p:cNvPr>
+          <p:cNvSpPr txBox="1"/>
+          <p:nvPr/>
+        </p:nvSpPr>
+        <p:spPr>
+          <a:xfrm rot="16200000">
+            <a:off x="5068389" y="3814354"/>
+            <a:ext cx="1423851" cy="276999"/>
+          </a:xfrm>
+          <a:prstGeom prst="rect">
+            <a:avLst/>
+          </a:prstGeom>
+          <a:noFill/>
+        </p:spPr>
+        <p:txBody>
+          <a:bodyPr wrap="square" rtlCol="0">
+            <a:spAutoFit/>
+          </a:bodyPr>
+          <a:lstStyle/>
+          <a:p>
+            <a:r>
+              <a:rPr lang="en-US" sz="1200" dirty="0">
+                <a:solidFill>
+                  <a:srgbClr val="EB5556"/>
+                </a:solidFill>
+              </a:rPr>
+              <a:t>observed</a:t>
+            </a:r>
+          </a:p>
+        </p:txBody>
+      </p:sp>
+      <p:sp>
+        <p:nvSpPr>
+          <p:cNvPr id="28" name="TextBox 27">
+            <a:extLst>
+              <a:ext uri="{FF2B5EF4-FFF2-40B4-BE49-F238E27FC236}">
+                <a16:creationId xmlns:a16="http://schemas.microsoft.com/office/drawing/2014/main" id="{6DBBF891-ECB7-5844-BE99-51B2DFC16995}"/>
+              </a:ext>
+            </a:extLst>
+          </p:cNvPr>
+          <p:cNvSpPr txBox="1"/>
+          <p:nvPr/>
+        </p:nvSpPr>
+        <p:spPr>
+          <a:xfrm rot="16200000">
+            <a:off x="5077097" y="5429794"/>
+            <a:ext cx="1423851" cy="276999"/>
+          </a:xfrm>
+          <a:prstGeom prst="rect">
+            <a:avLst/>
+          </a:prstGeom>
+          <a:noFill/>
+        </p:spPr>
+        <p:txBody>
+          <a:bodyPr wrap="square" rtlCol="0">
+            <a:spAutoFit/>
+          </a:bodyPr>
+          <a:lstStyle/>
+          <a:p>
+            <a:r>
+              <a:rPr lang="en-US" sz="1200" dirty="0">
+                <a:solidFill>
+                  <a:srgbClr val="EB5556"/>
+                </a:solidFill>
+              </a:rPr>
+              <a:t>observed</a:t>
+            </a:r>
+          </a:p>
+        </p:txBody>
+      </p:sp>
     </p:spTree>
     <p:extLst>
       <p:ext uri="{BB962C8B-B14F-4D97-AF65-F5344CB8AC3E}">
@@ -4756,6 +5478,96 @@
                                     <p:set>
                                       <p:cBhvr>
                                         <p:cTn id="6" dur="1" fill="hold">
+                                          <p:stCondLst>
+                                            <p:cond delay="0"/>
+                                          </p:stCondLst>
+                                        </p:cTn>
+                                        <p:tgtEl>
+                                          <p:spTgt spid="7"/>
+                                        </p:tgtEl>
+                                        <p:attrNameLst>
+                                          <p:attrName>style.visibility</p:attrName>
+                                        </p:attrNameLst>
+                                      </p:cBhvr>
+                                      <p:to>
+                                        <p:strVal val="visible"/>
+                                      </p:to>
+                                    </p:set>
+                                  </p:childTnLst>
+                                </p:cTn>
+                              </p:par>
+                            </p:childTnLst>
+                          </p:cTn>
+                        </p:par>
+                      </p:childTnLst>
+                    </p:cTn>
+                  </p:par>
+                  <p:par>
+                    <p:cTn id="7" fill="hold">
+                      <p:stCondLst>
+                        <p:cond delay="indefinite"/>
+                      </p:stCondLst>
+                      <p:childTnLst>
+                        <p:par>
+                          <p:cTn id="8" fill="hold">
+                            <p:stCondLst>
+                              <p:cond delay="0"/>
+                            </p:stCondLst>
+                            <p:childTnLst>
+                              <p:par>
+                                <p:cTn id="9" presetID="1" presetClass="entr" presetSubtype="0" fill="hold" nodeType="clickEffect">
+                                  <p:stCondLst>
+                                    <p:cond delay="0"/>
+                                  </p:stCondLst>
+                                  <p:childTnLst>
+                                    <p:set>
+                                      <p:cBhvr>
+                                        <p:cTn id="10" dur="1" fill="hold">
+                                          <p:stCondLst>
+                                            <p:cond delay="0"/>
+                                          </p:stCondLst>
+                                        </p:cTn>
+                                        <p:tgtEl>
+                                          <p:spTgt spid="11"/>
+                                        </p:tgtEl>
+                                        <p:attrNameLst>
+                                          <p:attrName>style.visibility</p:attrName>
+                                        </p:attrNameLst>
+                                      </p:cBhvr>
+                                      <p:to>
+                                        <p:strVal val="visible"/>
+                                      </p:to>
+                                    </p:set>
+                                  </p:childTnLst>
+                                </p:cTn>
+                              </p:par>
+                            </p:childTnLst>
+                          </p:cTn>
+                        </p:par>
+                      </p:childTnLst>
+                    </p:cTn>
+                  </p:par>
+                  <p:par>
+                    <p:cTn id="11" fill="hold">
+                      <p:stCondLst>
+                        <p:cond delay="indefinite"/>
+                      </p:stCondLst>
+                      <p:childTnLst>
+                        <p:par>
+                          <p:cTn id="12" fill="hold">
+                            <p:stCondLst>
+                              <p:cond delay="0"/>
+                            </p:stCondLst>
+                            <p:childTnLst>
+                              <p:par>
+                                <p:cTn id="13" presetID="1" presetClass="entr" presetSubtype="0" fill="hold" nodeType="clickEffect">
+                                  <p:stCondLst>
+                                    <p:cond delay="0"/>
+                                  </p:stCondLst>
+                                  <p:childTnLst>
+                                    <p:set>
+                                      <p:cBhvr>
+                                        <p:cTn id="14" dur="1" fill="hold">
                                           <p:stCondLst>
                                             <p:cond delay="0"/>
                                           </p:stCondLst>
@@ -5447,7 +6259,13 @@
       </p:grpSpPr>
       <p:sp>
         <p:nvSpPr>
-          <p:cNvPr id="2" name="Title 1"/>
+          <p:cNvPr id="2" name="Title 1">
+            <a:extLst>
+              <a:ext uri="{FF2B5EF4-FFF2-40B4-BE49-F238E27FC236}">
+                <a16:creationId xmlns:a16="http://schemas.microsoft.com/office/drawing/2014/main" id="{95F686EA-4AC7-404E-B406-B716583EAAD8}"/>
+              </a:ext>
+            </a:extLst>
+          </p:cNvPr>
           <p:cNvSpPr>
             <a:spLocks noGrp="1"/>
           </p:cNvSpPr>
@@ -5457,147 +6275,265 @@
         </p:nvSpPr>
         <p:spPr/>
         <p:txBody>
-          <a:bodyPr>
-            <a:normAutofit fontScale="90000"/>
-          </a:bodyPr>
+          <a:bodyPr/>
           <a:lstStyle/>
           <a:p>
-            <a:pPr marL="0" lvl="0" indent="0">
-              <a:buNone/>
-            </a:pPr>
-            <a:r>
-              <a:t>Choice of smallest effect size of interest (SESOI)</a:t>
-            </a:r>
-          </a:p>
-        </p:txBody>
-      </p:sp>
-      <p:sp>
-        <p:nvSpPr>
-          <p:cNvPr id="3" name="Content Placeholder 2"/>
-          <p:cNvSpPr>
-            <a:spLocks noGrp="1"/>
-          </p:cNvSpPr>
+            <a:r>
+              <a:rPr lang="en-US" dirty="0"/>
+              <a:t>Possible outcomes</a:t>
+            </a:r>
+          </a:p>
+        </p:txBody>
+      </p:sp>
+      <p:graphicFrame>
+        <p:nvGraphicFramePr>
+          <p:cNvPr id="4" name="Content Placeholder 3">
+            <a:extLst>
+              <a:ext uri="{FF2B5EF4-FFF2-40B4-BE49-F238E27FC236}">
+                <a16:creationId xmlns:a16="http://schemas.microsoft.com/office/drawing/2014/main" id="{C5CA10F5-F822-A049-B9F4-6E1274FE4994}"/>
+              </a:ext>
+            </a:extLst>
+          </p:cNvPr>
+          <p:cNvGraphicFramePr>
+            <a:graphicFrameLocks noGrp="1"/>
+          </p:cNvGraphicFramePr>
           <p:nvPr>
             <p:ph idx="1"/>
-          </p:nvPr>
-        </p:nvSpPr>
-        <p:spPr/>
-        <p:txBody>
-          <a:bodyPr>
-            <a:normAutofit fontScale="62500" lnSpcReduction="20000"/>
-          </a:bodyPr>
-          <a:lstStyle/>
-          <a:p>
-            <a:pPr marL="0" lvl="0" indent="0">
-              <a:buNone/>
-            </a:pPr>
-            <a:r>
-              <a:t>Tutorial (Lakëns et al., 2018) discussion.</a:t>
-            </a:r>
-          </a:p>
-          <a:p>
-            <a:pPr marL="0" lvl="0" indent="0">
-              <a:spcBef>
-                <a:spcPts val="3000"/>
-              </a:spcBef>
-              <a:buNone/>
-            </a:pPr>
-            <a:r>
-              <a:rPr b="1"/>
-              <a:t>Just-noticeable difference. Burriss et al., 2015:</a:t>
-            </a:r>
-          </a:p>
-          <a:p>
-            <a:pPr marL="0" lvl="0" indent="0">
-              <a:buNone/>
-            </a:pPr>
-            <a:r>
-              <a:t>Research question: Do ovulating women signal men by becoming more flush in the face?</a:t>
-            </a:r>
-          </a:p>
-          <a:p>
-            <a:pPr lvl="1"/>
-            <a:r>
-              <a:t>NIH funded research?</a:t>
-            </a:r>
-          </a:p>
-          <a:p>
-            <a:pPr lvl="1"/>
-            <a:r>
-              <a:t>Maybelline?</a:t>
-            </a:r>
-          </a:p>
-          <a:p>
-            <a:pPr marL="0" lvl="0" indent="0">
-              <a:buNone/>
-            </a:pPr>
-            <a:r>
-              <a:t>Just-noticeable difference: Change in face redness perceptable by men.</a:t>
-            </a:r>
-          </a:p>
-          <a:p>
-            <a:pPr marL="0" lvl="0" indent="0">
-              <a:buNone/>
-            </a:pPr>
-            <a:r>
-              <a:t>Authors’ conclusions: women do become more flush, but not enough to be discernable by the naked eye. (Maybelline withdraws funding)</a:t>
-            </a:r>
-          </a:p>
-          <a:p>
-            <a:pPr marL="0" lvl="0" indent="0">
-              <a:spcBef>
-                <a:spcPts val="3000"/>
-              </a:spcBef>
-              <a:buNone/>
-            </a:pPr>
-            <a:r>
-              <a:rPr b="1"/>
-              <a:t>Statistical Power, no laughing matter</a:t>
-            </a:r>
-          </a:p>
-          <a:p>
-            <a:pPr lvl="1"/>
-            <a:r>
-              <a:t>What </a:t>
-            </a:r>
-            <a:r>
-              <a:rPr b="1"/>
-              <a:t>effect size</a:t>
-            </a:r>
-            <a:r>
-              <a:t> can we detect at alpha=.05, sample size n, power=.8?</a:t>
-            </a:r>
-          </a:p>
-          <a:p>
-            <a:pPr lvl="1"/>
-            <a:r>
-              <a:rPr b="1"/>
-              <a:t>Effect size</a:t>
-            </a:r>
-            <a:r>
-              <a:t> in units of </a:t>
-            </a:r>
-            <a:r>
-              <a:rPr i="1"/>
-              <a:t>Cohen’s d.</a:t>
-            </a:r>
-          </a:p>
-          <a:p>
-            <a:pPr lvl="1"/>
-            <a:r>
-              <a:t>Run TOST using </a:t>
-            </a:r>
-            <a:r>
-              <a:rPr b="1"/>
-              <a:t>effect size</a:t>
-            </a:r>
-            <a:r>
-              <a:t>, rather than raw value.</a:t>
-            </a:r>
-          </a:p>
-        </p:txBody>
-      </p:sp>
+            <p:extLst>
+              <p:ext uri="{D42A27DB-BD31-4B8C-83A1-F6EECF244321}">
+                <p14:modId xmlns:p14="http://schemas.microsoft.com/office/powerpoint/2010/main" val="4229305324"/>
+              </p:ext>
+            </p:extLst>
+          </p:nvPr>
+        </p:nvGraphicFramePr>
+        <p:xfrm>
+          <a:off x="457200" y="1600200"/>
+          <a:ext cx="8229600" cy="4175760"/>
+        </p:xfrm>
+        <a:graphic>
+          <a:graphicData uri="http://schemas.openxmlformats.org/drawingml/2006/table">
+            <a:tbl>
+              <a:tblPr firstRow="1" firstCol="1" bandRow="1">
+                <a:tableStyleId>{21E4AEA4-8DFA-4A89-87EB-49C32662AFE0}</a:tableStyleId>
+              </a:tblPr>
+              <a:tblGrid>
+                <a:gridCol w="2743200">
+                  <a:extLst>
+                    <a:ext uri="{9D8B030D-6E8A-4147-A177-3AD203B41FA5}">
+                      <a16:colId xmlns:a16="http://schemas.microsoft.com/office/drawing/2014/main" val="506920365"/>
+                    </a:ext>
+                  </a:extLst>
+                </a:gridCol>
+                <a:gridCol w="2743200">
+                  <a:extLst>
+                    <a:ext uri="{9D8B030D-6E8A-4147-A177-3AD203B41FA5}">
+                      <a16:colId xmlns:a16="http://schemas.microsoft.com/office/drawing/2014/main" val="1827387139"/>
+                    </a:ext>
+                  </a:extLst>
+                </a:gridCol>
+                <a:gridCol w="2743200">
+                  <a:extLst>
+                    <a:ext uri="{9D8B030D-6E8A-4147-A177-3AD203B41FA5}">
+                      <a16:colId xmlns:a16="http://schemas.microsoft.com/office/drawing/2014/main" val="3924368828"/>
+                    </a:ext>
+                  </a:extLst>
+                </a:gridCol>
+              </a:tblGrid>
+              <a:tr h="1356360">
+                <a:tc>
+                  <a:txBody>
+                    <a:bodyPr/>
+                    <a:lstStyle/>
+                    <a:p>
+                      <a:endParaRPr lang="en-US" dirty="0"/>
+                    </a:p>
+                  </a:txBody>
+                  <a:tcPr/>
+                </a:tc>
+                <a:tc>
+                  <a:txBody>
+                    <a:bodyPr/>
+                    <a:lstStyle/>
+                    <a:p>
+                      <a:r>
+                        <a:rPr lang="en-US" dirty="0"/>
+                        <a:t>t-test for difference</a:t>
+                      </a:r>
+                    </a:p>
+                    <a:p>
+                      <a:r>
+                        <a:rPr lang="en-US" dirty="0"/>
+                        <a:t>Reject null</a:t>
+                      </a:r>
+                    </a:p>
+                  </a:txBody>
+                  <a:tcPr/>
+                </a:tc>
+                <a:tc>
+                  <a:txBody>
+                    <a:bodyPr/>
+                    <a:lstStyle/>
+                    <a:p>
+                      <a:r>
+                        <a:rPr lang="en-US" dirty="0"/>
+                        <a:t>t-test for difference</a:t>
+                      </a:r>
+                    </a:p>
+                    <a:p>
+                      <a:r>
+                        <a:rPr lang="en-US" dirty="0"/>
+                        <a:t>Fail to Reject null</a:t>
+                      </a:r>
+                    </a:p>
+                  </a:txBody>
+                  <a:tcPr/>
+                </a:tc>
+                <a:extLst>
+                  <a:ext uri="{0D108BD9-81ED-4DB2-BD59-A6C34878D82A}">
+                    <a16:rowId xmlns:a16="http://schemas.microsoft.com/office/drawing/2014/main" val="2097796339"/>
+                  </a:ext>
+                </a:extLst>
+              </a:tr>
+              <a:tr h="1356360">
+                <a:tc>
+                  <a:txBody>
+                    <a:bodyPr/>
+                    <a:lstStyle/>
+                    <a:p>
+                      <a:r>
+                        <a:rPr lang="en-US" dirty="0"/>
+                        <a:t>Two one-sided tests:</a:t>
+                      </a:r>
+                    </a:p>
+                    <a:p>
+                      <a:r>
+                        <a:rPr lang="en-US" dirty="0"/>
+                        <a:t>both tests reject null</a:t>
+                      </a:r>
+                    </a:p>
+                  </a:txBody>
+                  <a:tcPr/>
+                </a:tc>
+                <a:tc>
+                  <a:txBody>
+                    <a:bodyPr/>
+                    <a:lstStyle/>
+                    <a:p>
+                      <a:r>
+                        <a:rPr lang="en-US" b="1" dirty="0"/>
+                        <a:t>Different, but within equivalence bounds. </a:t>
+                      </a:r>
+                      <a:r>
+                        <a:rPr lang="en-US" dirty="0"/>
+                        <a:t>Two groups are different</a:t>
+                      </a:r>
+                    </a:p>
+                    <a:p>
+                      <a:r>
+                        <a:rPr lang="en-US" dirty="0"/>
+                        <a:t>(but not enough to exclude the equivalence bounds)</a:t>
+                      </a:r>
+                    </a:p>
+                  </a:txBody>
+                  <a:tcPr/>
+                </a:tc>
+                <a:tc>
+                  <a:txBody>
+                    <a:bodyPr/>
+                    <a:lstStyle/>
+                    <a:p>
+                      <a:r>
+                        <a:rPr lang="en-US" b="1" dirty="0"/>
+                        <a:t>Equivalent.</a:t>
+                      </a:r>
+                      <a:r>
+                        <a:rPr lang="en-US" dirty="0"/>
+                        <a:t> Two groups are equivalent. (</a:t>
+                      </a:r>
+                      <a:r>
+                        <a:rPr lang="en-US" i="1" dirty="0"/>
+                        <a:t>and</a:t>
+                      </a:r>
+                      <a:r>
+                        <a:rPr lang="en-US" dirty="0"/>
+                        <a:t> not different).</a:t>
+                      </a:r>
+                    </a:p>
+                  </a:txBody>
+                  <a:tcPr/>
+                </a:tc>
+                <a:extLst>
+                  <a:ext uri="{0D108BD9-81ED-4DB2-BD59-A6C34878D82A}">
+                    <a16:rowId xmlns:a16="http://schemas.microsoft.com/office/drawing/2014/main" val="1351486283"/>
+                  </a:ext>
+                </a:extLst>
+              </a:tr>
+              <a:tr h="1356360">
+                <a:tc>
+                  <a:txBody>
+                    <a:bodyPr/>
+                    <a:lstStyle/>
+                    <a:p>
+                      <a:r>
+                        <a:rPr lang="en-US" dirty="0"/>
+                        <a:t>Two one-sided tests</a:t>
+                      </a:r>
+                    </a:p>
+                    <a:p>
+                      <a:r>
+                        <a:rPr lang="en-US" dirty="0"/>
+                        <a:t>either test Fails To Reject</a:t>
+                      </a:r>
+                    </a:p>
+                  </a:txBody>
+                  <a:tcPr/>
+                </a:tc>
+                <a:tc>
+                  <a:txBody>
+                    <a:bodyPr/>
+                    <a:lstStyle/>
+                    <a:p>
+                      <a:r>
+                        <a:rPr lang="en-US" b="1" dirty="0"/>
+                        <a:t>Different and exceeding equivalence bounds.</a:t>
+                      </a:r>
+                    </a:p>
+                  </a:txBody>
+                  <a:tcPr/>
+                </a:tc>
+                <a:tc>
+                  <a:txBody>
+                    <a:bodyPr/>
+                    <a:lstStyle/>
+                    <a:p>
+                      <a:r>
+                        <a:rPr lang="en-US" b="1" dirty="0"/>
+                        <a:t>Inconclusive. </a:t>
+                      </a:r>
+                      <a:r>
+                        <a:rPr lang="en-US" dirty="0"/>
+                        <a:t>There is not enough statistical evidence to determine difference or equivalence.</a:t>
+                      </a:r>
+                    </a:p>
+                  </a:txBody>
+                  <a:tcPr/>
+                </a:tc>
+                <a:extLst>
+                  <a:ext uri="{0D108BD9-81ED-4DB2-BD59-A6C34878D82A}">
+                    <a16:rowId xmlns:a16="http://schemas.microsoft.com/office/drawing/2014/main" val="4076205216"/>
+                  </a:ext>
+                </a:extLst>
+              </a:tr>
+            </a:tbl>
+          </a:graphicData>
+        </a:graphic>
+      </p:graphicFrame>
     </p:spTree>
+    <p:extLst>
+      <p:ext uri="{BB962C8B-B14F-4D97-AF65-F5344CB8AC3E}">
+        <p14:creationId xmlns:p14="http://schemas.microsoft.com/office/powerpoint/2010/main" val="714221789"/>
+      </p:ext>
+    </p:extLst>
   </p:cSld>
   <p:clrMapOvr>
     <a:masterClrMapping/>

</xml_diff>

<commit_message>
Additions to editted presentation.
</commit_message>
<xml_diff>
--- a/adeline/Adeline_TOST_edit.pptx
+++ b/adeline/Adeline_TOST_edit.pptx
@@ -4,6 +4,9 @@
   <p:sldMasterIdLst>
     <p:sldMasterId id="2147483648" r:id="rId1"/>
   </p:sldMasterIdLst>
+  <p:notesMasterIdLst>
+    <p:notesMasterId r:id="rId13"/>
+  </p:notesMasterIdLst>
   <p:sldIdLst>
     <p:sldId id="256" r:id="rId2"/>
     <p:sldId id="269" r:id="rId3"/>
@@ -15,6 +18,7 @@
     <p:sldId id="257" r:id="rId9"/>
     <p:sldId id="270" r:id="rId10"/>
     <p:sldId id="267" r:id="rId11"/>
+    <p:sldId id="271" r:id="rId12"/>
   </p:sldIdLst>
   <p:sldSz cx="9144000" cy="6858000" type="screen4x3"/>
   <p:notesSz cx="6858000" cy="9144000"/>
@@ -132,6 +136,355 @@
 </p:presentation>
 </file>
 
+<file path=ppt/notesMasters/notesMaster1.xml><?xml version="1.0" encoding="utf-8"?>
+<p:notesMaster xmlns:a="http://schemas.openxmlformats.org/drawingml/2006/main" xmlns:r="http://schemas.openxmlformats.org/officeDocument/2006/relationships" xmlns:p="http://schemas.openxmlformats.org/presentationml/2006/main">
+  <p:cSld>
+    <p:bg>
+      <p:bgRef idx="1001">
+        <a:schemeClr val="bg1"/>
+      </p:bgRef>
+    </p:bg>
+    <p:spTree>
+      <p:nvGrpSpPr>
+        <p:cNvPr id="1" name=""/>
+        <p:cNvGrpSpPr/>
+        <p:nvPr/>
+      </p:nvGrpSpPr>
+      <p:grpSpPr>
+        <a:xfrm>
+          <a:off x="0" y="0"/>
+          <a:ext cx="0" cy="0"/>
+          <a:chOff x="0" y="0"/>
+          <a:chExt cx="0" cy="0"/>
+        </a:xfrm>
+      </p:grpSpPr>
+      <p:sp>
+        <p:nvSpPr>
+          <p:cNvPr id="2" name="Header Placeholder 1"/>
+          <p:cNvSpPr>
+            <a:spLocks noGrp="1"/>
+          </p:cNvSpPr>
+          <p:nvPr>
+            <p:ph type="hdr" sz="quarter"/>
+          </p:nvPr>
+        </p:nvSpPr>
+        <p:spPr>
+          <a:xfrm>
+            <a:off x="0" y="0"/>
+            <a:ext cx="2971800" cy="458788"/>
+          </a:xfrm>
+          <a:prstGeom prst="rect">
+            <a:avLst/>
+          </a:prstGeom>
+        </p:spPr>
+        <p:txBody>
+          <a:bodyPr vert="horz" lIns="91440" tIns="45720" rIns="91440" bIns="45720" rtlCol="0"/>
+          <a:lstStyle>
+            <a:lvl1pPr algn="l">
+              <a:defRPr sz="1200"/>
+            </a:lvl1pPr>
+          </a:lstStyle>
+          <a:p>
+            <a:endParaRPr lang="en-US"/>
+          </a:p>
+        </p:txBody>
+      </p:sp>
+      <p:sp>
+        <p:nvSpPr>
+          <p:cNvPr id="3" name="Date Placeholder 2"/>
+          <p:cNvSpPr>
+            <a:spLocks noGrp="1"/>
+          </p:cNvSpPr>
+          <p:nvPr>
+            <p:ph type="dt" idx="1"/>
+          </p:nvPr>
+        </p:nvSpPr>
+        <p:spPr>
+          <a:xfrm>
+            <a:off x="3884613" y="0"/>
+            <a:ext cx="2971800" cy="458788"/>
+          </a:xfrm>
+          <a:prstGeom prst="rect">
+            <a:avLst/>
+          </a:prstGeom>
+        </p:spPr>
+        <p:txBody>
+          <a:bodyPr vert="horz" lIns="91440" tIns="45720" rIns="91440" bIns="45720" rtlCol="0"/>
+          <a:lstStyle>
+            <a:lvl1pPr algn="r">
+              <a:defRPr sz="1200"/>
+            </a:lvl1pPr>
+          </a:lstStyle>
+          <a:p>
+            <a:fld id="{E266D47B-39A1-7F49-8522-F75EBFC44535}" type="datetimeFigureOut">
+              <a:rPr lang="en-US" smtClean="0"/>
+              <a:t>6/16/20</a:t>
+            </a:fld>
+            <a:endParaRPr lang="en-US"/>
+          </a:p>
+        </p:txBody>
+      </p:sp>
+      <p:sp>
+        <p:nvSpPr>
+          <p:cNvPr id="4" name="Slide Image Placeholder 3"/>
+          <p:cNvSpPr>
+            <a:spLocks noGrp="1" noRot="1" noChangeAspect="1"/>
+          </p:cNvSpPr>
+          <p:nvPr>
+            <p:ph type="sldImg" idx="2"/>
+          </p:nvPr>
+        </p:nvSpPr>
+        <p:spPr>
+          <a:xfrm>
+            <a:off x="1371600" y="1143000"/>
+            <a:ext cx="4114800" cy="3086100"/>
+          </a:xfrm>
+          <a:prstGeom prst="rect">
+            <a:avLst/>
+          </a:prstGeom>
+          <a:noFill/>
+          <a:ln w="12700">
+            <a:solidFill>
+              <a:prstClr val="black"/>
+            </a:solidFill>
+          </a:ln>
+        </p:spPr>
+        <p:txBody>
+          <a:bodyPr vert="horz" lIns="91440" tIns="45720" rIns="91440" bIns="45720" rtlCol="0" anchor="ctr"/>
+          <a:lstStyle/>
+          <a:p>
+            <a:endParaRPr lang="en-US"/>
+          </a:p>
+        </p:txBody>
+      </p:sp>
+      <p:sp>
+        <p:nvSpPr>
+          <p:cNvPr id="5" name="Notes Placeholder 4"/>
+          <p:cNvSpPr>
+            <a:spLocks noGrp="1"/>
+          </p:cNvSpPr>
+          <p:nvPr>
+            <p:ph type="body" sz="quarter" idx="3"/>
+          </p:nvPr>
+        </p:nvSpPr>
+        <p:spPr>
+          <a:xfrm>
+            <a:off x="685800" y="4400550"/>
+            <a:ext cx="5486400" cy="3600450"/>
+          </a:xfrm>
+          <a:prstGeom prst="rect">
+            <a:avLst/>
+          </a:prstGeom>
+        </p:spPr>
+        <p:txBody>
+          <a:bodyPr vert="horz" lIns="91440" tIns="45720" rIns="91440" bIns="45720" rtlCol="0"/>
+          <a:lstStyle/>
+          <a:p>
+            <a:pPr lvl="0"/>
+            <a:r>
+              <a:rPr lang="en-US"/>
+              <a:t>Click to edit Master text styles</a:t>
+            </a:r>
+          </a:p>
+          <a:p>
+            <a:pPr lvl="1"/>
+            <a:r>
+              <a:rPr lang="en-US"/>
+              <a:t>Second level</a:t>
+            </a:r>
+          </a:p>
+          <a:p>
+            <a:pPr lvl="2"/>
+            <a:r>
+              <a:rPr lang="en-US"/>
+              <a:t>Third level</a:t>
+            </a:r>
+          </a:p>
+          <a:p>
+            <a:pPr lvl="3"/>
+            <a:r>
+              <a:rPr lang="en-US"/>
+              <a:t>Fourth level</a:t>
+            </a:r>
+          </a:p>
+          <a:p>
+            <a:pPr lvl="4"/>
+            <a:r>
+              <a:rPr lang="en-US"/>
+              <a:t>Fifth level</a:t>
+            </a:r>
+          </a:p>
+        </p:txBody>
+      </p:sp>
+      <p:sp>
+        <p:nvSpPr>
+          <p:cNvPr id="6" name="Footer Placeholder 5"/>
+          <p:cNvSpPr>
+            <a:spLocks noGrp="1"/>
+          </p:cNvSpPr>
+          <p:nvPr>
+            <p:ph type="ftr" sz="quarter" idx="4"/>
+          </p:nvPr>
+        </p:nvSpPr>
+        <p:spPr>
+          <a:xfrm>
+            <a:off x="0" y="8685213"/>
+            <a:ext cx="2971800" cy="458787"/>
+          </a:xfrm>
+          <a:prstGeom prst="rect">
+            <a:avLst/>
+          </a:prstGeom>
+        </p:spPr>
+        <p:txBody>
+          <a:bodyPr vert="horz" lIns="91440" tIns="45720" rIns="91440" bIns="45720" rtlCol="0" anchor="b"/>
+          <a:lstStyle>
+            <a:lvl1pPr algn="l">
+              <a:defRPr sz="1200"/>
+            </a:lvl1pPr>
+          </a:lstStyle>
+          <a:p>
+            <a:endParaRPr lang="en-US"/>
+          </a:p>
+        </p:txBody>
+      </p:sp>
+      <p:sp>
+        <p:nvSpPr>
+          <p:cNvPr id="7" name="Slide Number Placeholder 6"/>
+          <p:cNvSpPr>
+            <a:spLocks noGrp="1"/>
+          </p:cNvSpPr>
+          <p:nvPr>
+            <p:ph type="sldNum" sz="quarter" idx="5"/>
+          </p:nvPr>
+        </p:nvSpPr>
+        <p:spPr>
+          <a:xfrm>
+            <a:off x="3884613" y="8685213"/>
+            <a:ext cx="2971800" cy="458787"/>
+          </a:xfrm>
+          <a:prstGeom prst="rect">
+            <a:avLst/>
+          </a:prstGeom>
+        </p:spPr>
+        <p:txBody>
+          <a:bodyPr vert="horz" lIns="91440" tIns="45720" rIns="91440" bIns="45720" rtlCol="0" anchor="b"/>
+          <a:lstStyle>
+            <a:lvl1pPr algn="r">
+              <a:defRPr sz="1200"/>
+            </a:lvl1pPr>
+          </a:lstStyle>
+          <a:p>
+            <a:fld id="{3F3E04AD-101E-4149-B387-693210C572F5}" type="slidenum">
+              <a:rPr lang="en-US" smtClean="0"/>
+              <a:t>‹#›</a:t>
+            </a:fld>
+            <a:endParaRPr lang="en-US"/>
+          </a:p>
+        </p:txBody>
+      </p:sp>
+    </p:spTree>
+    <p:extLst>
+      <p:ext uri="{BB962C8B-B14F-4D97-AF65-F5344CB8AC3E}">
+        <p14:creationId xmlns:p14="http://schemas.microsoft.com/office/powerpoint/2010/main" val="2146846896"/>
+      </p:ext>
+    </p:extLst>
+  </p:cSld>
+  <p:clrMap bg1="lt1" tx1="dk1" bg2="lt2" tx2="dk2" accent1="accent1" accent2="accent2" accent3="accent3" accent4="accent4" accent5="accent5" accent6="accent6" hlink="hlink" folHlink="folHlink"/>
+  <p:notesStyle>
+    <a:lvl1pPr marL="0" algn="l" defTabSz="914400" rtl="0" eaLnBrk="1" latinLnBrk="0" hangingPunct="1">
+      <a:defRPr sz="1200" kern="1200">
+        <a:solidFill>
+          <a:schemeClr val="tx1"/>
+        </a:solidFill>
+        <a:latin typeface="+mn-lt"/>
+        <a:ea typeface="+mn-ea"/>
+        <a:cs typeface="+mn-cs"/>
+      </a:defRPr>
+    </a:lvl1pPr>
+    <a:lvl2pPr marL="457200" algn="l" defTabSz="914400" rtl="0" eaLnBrk="1" latinLnBrk="0" hangingPunct="1">
+      <a:defRPr sz="1200" kern="1200">
+        <a:solidFill>
+          <a:schemeClr val="tx1"/>
+        </a:solidFill>
+        <a:latin typeface="+mn-lt"/>
+        <a:ea typeface="+mn-ea"/>
+        <a:cs typeface="+mn-cs"/>
+      </a:defRPr>
+    </a:lvl2pPr>
+    <a:lvl3pPr marL="914400" algn="l" defTabSz="914400" rtl="0" eaLnBrk="1" latinLnBrk="0" hangingPunct="1">
+      <a:defRPr sz="1200" kern="1200">
+        <a:solidFill>
+          <a:schemeClr val="tx1"/>
+        </a:solidFill>
+        <a:latin typeface="+mn-lt"/>
+        <a:ea typeface="+mn-ea"/>
+        <a:cs typeface="+mn-cs"/>
+      </a:defRPr>
+    </a:lvl3pPr>
+    <a:lvl4pPr marL="1371600" algn="l" defTabSz="914400" rtl="0" eaLnBrk="1" latinLnBrk="0" hangingPunct="1">
+      <a:defRPr sz="1200" kern="1200">
+        <a:solidFill>
+          <a:schemeClr val="tx1"/>
+        </a:solidFill>
+        <a:latin typeface="+mn-lt"/>
+        <a:ea typeface="+mn-ea"/>
+        <a:cs typeface="+mn-cs"/>
+      </a:defRPr>
+    </a:lvl4pPr>
+    <a:lvl5pPr marL="1828800" algn="l" defTabSz="914400" rtl="0" eaLnBrk="1" latinLnBrk="0" hangingPunct="1">
+      <a:defRPr sz="1200" kern="1200">
+        <a:solidFill>
+          <a:schemeClr val="tx1"/>
+        </a:solidFill>
+        <a:latin typeface="+mn-lt"/>
+        <a:ea typeface="+mn-ea"/>
+        <a:cs typeface="+mn-cs"/>
+      </a:defRPr>
+    </a:lvl5pPr>
+    <a:lvl6pPr marL="2286000" algn="l" defTabSz="914400" rtl="0" eaLnBrk="1" latinLnBrk="0" hangingPunct="1">
+      <a:defRPr sz="1200" kern="1200">
+        <a:solidFill>
+          <a:schemeClr val="tx1"/>
+        </a:solidFill>
+        <a:latin typeface="+mn-lt"/>
+        <a:ea typeface="+mn-ea"/>
+        <a:cs typeface="+mn-cs"/>
+      </a:defRPr>
+    </a:lvl6pPr>
+    <a:lvl7pPr marL="2743200" algn="l" defTabSz="914400" rtl="0" eaLnBrk="1" latinLnBrk="0" hangingPunct="1">
+      <a:defRPr sz="1200" kern="1200">
+        <a:solidFill>
+          <a:schemeClr val="tx1"/>
+        </a:solidFill>
+        <a:latin typeface="+mn-lt"/>
+        <a:ea typeface="+mn-ea"/>
+        <a:cs typeface="+mn-cs"/>
+      </a:defRPr>
+    </a:lvl7pPr>
+    <a:lvl8pPr marL="3200400" algn="l" defTabSz="914400" rtl="0" eaLnBrk="1" latinLnBrk="0" hangingPunct="1">
+      <a:defRPr sz="1200" kern="1200">
+        <a:solidFill>
+          <a:schemeClr val="tx1"/>
+        </a:solidFill>
+        <a:latin typeface="+mn-lt"/>
+        <a:ea typeface="+mn-ea"/>
+        <a:cs typeface="+mn-cs"/>
+      </a:defRPr>
+    </a:lvl8pPr>
+    <a:lvl9pPr marL="3657600" algn="l" defTabSz="914400" rtl="0" eaLnBrk="1" latinLnBrk="0" hangingPunct="1">
+      <a:defRPr sz="1200" kern="1200">
+        <a:solidFill>
+          <a:schemeClr val="tx1"/>
+        </a:solidFill>
+        <a:latin typeface="+mn-lt"/>
+        <a:ea typeface="+mn-ea"/>
+        <a:cs typeface="+mn-cs"/>
+      </a:defRPr>
+    </a:lvl9pPr>
+  </p:notesStyle>
+</p:notesMaster>
+</file>
+
 <file path=ppt/slideLayouts/slideLayout1.xml><?xml version="1.0" encoding="utf-8"?>
 <p:sldLayout xmlns:a="http://schemas.openxmlformats.org/drawingml/2006/main" xmlns:r="http://schemas.openxmlformats.org/officeDocument/2006/relationships" xmlns:p="http://schemas.openxmlformats.org/presentationml/2006/main" type="title" preserve="1">
   <p:cSld name="Title Slide">
@@ -309,7 +662,7 @@
           <a:bodyPr/>
           <a:lstStyle/>
           <a:p>
-            <a:fld id="{241EB5C9-1307-BA42-ABA2-0BC069CD8E7F}" type="datetimeFigureOut">
+            <a:fld id="{E32DE90A-DAE6-8940-944F-A2716F426D78}" type="datetime1">
               <a:rPr lang="en-US" smtClean="0"/>
               <a:t>6/16/20</a:t>
             </a:fld>
@@ -477,7 +830,7 @@
           <a:bodyPr/>
           <a:lstStyle/>
           <a:p>
-            <a:fld id="{241EB5C9-1307-BA42-ABA2-0BC069CD8E7F}" type="datetimeFigureOut">
+            <a:fld id="{05F31D31-4031-0843-ACCE-5752DA23E4A8}" type="datetime1">
               <a:rPr lang="en-US" smtClean="0"/>
               <a:t>6/16/20</a:t>
             </a:fld>
@@ -655,7 +1008,7 @@
           <a:bodyPr/>
           <a:lstStyle/>
           <a:p>
-            <a:fld id="{241EB5C9-1307-BA42-ABA2-0BC069CD8E7F}" type="datetimeFigureOut">
+            <a:fld id="{08454EFC-2055-FB41-88EC-3E1BBE43240B}" type="datetime1">
               <a:rPr lang="en-US" smtClean="0"/>
               <a:t>6/16/20</a:t>
             </a:fld>
@@ -823,7 +1176,7 @@
           <a:bodyPr/>
           <a:lstStyle/>
           <a:p>
-            <a:fld id="{241EB5C9-1307-BA42-ABA2-0BC069CD8E7F}" type="datetimeFigureOut">
+            <a:fld id="{98F8C21C-DA6A-F04A-9A75-37AD5770AA21}" type="datetime1">
               <a:rPr lang="en-US" smtClean="0"/>
               <a:t>6/16/20</a:t>
             </a:fld>
@@ -1068,7 +1421,7 @@
           <a:bodyPr/>
           <a:lstStyle/>
           <a:p>
-            <a:fld id="{241EB5C9-1307-BA42-ABA2-0BC069CD8E7F}" type="datetimeFigureOut">
+            <a:fld id="{7B24982F-DCE5-5749-95D3-8EFC7ABAD800}" type="datetime1">
               <a:rPr lang="en-US" smtClean="0"/>
               <a:t>6/16/20</a:t>
             </a:fld>
@@ -1353,7 +1706,7 @@
           <a:bodyPr/>
           <a:lstStyle/>
           <a:p>
-            <a:fld id="{241EB5C9-1307-BA42-ABA2-0BC069CD8E7F}" type="datetimeFigureOut">
+            <a:fld id="{BE8DDC09-582C-D847-8C4E-51C4A7648ED7}" type="datetime1">
               <a:rPr lang="en-US" smtClean="0"/>
               <a:t>6/16/20</a:t>
             </a:fld>
@@ -1772,7 +2125,7 @@
           <a:bodyPr/>
           <a:lstStyle/>
           <a:p>
-            <a:fld id="{241EB5C9-1307-BA42-ABA2-0BC069CD8E7F}" type="datetimeFigureOut">
+            <a:fld id="{AE41971E-8717-0441-A256-B09A43E8E63E}" type="datetime1">
               <a:rPr lang="en-US" smtClean="0"/>
               <a:t>6/16/20</a:t>
             </a:fld>
@@ -1889,7 +2242,7 @@
           <a:bodyPr/>
           <a:lstStyle/>
           <a:p>
-            <a:fld id="{241EB5C9-1307-BA42-ABA2-0BC069CD8E7F}" type="datetimeFigureOut">
+            <a:fld id="{D96E6D69-62D5-124D-AA64-4C92E99A9820}" type="datetime1">
               <a:rPr lang="en-US" smtClean="0"/>
               <a:t>6/16/20</a:t>
             </a:fld>
@@ -1984,7 +2337,7 @@
           <a:bodyPr/>
           <a:lstStyle/>
           <a:p>
-            <a:fld id="{241EB5C9-1307-BA42-ABA2-0BC069CD8E7F}" type="datetimeFigureOut">
+            <a:fld id="{29A8CA78-8944-0C4A-A6C3-B89414650DDE}" type="datetime1">
               <a:rPr lang="en-US" smtClean="0"/>
               <a:t>6/16/20</a:t>
             </a:fld>
@@ -2259,7 +2612,7 @@
           <a:bodyPr/>
           <a:lstStyle/>
           <a:p>
-            <a:fld id="{241EB5C9-1307-BA42-ABA2-0BC069CD8E7F}" type="datetimeFigureOut">
+            <a:fld id="{7B2E0C6E-27EA-D145-AA00-4BCBE49E470F}" type="datetime1">
               <a:rPr lang="en-US" smtClean="0"/>
               <a:t>6/16/20</a:t>
             </a:fld>
@@ -2511,7 +2864,7 @@
           <a:bodyPr/>
           <a:lstStyle/>
           <a:p>
-            <a:fld id="{241EB5C9-1307-BA42-ABA2-0BC069CD8E7F}" type="datetimeFigureOut">
+            <a:fld id="{33CBAC1E-D494-B948-9F78-150D461BA535}" type="datetime1">
               <a:rPr lang="en-US" smtClean="0"/>
               <a:t>6/16/20</a:t>
             </a:fld>
@@ -2722,7 +3075,7 @@
             </a:lvl1pPr>
           </a:lstStyle>
           <a:p>
-            <a:fld id="{241EB5C9-1307-BA42-ABA2-0BC069CD8E7F}" type="datetimeFigureOut">
+            <a:fld id="{400A4D65-0675-3346-B867-5AE953C8DF1D}" type="datetime1">
               <a:rPr lang="en-US" smtClean="0"/>
               <a:t>6/16/20</a:t>
             </a:fld>
@@ -2829,6 +3182,7 @@
     <p:sldLayoutId id="2147483658" r:id="rId10"/>
     <p:sldLayoutId id="2147483659" r:id="rId11"/>
   </p:sldLayoutIdLst>
+  <p:hf hdr="0" ftr="0" dt="0"/>
   <p:txStyles>
     <p:titleStyle>
       <a:lvl1pPr algn="ctr" defTabSz="457200" rtl="0" eaLnBrk="1" latinLnBrk="0" hangingPunct="1">
@@ -3164,12 +3518,18 @@
       </p:sp>
       <p:sp>
         <p:nvSpPr>
-          <p:cNvPr id="4" name="Date Placeholder 3"/>
-          <p:cNvSpPr>
-            <a:spLocks noGrp="1"/>
-          </p:cNvSpPr>
-          <p:nvPr>
-            <p:ph type="dt" sz="half" idx="10"/>
+          <p:cNvPr id="5" name="Slide Number Placeholder 4">
+            <a:extLst>
+              <a:ext uri="{FF2B5EF4-FFF2-40B4-BE49-F238E27FC236}">
+                <a16:creationId xmlns:a16="http://schemas.microsoft.com/office/drawing/2014/main" id="{D95717F3-6462-D14D-BCCC-F9310880E449}"/>
+              </a:ext>
+            </a:extLst>
+          </p:cNvPr>
+          <p:cNvSpPr>
+            <a:spLocks noGrp="1"/>
+          </p:cNvSpPr>
+          <p:nvPr>
+            <p:ph type="sldNum" sz="quarter" idx="12"/>
           </p:nvPr>
         </p:nvSpPr>
         <p:spPr/>
@@ -3177,12 +3537,11 @@
           <a:bodyPr/>
           <a:lstStyle/>
           <a:p>
-            <a:pPr marL="0" lvl="0" indent="0">
-              <a:buNone/>
-            </a:pPr>
-            <a:r>
-              <a:t>15 June, 2020</a:t>
-            </a:r>
+            <a:fld id="{C5EF2332-01BF-834F-8236-50238282D533}" type="slidenum">
+              <a:rPr lang="en-US" smtClean="0"/>
+              <a:t>1</a:t>
+            </a:fld>
+            <a:endParaRPr lang="en-US"/>
           </a:p>
         </p:txBody>
       </p:sp>
@@ -3258,7 +3617,16 @@
               <a:buNone/>
             </a:pPr>
             <a:r>
-              <a:t>Tutorial (Lakëns et al., 2018) discussion.</a:t>
+              <a:rPr dirty="0"/>
+              <a:t>Tutorial (</a:t>
+            </a:r>
+            <a:r>
+              <a:rPr dirty="0" err="1"/>
+              <a:t>Lakëns</a:t>
+            </a:r>
+            <a:r>
+              <a:rPr dirty="0"/>
+              <a:t> et al., 2018) discussion.</a:t>
             </a:r>
           </a:p>
           <a:p>
@@ -3269,8 +3637,16 @@
               <a:buNone/>
             </a:pPr>
             <a:r>
-              <a:rPr b="1"/>
-              <a:t>Just-noticeable difference. Burriss et al., 2015:</a:t>
+              <a:rPr b="1" dirty="0"/>
+              <a:t>Just-noticeable difference. </a:t>
+            </a:r>
+            <a:r>
+              <a:rPr b="1" dirty="0" err="1"/>
+              <a:t>Burriss</a:t>
+            </a:r>
+            <a:r>
+              <a:rPr b="1" dirty="0"/>
+              <a:t> et al., 2015:</a:t>
             </a:r>
           </a:p>
           <a:p>
@@ -3278,18 +3654,19 @@
               <a:buNone/>
             </a:pPr>
             <a:r>
+              <a:rPr dirty="0"/>
               <a:t>Research question: Do ovulating women signal men by becoming more flush in the face?</a:t>
             </a:r>
           </a:p>
           <a:p>
-            <a:pPr lvl="1"/>
-            <a:r>
+            <a:r>
+              <a:rPr dirty="0"/>
               <a:t>NIH funded research?</a:t>
             </a:r>
           </a:p>
           <a:p>
-            <a:pPr lvl="1"/>
-            <a:r>
+            <a:r>
+              <a:rPr dirty="0"/>
               <a:t>Maybelline?</a:t>
             </a:r>
           </a:p>
@@ -3298,7 +3675,16 @@
               <a:buNone/>
             </a:pPr>
             <a:r>
-              <a:t>Just-noticeable difference: Change in face redness perceptable by men.</a:t>
+              <a:rPr dirty="0"/>
+              <a:t>Just-noticeable difference: Change in face redness </a:t>
+            </a:r>
+            <a:r>
+              <a:rPr dirty="0" err="1"/>
+              <a:t>perceptable</a:t>
+            </a:r>
+            <a:r>
+              <a:rPr dirty="0"/>
+              <a:t> by men.</a:t>
             </a:r>
           </a:p>
           <a:p>
@@ -3306,7 +3692,24 @@
               <a:buNone/>
             </a:pPr>
             <a:r>
-              <a:t>Authors’ conclusions: women do become more flush, but not enough to be discernable by the naked eye. (Maybelline withdraws funding)</a:t>
+              <a:rPr dirty="0"/>
+              <a:t>Authors’ conclusions: women do become more flush, but not enough to be discernable by the naked eye. (Maybelline </a:t>
+            </a:r>
+            <a:r>
+              <a:rPr lang="en-US" dirty="0"/>
+              <a:t>cancel</a:t>
+            </a:r>
+            <a:r>
+              <a:rPr dirty="0"/>
+              <a:t>s </a:t>
+            </a:r>
+            <a:r>
+              <a:rPr lang="en-US" dirty="0"/>
+              <a:t>rouge project</a:t>
+            </a:r>
+            <a:r>
+              <a:rPr dirty="0"/>
+              <a:t>)</a:t>
             </a:r>
           </a:p>
           <a:p>
@@ -3317,48 +3720,122 @@
               <a:buNone/>
             </a:pPr>
             <a:r>
-              <a:rPr b="1"/>
+              <a:rPr b="1" dirty="0"/>
               <a:t>Statistical Power, no laughing matter</a:t>
             </a:r>
           </a:p>
           <a:p>
-            <a:pPr lvl="1"/>
-            <a:r>
+            <a:r>
+              <a:rPr dirty="0"/>
               <a:t>What </a:t>
             </a:r>
             <a:r>
-              <a:rPr b="1"/>
+              <a:rPr b="1" dirty="0"/>
               <a:t>effect size</a:t>
             </a:r>
             <a:r>
+              <a:rPr dirty="0"/>
               <a:t> can we detect at alpha=.05, sample size n, power=.8?</a:t>
             </a:r>
           </a:p>
           <a:p>
-            <a:pPr lvl="1"/>
-            <a:r>
-              <a:rPr b="1"/>
+            <a:r>
+              <a:rPr b="1" dirty="0"/>
               <a:t>Effect size</a:t>
             </a:r>
             <a:r>
+              <a:rPr dirty="0"/>
               <a:t> in units of </a:t>
             </a:r>
             <a:r>
-              <a:rPr i="1"/>
+              <a:rPr i="1" dirty="0"/>
               <a:t>Cohen’s d.</a:t>
             </a:r>
           </a:p>
           <a:p>
-            <a:pPr lvl="1"/>
-            <a:r>
+            <a:r>
+              <a:rPr dirty="0"/>
               <a:t>Run TOST using </a:t>
             </a:r>
             <a:r>
-              <a:rPr b="1"/>
+              <a:rPr b="1" dirty="0"/>
               <a:t>effect size</a:t>
             </a:r>
             <a:r>
+              <a:rPr dirty="0"/>
               <a:t>, rather than raw value.</a:t>
+            </a:r>
+          </a:p>
+        </p:txBody>
+      </p:sp>
+      <p:sp>
+        <p:nvSpPr>
+          <p:cNvPr id="4" name="Slide Number Placeholder 3">
+            <a:extLst>
+              <a:ext uri="{FF2B5EF4-FFF2-40B4-BE49-F238E27FC236}">
+                <a16:creationId xmlns:a16="http://schemas.microsoft.com/office/drawing/2014/main" id="{14CA7526-07C5-4D4D-8130-ED828179AE17}"/>
+              </a:ext>
+            </a:extLst>
+          </p:cNvPr>
+          <p:cNvSpPr>
+            <a:spLocks noGrp="1"/>
+          </p:cNvSpPr>
+          <p:nvPr>
+            <p:ph type="sldNum" sz="quarter" idx="12"/>
+          </p:nvPr>
+        </p:nvSpPr>
+        <p:spPr/>
+        <p:txBody>
+          <a:bodyPr/>
+          <a:lstStyle/>
+          <a:p>
+            <a:fld id="{C5EF2332-01BF-834F-8236-50238282D533}" type="slidenum">
+              <a:rPr lang="en-US" smtClean="0"/>
+              <a:t>10</a:t>
+            </a:fld>
+            <a:endParaRPr lang="en-US"/>
+          </a:p>
+        </p:txBody>
+      </p:sp>
+      <p:sp>
+        <p:nvSpPr>
+          <p:cNvPr id="5" name="TextBox 4">
+            <a:extLst>
+              <a:ext uri="{FF2B5EF4-FFF2-40B4-BE49-F238E27FC236}">
+                <a16:creationId xmlns:a16="http://schemas.microsoft.com/office/drawing/2014/main" id="{37121943-DD71-D24C-86BE-C4E755A50807}"/>
+              </a:ext>
+            </a:extLst>
+          </p:cNvPr>
+          <p:cNvSpPr txBox="1"/>
+          <p:nvPr/>
+        </p:nvSpPr>
+        <p:spPr>
+          <a:xfrm>
+            <a:off x="444137" y="6191794"/>
+            <a:ext cx="5558509" cy="369332"/>
+          </a:xfrm>
+          <a:prstGeom prst="rect">
+            <a:avLst/>
+          </a:prstGeom>
+          <a:noFill/>
+        </p:spPr>
+        <p:txBody>
+          <a:bodyPr wrap="none" rtlCol="0">
+            <a:spAutoFit/>
+          </a:bodyPr>
+          <a:lstStyle/>
+          <a:p>
+            <a:r>
+              <a:rPr lang="en-US" b="1" dirty="0"/>
+              <a:t>We used an intuitive value, 2-fold change (1 </a:t>
+            </a:r>
+            <a:r>
+              <a:rPr lang="en-US" b="1"/>
+              <a:t>unit in </a:t>
+            </a:r>
+            <a:r>
+              <a:rPr lang="en-US" b="1" dirty="0"/>
+              <a:t>log2)</a:t>
             </a:r>
           </a:p>
         </p:txBody>
@@ -3368,6 +3845,1032 @@
   <p:clrMapOvr>
     <a:masterClrMapping/>
   </p:clrMapOvr>
+  <p:timing>
+    <p:tnLst>
+      <p:par>
+        <p:cTn id="1" dur="indefinite" restart="never" nodeType="tmRoot">
+          <p:childTnLst>
+            <p:seq concurrent="1" nextAc="seek">
+              <p:cTn id="2" dur="indefinite" nodeType="mainSeq">
+                <p:childTnLst>
+                  <p:par>
+                    <p:cTn id="3" fill="hold">
+                      <p:stCondLst>
+                        <p:cond delay="indefinite"/>
+                      </p:stCondLst>
+                      <p:childTnLst>
+                        <p:par>
+                          <p:cTn id="4" fill="hold">
+                            <p:stCondLst>
+                              <p:cond delay="0"/>
+                            </p:stCondLst>
+                            <p:childTnLst>
+                              <p:par>
+                                <p:cTn id="5" presetID="1" presetClass="entr" presetSubtype="0" fill="hold" nodeType="clickEffect">
+                                  <p:stCondLst>
+                                    <p:cond delay="0"/>
+                                  </p:stCondLst>
+                                  <p:childTnLst>
+                                    <p:set>
+                                      <p:cBhvr>
+                                        <p:cTn id="6" dur="1" fill="hold">
+                                          <p:stCondLst>
+                                            <p:cond delay="0"/>
+                                          </p:stCondLst>
+                                        </p:cTn>
+                                        <p:tgtEl>
+                                          <p:spTgt spid="3">
+                                            <p:txEl>
+                                              <p:pRg st="2" end="2"/>
+                                            </p:txEl>
+                                          </p:spTgt>
+                                        </p:tgtEl>
+                                        <p:attrNameLst>
+                                          <p:attrName>style.visibility</p:attrName>
+                                        </p:attrNameLst>
+                                      </p:cBhvr>
+                                      <p:to>
+                                        <p:strVal val="visible"/>
+                                      </p:to>
+                                    </p:set>
+                                  </p:childTnLst>
+                                </p:cTn>
+                              </p:par>
+                            </p:childTnLst>
+                          </p:cTn>
+                        </p:par>
+                      </p:childTnLst>
+                    </p:cTn>
+                  </p:par>
+                  <p:par>
+                    <p:cTn id="7" fill="hold">
+                      <p:stCondLst>
+                        <p:cond delay="indefinite"/>
+                      </p:stCondLst>
+                      <p:childTnLst>
+                        <p:par>
+                          <p:cTn id="8" fill="hold">
+                            <p:stCondLst>
+                              <p:cond delay="0"/>
+                            </p:stCondLst>
+                            <p:childTnLst>
+                              <p:par>
+                                <p:cTn id="9" presetID="1" presetClass="entr" presetSubtype="0" fill="hold" nodeType="clickEffect">
+                                  <p:stCondLst>
+                                    <p:cond delay="0"/>
+                                  </p:stCondLst>
+                                  <p:childTnLst>
+                                    <p:set>
+                                      <p:cBhvr>
+                                        <p:cTn id="10" dur="1" fill="hold">
+                                          <p:stCondLst>
+                                            <p:cond delay="0"/>
+                                          </p:stCondLst>
+                                        </p:cTn>
+                                        <p:tgtEl>
+                                          <p:spTgt spid="3">
+                                            <p:txEl>
+                                              <p:pRg st="3" end="3"/>
+                                            </p:txEl>
+                                          </p:spTgt>
+                                        </p:tgtEl>
+                                        <p:attrNameLst>
+                                          <p:attrName>style.visibility</p:attrName>
+                                        </p:attrNameLst>
+                                      </p:cBhvr>
+                                      <p:to>
+                                        <p:strVal val="visible"/>
+                                      </p:to>
+                                    </p:set>
+                                  </p:childTnLst>
+                                </p:cTn>
+                              </p:par>
+                            </p:childTnLst>
+                          </p:cTn>
+                        </p:par>
+                      </p:childTnLst>
+                    </p:cTn>
+                  </p:par>
+                  <p:par>
+                    <p:cTn id="11" fill="hold">
+                      <p:stCondLst>
+                        <p:cond delay="indefinite"/>
+                      </p:stCondLst>
+                      <p:childTnLst>
+                        <p:par>
+                          <p:cTn id="12" fill="hold">
+                            <p:stCondLst>
+                              <p:cond delay="0"/>
+                            </p:stCondLst>
+                            <p:childTnLst>
+                              <p:par>
+                                <p:cTn id="13" presetID="1" presetClass="entr" presetSubtype="0" fill="hold" nodeType="clickEffect">
+                                  <p:stCondLst>
+                                    <p:cond delay="0"/>
+                                  </p:stCondLst>
+                                  <p:childTnLst>
+                                    <p:set>
+                                      <p:cBhvr>
+                                        <p:cTn id="14" dur="1" fill="hold">
+                                          <p:stCondLst>
+                                            <p:cond delay="0"/>
+                                          </p:stCondLst>
+                                        </p:cTn>
+                                        <p:tgtEl>
+                                          <p:spTgt spid="3">
+                                            <p:txEl>
+                                              <p:pRg st="4" end="4"/>
+                                            </p:txEl>
+                                          </p:spTgt>
+                                        </p:tgtEl>
+                                        <p:attrNameLst>
+                                          <p:attrName>style.visibility</p:attrName>
+                                        </p:attrNameLst>
+                                      </p:cBhvr>
+                                      <p:to>
+                                        <p:strVal val="visible"/>
+                                      </p:to>
+                                    </p:set>
+                                  </p:childTnLst>
+                                </p:cTn>
+                              </p:par>
+                            </p:childTnLst>
+                          </p:cTn>
+                        </p:par>
+                      </p:childTnLst>
+                    </p:cTn>
+                  </p:par>
+                  <p:par>
+                    <p:cTn id="15" fill="hold">
+                      <p:stCondLst>
+                        <p:cond delay="indefinite"/>
+                      </p:stCondLst>
+                      <p:childTnLst>
+                        <p:par>
+                          <p:cTn id="16" fill="hold">
+                            <p:stCondLst>
+                              <p:cond delay="0"/>
+                            </p:stCondLst>
+                            <p:childTnLst>
+                              <p:par>
+                                <p:cTn id="17" presetID="1" presetClass="entr" presetSubtype="0" fill="hold" nodeType="clickEffect">
+                                  <p:stCondLst>
+                                    <p:cond delay="0"/>
+                                  </p:stCondLst>
+                                  <p:childTnLst>
+                                    <p:set>
+                                      <p:cBhvr>
+                                        <p:cTn id="18" dur="1" fill="hold">
+                                          <p:stCondLst>
+                                            <p:cond delay="0"/>
+                                          </p:stCondLst>
+                                        </p:cTn>
+                                        <p:tgtEl>
+                                          <p:spTgt spid="3">
+                                            <p:txEl>
+                                              <p:pRg st="5" end="5"/>
+                                            </p:txEl>
+                                          </p:spTgt>
+                                        </p:tgtEl>
+                                        <p:attrNameLst>
+                                          <p:attrName>style.visibility</p:attrName>
+                                        </p:attrNameLst>
+                                      </p:cBhvr>
+                                      <p:to>
+                                        <p:strVal val="visible"/>
+                                      </p:to>
+                                    </p:set>
+                                  </p:childTnLst>
+                                </p:cTn>
+                              </p:par>
+                            </p:childTnLst>
+                          </p:cTn>
+                        </p:par>
+                      </p:childTnLst>
+                    </p:cTn>
+                  </p:par>
+                  <p:par>
+                    <p:cTn id="19" fill="hold">
+                      <p:stCondLst>
+                        <p:cond delay="indefinite"/>
+                      </p:stCondLst>
+                      <p:childTnLst>
+                        <p:par>
+                          <p:cTn id="20" fill="hold">
+                            <p:stCondLst>
+                              <p:cond delay="0"/>
+                            </p:stCondLst>
+                            <p:childTnLst>
+                              <p:par>
+                                <p:cTn id="21" presetID="1" presetClass="entr" presetSubtype="0" fill="hold" nodeType="clickEffect">
+                                  <p:stCondLst>
+                                    <p:cond delay="0"/>
+                                  </p:stCondLst>
+                                  <p:childTnLst>
+                                    <p:set>
+                                      <p:cBhvr>
+                                        <p:cTn id="22" dur="1" fill="hold">
+                                          <p:stCondLst>
+                                            <p:cond delay="0"/>
+                                          </p:stCondLst>
+                                        </p:cTn>
+                                        <p:tgtEl>
+                                          <p:spTgt spid="3">
+                                            <p:txEl>
+                                              <p:pRg st="6" end="6"/>
+                                            </p:txEl>
+                                          </p:spTgt>
+                                        </p:tgtEl>
+                                        <p:attrNameLst>
+                                          <p:attrName>style.visibility</p:attrName>
+                                        </p:attrNameLst>
+                                      </p:cBhvr>
+                                      <p:to>
+                                        <p:strVal val="visible"/>
+                                      </p:to>
+                                    </p:set>
+                                  </p:childTnLst>
+                                </p:cTn>
+                              </p:par>
+                            </p:childTnLst>
+                          </p:cTn>
+                        </p:par>
+                      </p:childTnLst>
+                    </p:cTn>
+                  </p:par>
+                  <p:par>
+                    <p:cTn id="23" fill="hold">
+                      <p:stCondLst>
+                        <p:cond delay="indefinite"/>
+                      </p:stCondLst>
+                      <p:childTnLst>
+                        <p:par>
+                          <p:cTn id="24" fill="hold">
+                            <p:stCondLst>
+                              <p:cond delay="0"/>
+                            </p:stCondLst>
+                            <p:childTnLst>
+                              <p:par>
+                                <p:cTn id="25" presetID="1" presetClass="entr" presetSubtype="0" fill="hold" nodeType="clickEffect">
+                                  <p:stCondLst>
+                                    <p:cond delay="0"/>
+                                  </p:stCondLst>
+                                  <p:childTnLst>
+                                    <p:set>
+                                      <p:cBhvr>
+                                        <p:cTn id="26" dur="1" fill="hold">
+                                          <p:stCondLst>
+                                            <p:cond delay="0"/>
+                                          </p:stCondLst>
+                                        </p:cTn>
+                                        <p:tgtEl>
+                                          <p:spTgt spid="3">
+                                            <p:txEl>
+                                              <p:pRg st="7" end="7"/>
+                                            </p:txEl>
+                                          </p:spTgt>
+                                        </p:tgtEl>
+                                        <p:attrNameLst>
+                                          <p:attrName>style.visibility</p:attrName>
+                                        </p:attrNameLst>
+                                      </p:cBhvr>
+                                      <p:to>
+                                        <p:strVal val="visible"/>
+                                      </p:to>
+                                    </p:set>
+                                  </p:childTnLst>
+                                </p:cTn>
+                              </p:par>
+                            </p:childTnLst>
+                          </p:cTn>
+                        </p:par>
+                      </p:childTnLst>
+                    </p:cTn>
+                  </p:par>
+                  <p:par>
+                    <p:cTn id="27" fill="hold">
+                      <p:stCondLst>
+                        <p:cond delay="indefinite"/>
+                      </p:stCondLst>
+                      <p:childTnLst>
+                        <p:par>
+                          <p:cTn id="28" fill="hold">
+                            <p:stCondLst>
+                              <p:cond delay="0"/>
+                            </p:stCondLst>
+                            <p:childTnLst>
+                              <p:par>
+                                <p:cTn id="29" presetID="1" presetClass="entr" presetSubtype="0" fill="hold" nodeType="clickEffect">
+                                  <p:stCondLst>
+                                    <p:cond delay="0"/>
+                                  </p:stCondLst>
+                                  <p:childTnLst>
+                                    <p:set>
+                                      <p:cBhvr>
+                                        <p:cTn id="30" dur="1" fill="hold">
+                                          <p:stCondLst>
+                                            <p:cond delay="0"/>
+                                          </p:stCondLst>
+                                        </p:cTn>
+                                        <p:tgtEl>
+                                          <p:spTgt spid="3">
+                                            <p:txEl>
+                                              <p:pRg st="8" end="8"/>
+                                            </p:txEl>
+                                          </p:spTgt>
+                                        </p:tgtEl>
+                                        <p:attrNameLst>
+                                          <p:attrName>style.visibility</p:attrName>
+                                        </p:attrNameLst>
+                                      </p:cBhvr>
+                                      <p:to>
+                                        <p:strVal val="visible"/>
+                                      </p:to>
+                                    </p:set>
+                                  </p:childTnLst>
+                                </p:cTn>
+                              </p:par>
+                            </p:childTnLst>
+                          </p:cTn>
+                        </p:par>
+                      </p:childTnLst>
+                    </p:cTn>
+                  </p:par>
+                  <p:par>
+                    <p:cTn id="31" fill="hold">
+                      <p:stCondLst>
+                        <p:cond delay="indefinite"/>
+                      </p:stCondLst>
+                      <p:childTnLst>
+                        <p:par>
+                          <p:cTn id="32" fill="hold">
+                            <p:stCondLst>
+                              <p:cond delay="0"/>
+                            </p:stCondLst>
+                            <p:childTnLst>
+                              <p:par>
+                                <p:cTn id="33" presetID="1" presetClass="entr" presetSubtype="0" fill="hold" nodeType="clickEffect">
+                                  <p:stCondLst>
+                                    <p:cond delay="0"/>
+                                  </p:stCondLst>
+                                  <p:childTnLst>
+                                    <p:set>
+                                      <p:cBhvr>
+                                        <p:cTn id="34" dur="1" fill="hold">
+                                          <p:stCondLst>
+                                            <p:cond delay="0"/>
+                                          </p:stCondLst>
+                                        </p:cTn>
+                                        <p:tgtEl>
+                                          <p:spTgt spid="3">
+                                            <p:txEl>
+                                              <p:pRg st="9" end="9"/>
+                                            </p:txEl>
+                                          </p:spTgt>
+                                        </p:tgtEl>
+                                        <p:attrNameLst>
+                                          <p:attrName>style.visibility</p:attrName>
+                                        </p:attrNameLst>
+                                      </p:cBhvr>
+                                      <p:to>
+                                        <p:strVal val="visible"/>
+                                      </p:to>
+                                    </p:set>
+                                  </p:childTnLst>
+                                </p:cTn>
+                              </p:par>
+                            </p:childTnLst>
+                          </p:cTn>
+                        </p:par>
+                      </p:childTnLst>
+                    </p:cTn>
+                  </p:par>
+                  <p:par>
+                    <p:cTn id="35" fill="hold">
+                      <p:stCondLst>
+                        <p:cond delay="indefinite"/>
+                      </p:stCondLst>
+                      <p:childTnLst>
+                        <p:par>
+                          <p:cTn id="36" fill="hold">
+                            <p:stCondLst>
+                              <p:cond delay="0"/>
+                            </p:stCondLst>
+                            <p:childTnLst>
+                              <p:par>
+                                <p:cTn id="37" presetID="1" presetClass="entr" presetSubtype="0" fill="hold" nodeType="clickEffect">
+                                  <p:stCondLst>
+                                    <p:cond delay="0"/>
+                                  </p:stCondLst>
+                                  <p:childTnLst>
+                                    <p:set>
+                                      <p:cBhvr>
+                                        <p:cTn id="38" dur="1" fill="hold">
+                                          <p:stCondLst>
+                                            <p:cond delay="0"/>
+                                          </p:stCondLst>
+                                        </p:cTn>
+                                        <p:tgtEl>
+                                          <p:spTgt spid="3">
+                                            <p:txEl>
+                                              <p:pRg st="10" end="10"/>
+                                            </p:txEl>
+                                          </p:spTgt>
+                                        </p:tgtEl>
+                                        <p:attrNameLst>
+                                          <p:attrName>style.visibility</p:attrName>
+                                        </p:attrNameLst>
+                                      </p:cBhvr>
+                                      <p:to>
+                                        <p:strVal val="visible"/>
+                                      </p:to>
+                                    </p:set>
+                                  </p:childTnLst>
+                                </p:cTn>
+                              </p:par>
+                            </p:childTnLst>
+                          </p:cTn>
+                        </p:par>
+                      </p:childTnLst>
+                    </p:cTn>
+                  </p:par>
+                  <p:par>
+                    <p:cTn id="39" fill="hold">
+                      <p:stCondLst>
+                        <p:cond delay="indefinite"/>
+                      </p:stCondLst>
+                      <p:childTnLst>
+                        <p:par>
+                          <p:cTn id="40" fill="hold">
+                            <p:stCondLst>
+                              <p:cond delay="0"/>
+                            </p:stCondLst>
+                            <p:childTnLst>
+                              <p:par>
+                                <p:cTn id="41" presetID="1" presetClass="entr" presetSubtype="0" fill="hold" grpId="0" nodeType="clickEffect">
+                                  <p:stCondLst>
+                                    <p:cond delay="0"/>
+                                  </p:stCondLst>
+                                  <p:childTnLst>
+                                    <p:set>
+                                      <p:cBhvr>
+                                        <p:cTn id="42" dur="1" fill="hold">
+                                          <p:stCondLst>
+                                            <p:cond delay="0"/>
+                                          </p:stCondLst>
+                                        </p:cTn>
+                                        <p:tgtEl>
+                                          <p:spTgt spid="5"/>
+                                        </p:tgtEl>
+                                        <p:attrNameLst>
+                                          <p:attrName>style.visibility</p:attrName>
+                                        </p:attrNameLst>
+                                      </p:cBhvr>
+                                      <p:to>
+                                        <p:strVal val="visible"/>
+                                      </p:to>
+                                    </p:set>
+                                  </p:childTnLst>
+                                </p:cTn>
+                              </p:par>
+                            </p:childTnLst>
+                          </p:cTn>
+                        </p:par>
+                      </p:childTnLst>
+                    </p:cTn>
+                  </p:par>
+                </p:childTnLst>
+              </p:cTn>
+              <p:prevCondLst>
+                <p:cond evt="onPrev" delay="0">
+                  <p:tgtEl>
+                    <p:sldTgt/>
+                  </p:tgtEl>
+                </p:cond>
+              </p:prevCondLst>
+              <p:nextCondLst>
+                <p:cond evt="onNext" delay="0">
+                  <p:tgtEl>
+                    <p:sldTgt/>
+                  </p:tgtEl>
+                </p:cond>
+              </p:nextCondLst>
+            </p:seq>
+          </p:childTnLst>
+        </p:cTn>
+      </p:par>
+    </p:tnLst>
+    <p:bldLst>
+      <p:bldP spid="5" grpId="0"/>
+    </p:bldLst>
+  </p:timing>
+</p:sld>
+</file>
+
+<file path=ppt/slides/slide11.xml><?xml version="1.0" encoding="utf-8"?>
+<p:sld xmlns:a="http://schemas.openxmlformats.org/drawingml/2006/main" xmlns:r="http://schemas.openxmlformats.org/officeDocument/2006/relationships" xmlns:p="http://schemas.openxmlformats.org/presentationml/2006/main">
+  <p:cSld>
+    <p:spTree>
+      <p:nvGrpSpPr>
+        <p:cNvPr id="1" name=""/>
+        <p:cNvGrpSpPr/>
+        <p:nvPr/>
+      </p:nvGrpSpPr>
+      <p:grpSpPr>
+        <a:xfrm>
+          <a:off x="0" y="0"/>
+          <a:ext cx="0" cy="0"/>
+          <a:chOff x="0" y="0"/>
+          <a:chExt cx="0" cy="0"/>
+        </a:xfrm>
+      </p:grpSpPr>
+      <p:sp>
+        <p:nvSpPr>
+          <p:cNvPr id="2" name="Title 1">
+            <a:extLst>
+              <a:ext uri="{FF2B5EF4-FFF2-40B4-BE49-F238E27FC236}">
+                <a16:creationId xmlns:a16="http://schemas.microsoft.com/office/drawing/2014/main" id="{222AD774-FCE6-3D43-820B-0AC918AD5578}"/>
+              </a:ext>
+            </a:extLst>
+          </p:cNvPr>
+          <p:cNvSpPr>
+            <a:spLocks noGrp="1"/>
+          </p:cNvSpPr>
+          <p:nvPr>
+            <p:ph type="title"/>
+          </p:nvPr>
+        </p:nvSpPr>
+        <p:spPr/>
+        <p:txBody>
+          <a:bodyPr/>
+          <a:lstStyle/>
+          <a:p>
+            <a:r>
+              <a:rPr lang="en-US" dirty="0"/>
+              <a:t>One more thing</a:t>
+            </a:r>
+          </a:p>
+        </p:txBody>
+      </p:sp>
+      <p:sp>
+        <p:nvSpPr>
+          <p:cNvPr id="3" name="Content Placeholder 2">
+            <a:extLst>
+              <a:ext uri="{FF2B5EF4-FFF2-40B4-BE49-F238E27FC236}">
+                <a16:creationId xmlns:a16="http://schemas.microsoft.com/office/drawing/2014/main" id="{899E558C-FB65-FD42-8A7C-FD84E186DFBF}"/>
+              </a:ext>
+            </a:extLst>
+          </p:cNvPr>
+          <p:cNvSpPr>
+            <a:spLocks noGrp="1"/>
+          </p:cNvSpPr>
+          <p:nvPr>
+            <p:ph idx="1"/>
+          </p:nvPr>
+        </p:nvSpPr>
+        <p:spPr/>
+        <p:txBody>
+          <a:bodyPr>
+            <a:normAutofit fontScale="92500" lnSpcReduction="20000"/>
+          </a:bodyPr>
+          <a:lstStyle/>
+          <a:p>
+            <a:r>
+              <a:rPr lang="en-US" dirty="0"/>
+              <a:t>TOSTER has functions for:</a:t>
+            </a:r>
+          </a:p>
+          <a:p>
+            <a:pPr lvl="1"/>
+            <a:r>
+              <a:rPr lang="en-US" dirty="0"/>
+              <a:t>one-sample t-test</a:t>
+            </a:r>
+          </a:p>
+          <a:p>
+            <a:pPr lvl="1"/>
+            <a:r>
+              <a:rPr lang="en-US" dirty="0"/>
+              <a:t>two-sample t-test</a:t>
+            </a:r>
+          </a:p>
+          <a:p>
+            <a:pPr lvl="1"/>
+            <a:r>
+              <a:rPr lang="en-US" dirty="0"/>
+              <a:t>proportion test</a:t>
+            </a:r>
+          </a:p>
+          <a:p>
+            <a:pPr lvl="1"/>
+            <a:r>
+              <a:rPr lang="en-US" dirty="0"/>
+              <a:t>correlation (r)</a:t>
+            </a:r>
+          </a:p>
+          <a:p>
+            <a:pPr lvl="1"/>
+            <a:r>
+              <a:rPr lang="en-US" dirty="0"/>
+              <a:t>meta analysis</a:t>
+            </a:r>
+          </a:p>
+          <a:p>
+            <a:r>
+              <a:rPr lang="en-US" dirty="0"/>
+              <a:t>I will forever look at the 95% confidence interval as the TOST equivalence bound at alpha=.025</a:t>
+            </a:r>
+          </a:p>
+          <a:p>
+            <a:r>
+              <a:rPr lang="en-US" dirty="0"/>
+              <a:t>Predefining an equivalence bound </a:t>
+            </a:r>
+            <a:r>
+              <a:rPr lang="en-US" i="1" dirty="0"/>
+              <a:t>a priori</a:t>
+            </a:r>
+            <a:r>
+              <a:rPr lang="en-US" dirty="0"/>
+              <a:t> is a specific test of a hypothesis. A succinct framing of the question.</a:t>
+            </a:r>
+          </a:p>
+        </p:txBody>
+      </p:sp>
+      <p:sp>
+        <p:nvSpPr>
+          <p:cNvPr id="4" name="Slide Number Placeholder 3">
+            <a:extLst>
+              <a:ext uri="{FF2B5EF4-FFF2-40B4-BE49-F238E27FC236}">
+                <a16:creationId xmlns:a16="http://schemas.microsoft.com/office/drawing/2014/main" id="{6B098D21-5DF7-F44C-9137-3AB46CD7E2CF}"/>
+              </a:ext>
+            </a:extLst>
+          </p:cNvPr>
+          <p:cNvSpPr>
+            <a:spLocks noGrp="1"/>
+          </p:cNvSpPr>
+          <p:nvPr>
+            <p:ph type="sldNum" sz="quarter" idx="12"/>
+          </p:nvPr>
+        </p:nvSpPr>
+        <p:spPr/>
+        <p:txBody>
+          <a:bodyPr/>
+          <a:lstStyle/>
+          <a:p>
+            <a:fld id="{C5EF2332-01BF-834F-8236-50238282D533}" type="slidenum">
+              <a:rPr lang="en-US" smtClean="0"/>
+              <a:t>11</a:t>
+            </a:fld>
+            <a:endParaRPr lang="en-US"/>
+          </a:p>
+        </p:txBody>
+      </p:sp>
+    </p:spTree>
+    <p:extLst>
+      <p:ext uri="{BB962C8B-B14F-4D97-AF65-F5344CB8AC3E}">
+        <p14:creationId xmlns:p14="http://schemas.microsoft.com/office/powerpoint/2010/main" val="845868652"/>
+      </p:ext>
+    </p:extLst>
+  </p:cSld>
+  <p:clrMapOvr>
+    <a:masterClrMapping/>
+  </p:clrMapOvr>
+  <p:timing>
+    <p:tnLst>
+      <p:par>
+        <p:cTn id="1" dur="indefinite" restart="never" nodeType="tmRoot">
+          <p:childTnLst>
+            <p:seq concurrent="1" nextAc="seek">
+              <p:cTn id="2" dur="indefinite" nodeType="mainSeq">
+                <p:childTnLst>
+                  <p:par>
+                    <p:cTn id="3" fill="hold">
+                      <p:stCondLst>
+                        <p:cond delay="indefinite"/>
+                      </p:stCondLst>
+                      <p:childTnLst>
+                        <p:par>
+                          <p:cTn id="4" fill="hold">
+                            <p:stCondLst>
+                              <p:cond delay="0"/>
+                            </p:stCondLst>
+                            <p:childTnLst>
+                              <p:par>
+                                <p:cTn id="5" presetID="1" presetClass="entr" presetSubtype="0" fill="hold" grpId="0" nodeType="clickEffect">
+                                  <p:stCondLst>
+                                    <p:cond delay="0"/>
+                                  </p:stCondLst>
+                                  <p:childTnLst>
+                                    <p:set>
+                                      <p:cBhvr>
+                                        <p:cTn id="6" dur="1" fill="hold">
+                                          <p:stCondLst>
+                                            <p:cond delay="0"/>
+                                          </p:stCondLst>
+                                        </p:cTn>
+                                        <p:tgtEl>
+                                          <p:spTgt spid="3">
+                                            <p:txEl>
+                                              <p:pRg st="0" end="0"/>
+                                            </p:txEl>
+                                          </p:spTgt>
+                                        </p:tgtEl>
+                                        <p:attrNameLst>
+                                          <p:attrName>style.visibility</p:attrName>
+                                        </p:attrNameLst>
+                                      </p:cBhvr>
+                                      <p:to>
+                                        <p:strVal val="visible"/>
+                                      </p:to>
+                                    </p:set>
+                                  </p:childTnLst>
+                                </p:cTn>
+                              </p:par>
+                              <p:par>
+                                <p:cTn id="7" presetID="1" presetClass="entr" presetSubtype="0" fill="hold" grpId="0" nodeType="withEffect">
+                                  <p:stCondLst>
+                                    <p:cond delay="0"/>
+                                  </p:stCondLst>
+                                  <p:childTnLst>
+                                    <p:set>
+                                      <p:cBhvr>
+                                        <p:cTn id="8" dur="1" fill="hold">
+                                          <p:stCondLst>
+                                            <p:cond delay="0"/>
+                                          </p:stCondLst>
+                                        </p:cTn>
+                                        <p:tgtEl>
+                                          <p:spTgt spid="3">
+                                            <p:txEl>
+                                              <p:pRg st="1" end="1"/>
+                                            </p:txEl>
+                                          </p:spTgt>
+                                        </p:tgtEl>
+                                        <p:attrNameLst>
+                                          <p:attrName>style.visibility</p:attrName>
+                                        </p:attrNameLst>
+                                      </p:cBhvr>
+                                      <p:to>
+                                        <p:strVal val="visible"/>
+                                      </p:to>
+                                    </p:set>
+                                  </p:childTnLst>
+                                </p:cTn>
+                              </p:par>
+                              <p:par>
+                                <p:cTn id="9" presetID="1" presetClass="entr" presetSubtype="0" fill="hold" grpId="0" nodeType="withEffect">
+                                  <p:stCondLst>
+                                    <p:cond delay="0"/>
+                                  </p:stCondLst>
+                                  <p:childTnLst>
+                                    <p:set>
+                                      <p:cBhvr>
+                                        <p:cTn id="10" dur="1" fill="hold">
+                                          <p:stCondLst>
+                                            <p:cond delay="0"/>
+                                          </p:stCondLst>
+                                        </p:cTn>
+                                        <p:tgtEl>
+                                          <p:spTgt spid="3">
+                                            <p:txEl>
+                                              <p:pRg st="2" end="2"/>
+                                            </p:txEl>
+                                          </p:spTgt>
+                                        </p:tgtEl>
+                                        <p:attrNameLst>
+                                          <p:attrName>style.visibility</p:attrName>
+                                        </p:attrNameLst>
+                                      </p:cBhvr>
+                                      <p:to>
+                                        <p:strVal val="visible"/>
+                                      </p:to>
+                                    </p:set>
+                                  </p:childTnLst>
+                                </p:cTn>
+                              </p:par>
+                              <p:par>
+                                <p:cTn id="11" presetID="1" presetClass="entr" presetSubtype="0" fill="hold" grpId="0" nodeType="withEffect">
+                                  <p:stCondLst>
+                                    <p:cond delay="0"/>
+                                  </p:stCondLst>
+                                  <p:childTnLst>
+                                    <p:set>
+                                      <p:cBhvr>
+                                        <p:cTn id="12" dur="1" fill="hold">
+                                          <p:stCondLst>
+                                            <p:cond delay="0"/>
+                                          </p:stCondLst>
+                                        </p:cTn>
+                                        <p:tgtEl>
+                                          <p:spTgt spid="3">
+                                            <p:txEl>
+                                              <p:pRg st="3" end="3"/>
+                                            </p:txEl>
+                                          </p:spTgt>
+                                        </p:tgtEl>
+                                        <p:attrNameLst>
+                                          <p:attrName>style.visibility</p:attrName>
+                                        </p:attrNameLst>
+                                      </p:cBhvr>
+                                      <p:to>
+                                        <p:strVal val="visible"/>
+                                      </p:to>
+                                    </p:set>
+                                  </p:childTnLst>
+                                </p:cTn>
+                              </p:par>
+                              <p:par>
+                                <p:cTn id="13" presetID="1" presetClass="entr" presetSubtype="0" fill="hold" grpId="0" nodeType="withEffect">
+                                  <p:stCondLst>
+                                    <p:cond delay="0"/>
+                                  </p:stCondLst>
+                                  <p:childTnLst>
+                                    <p:set>
+                                      <p:cBhvr>
+                                        <p:cTn id="14" dur="1" fill="hold">
+                                          <p:stCondLst>
+                                            <p:cond delay="0"/>
+                                          </p:stCondLst>
+                                        </p:cTn>
+                                        <p:tgtEl>
+                                          <p:spTgt spid="3">
+                                            <p:txEl>
+                                              <p:pRg st="4" end="4"/>
+                                            </p:txEl>
+                                          </p:spTgt>
+                                        </p:tgtEl>
+                                        <p:attrNameLst>
+                                          <p:attrName>style.visibility</p:attrName>
+                                        </p:attrNameLst>
+                                      </p:cBhvr>
+                                      <p:to>
+                                        <p:strVal val="visible"/>
+                                      </p:to>
+                                    </p:set>
+                                  </p:childTnLst>
+                                </p:cTn>
+                              </p:par>
+                              <p:par>
+                                <p:cTn id="15" presetID="1" presetClass="entr" presetSubtype="0" fill="hold" grpId="0" nodeType="withEffect">
+                                  <p:stCondLst>
+                                    <p:cond delay="0"/>
+                                  </p:stCondLst>
+                                  <p:childTnLst>
+                                    <p:set>
+                                      <p:cBhvr>
+                                        <p:cTn id="16" dur="1" fill="hold">
+                                          <p:stCondLst>
+                                            <p:cond delay="0"/>
+                                          </p:stCondLst>
+                                        </p:cTn>
+                                        <p:tgtEl>
+                                          <p:spTgt spid="3">
+                                            <p:txEl>
+                                              <p:pRg st="5" end="5"/>
+                                            </p:txEl>
+                                          </p:spTgt>
+                                        </p:tgtEl>
+                                        <p:attrNameLst>
+                                          <p:attrName>style.visibility</p:attrName>
+                                        </p:attrNameLst>
+                                      </p:cBhvr>
+                                      <p:to>
+                                        <p:strVal val="visible"/>
+                                      </p:to>
+                                    </p:set>
+                                  </p:childTnLst>
+                                </p:cTn>
+                              </p:par>
+                            </p:childTnLst>
+                          </p:cTn>
+                        </p:par>
+                      </p:childTnLst>
+                    </p:cTn>
+                  </p:par>
+                  <p:par>
+                    <p:cTn id="17" fill="hold">
+                      <p:stCondLst>
+                        <p:cond delay="indefinite"/>
+                      </p:stCondLst>
+                      <p:childTnLst>
+                        <p:par>
+                          <p:cTn id="18" fill="hold">
+                            <p:stCondLst>
+                              <p:cond delay="0"/>
+                            </p:stCondLst>
+                            <p:childTnLst>
+                              <p:par>
+                                <p:cTn id="19" presetID="1" presetClass="entr" presetSubtype="0" fill="hold" grpId="0" nodeType="clickEffect">
+                                  <p:stCondLst>
+                                    <p:cond delay="0"/>
+                                  </p:stCondLst>
+                                  <p:childTnLst>
+                                    <p:set>
+                                      <p:cBhvr>
+                                        <p:cTn id="20" dur="1" fill="hold">
+                                          <p:stCondLst>
+                                            <p:cond delay="0"/>
+                                          </p:stCondLst>
+                                        </p:cTn>
+                                        <p:tgtEl>
+                                          <p:spTgt spid="3">
+                                            <p:txEl>
+                                              <p:pRg st="6" end="6"/>
+                                            </p:txEl>
+                                          </p:spTgt>
+                                        </p:tgtEl>
+                                        <p:attrNameLst>
+                                          <p:attrName>style.visibility</p:attrName>
+                                        </p:attrNameLst>
+                                      </p:cBhvr>
+                                      <p:to>
+                                        <p:strVal val="visible"/>
+                                      </p:to>
+                                    </p:set>
+                                  </p:childTnLst>
+                                </p:cTn>
+                              </p:par>
+                            </p:childTnLst>
+                          </p:cTn>
+                        </p:par>
+                      </p:childTnLst>
+                    </p:cTn>
+                  </p:par>
+                  <p:par>
+                    <p:cTn id="21" fill="hold">
+                      <p:stCondLst>
+                        <p:cond delay="indefinite"/>
+                      </p:stCondLst>
+                      <p:childTnLst>
+                        <p:par>
+                          <p:cTn id="22" fill="hold">
+                            <p:stCondLst>
+                              <p:cond delay="0"/>
+                            </p:stCondLst>
+                            <p:childTnLst>
+                              <p:par>
+                                <p:cTn id="23" presetID="1" presetClass="entr" presetSubtype="0" fill="hold" grpId="0" nodeType="clickEffect">
+                                  <p:stCondLst>
+                                    <p:cond delay="0"/>
+                                  </p:stCondLst>
+                                  <p:childTnLst>
+                                    <p:set>
+                                      <p:cBhvr>
+                                        <p:cTn id="24" dur="1" fill="hold">
+                                          <p:stCondLst>
+                                            <p:cond delay="0"/>
+                                          </p:stCondLst>
+                                        </p:cTn>
+                                        <p:tgtEl>
+                                          <p:spTgt spid="3">
+                                            <p:txEl>
+                                              <p:pRg st="7" end="7"/>
+                                            </p:txEl>
+                                          </p:spTgt>
+                                        </p:tgtEl>
+                                        <p:attrNameLst>
+                                          <p:attrName>style.visibility</p:attrName>
+                                        </p:attrNameLst>
+                                      </p:cBhvr>
+                                      <p:to>
+                                        <p:strVal val="visible"/>
+                                      </p:to>
+                                    </p:set>
+                                  </p:childTnLst>
+                                </p:cTn>
+                              </p:par>
+                            </p:childTnLst>
+                          </p:cTn>
+                        </p:par>
+                      </p:childTnLst>
+                    </p:cTn>
+                  </p:par>
+                </p:childTnLst>
+              </p:cTn>
+              <p:prevCondLst>
+                <p:cond evt="onPrev" delay="0">
+                  <p:tgtEl>
+                    <p:sldTgt/>
+                  </p:tgtEl>
+                </p:cond>
+              </p:prevCondLst>
+              <p:nextCondLst>
+                <p:cond evt="onNext" delay="0">
+                  <p:tgtEl>
+                    <p:sldTgt/>
+                  </p:tgtEl>
+                </p:cond>
+              </p:nextCondLst>
+            </p:seq>
+          </p:childTnLst>
+        </p:cTn>
+      </p:par>
+    </p:tnLst>
+    <p:bldLst>
+      <p:bldP spid="3" grpId="0" build="p"/>
+    </p:bldLst>
+  </p:timing>
 </p:sld>
 </file>
 
@@ -3451,13 +4954,18 @@
             </a:r>
             <a:r>
               <a:rPr lang="en-US" i="1" dirty="0"/>
-              <a:t>?</a:t>
-            </a:r>
-          </a:p>
-          <a:p>
+              <a:t>? No?</a:t>
+            </a:r>
             <a:r>
               <a:rPr lang="en-US" dirty="0"/>
-              <a:t>No. Hypothesis testing can only reject, based on low probability of a hypothesis.</a:t>
+              <a:t> Why the H naught?</a:t>
+            </a:r>
+            <a:endParaRPr lang="en-US" i="1" dirty="0"/>
+          </a:p>
+          <a:p>
+            <a:r>
+              <a:rPr lang="en-US" dirty="0"/>
+              <a:t>Hypothesis testing can only reject based on low probability of a hypothesis.</a:t>
             </a:r>
           </a:p>
           <a:p>
@@ -3863,6 +5371,35 @@
           </a:graphicData>
         </a:graphic>
       </p:graphicFrame>
+      <p:sp>
+        <p:nvSpPr>
+          <p:cNvPr id="4" name="Slide Number Placeholder 3">
+            <a:extLst>
+              <a:ext uri="{FF2B5EF4-FFF2-40B4-BE49-F238E27FC236}">
+                <a16:creationId xmlns:a16="http://schemas.microsoft.com/office/drawing/2014/main" id="{01E80DCE-A481-964A-9290-00ECAF4ABA48}"/>
+              </a:ext>
+            </a:extLst>
+          </p:cNvPr>
+          <p:cNvSpPr>
+            <a:spLocks noGrp="1"/>
+          </p:cNvSpPr>
+          <p:nvPr>
+            <p:ph type="sldNum" sz="quarter" idx="12"/>
+          </p:nvPr>
+        </p:nvSpPr>
+        <p:spPr/>
+        <p:txBody>
+          <a:bodyPr/>
+          <a:lstStyle/>
+          <a:p>
+            <a:fld id="{C5EF2332-01BF-834F-8236-50238282D533}" type="slidenum">
+              <a:rPr lang="en-US" smtClean="0"/>
+              <a:t>2</a:t>
+            </a:fld>
+            <a:endParaRPr lang="en-US"/>
+          </a:p>
+        </p:txBody>
+      </p:sp>
     </p:spTree>
     <p:extLst>
       <p:ext uri="{BB962C8B-B14F-4D97-AF65-F5344CB8AC3E}">
@@ -4271,6 +5808,35 @@
           </a:ln>
         </p:spPr>
       </p:pic>
+      <p:sp>
+        <p:nvSpPr>
+          <p:cNvPr id="3" name="Slide Number Placeholder 2">
+            <a:extLst>
+              <a:ext uri="{FF2B5EF4-FFF2-40B4-BE49-F238E27FC236}">
+                <a16:creationId xmlns:a16="http://schemas.microsoft.com/office/drawing/2014/main" id="{47373146-C193-0B42-BF0C-2236D63C14A4}"/>
+              </a:ext>
+            </a:extLst>
+          </p:cNvPr>
+          <p:cNvSpPr>
+            <a:spLocks noGrp="1"/>
+          </p:cNvSpPr>
+          <p:nvPr>
+            <p:ph type="sldNum" sz="quarter" idx="12"/>
+          </p:nvPr>
+        </p:nvSpPr>
+        <p:spPr/>
+        <p:txBody>
+          <a:bodyPr/>
+          <a:lstStyle/>
+          <a:p>
+            <a:fld id="{C5EF2332-01BF-834F-8236-50238282D533}" type="slidenum">
+              <a:rPr lang="en-US" smtClean="0"/>
+              <a:t>3</a:t>
+            </a:fld>
+            <a:endParaRPr lang="en-US"/>
+          </a:p>
+        </p:txBody>
+      </p:sp>
     </p:spTree>
   </p:cSld>
   <p:clrMapOvr>
@@ -4407,6 +5973,35 @@
               </a:rPr>
               <a:t>observed difference</a:t>
             </a:r>
+          </a:p>
+        </p:txBody>
+      </p:sp>
+      <p:sp>
+        <p:nvSpPr>
+          <p:cNvPr id="6" name="Slide Number Placeholder 5">
+            <a:extLst>
+              <a:ext uri="{FF2B5EF4-FFF2-40B4-BE49-F238E27FC236}">
+                <a16:creationId xmlns:a16="http://schemas.microsoft.com/office/drawing/2014/main" id="{0FD15233-CA69-8647-B4D4-618423CBF3EA}"/>
+              </a:ext>
+            </a:extLst>
+          </p:cNvPr>
+          <p:cNvSpPr>
+            <a:spLocks noGrp="1"/>
+          </p:cNvSpPr>
+          <p:nvPr>
+            <p:ph type="sldNum" sz="quarter" idx="12"/>
+          </p:nvPr>
+        </p:nvSpPr>
+        <p:spPr/>
+        <p:txBody>
+          <a:bodyPr/>
+          <a:lstStyle/>
+          <a:p>
+            <a:fld id="{C5EF2332-01BF-834F-8236-50238282D533}" type="slidenum">
+              <a:rPr lang="en-US" smtClean="0"/>
+              <a:t>4</a:t>
+            </a:fld>
+            <a:endParaRPr lang="en-US"/>
           </a:p>
         </p:txBody>
       </p:sp>
@@ -4649,7 +6244,7 @@
             </a:pPr>
             <a:r>
               <a:rPr lang="en-US" sz="2400" dirty="0"/>
-              <a:t>*Caveat: You must define an equivalence range.</a:t>
+              <a:t>*Caveat: You must define an equivalence range. We’re using ±1</a:t>
             </a:r>
           </a:p>
         </p:txBody>
@@ -4726,6 +6321,35 @@
               </a:rPr>
               <a:t>observed difference</a:t>
             </a:r>
+          </a:p>
+        </p:txBody>
+      </p:sp>
+      <p:sp>
+        <p:nvSpPr>
+          <p:cNvPr id="7" name="Slide Number Placeholder 6">
+            <a:extLst>
+              <a:ext uri="{FF2B5EF4-FFF2-40B4-BE49-F238E27FC236}">
+                <a16:creationId xmlns:a16="http://schemas.microsoft.com/office/drawing/2014/main" id="{AF0FA4D4-496E-674A-9C0D-8DA42A215BED}"/>
+              </a:ext>
+            </a:extLst>
+          </p:cNvPr>
+          <p:cNvSpPr>
+            <a:spLocks noGrp="1"/>
+          </p:cNvSpPr>
+          <p:nvPr>
+            <p:ph type="sldNum" sz="quarter" idx="12"/>
+          </p:nvPr>
+        </p:nvSpPr>
+        <p:spPr/>
+        <p:txBody>
+          <a:bodyPr/>
+          <a:lstStyle/>
+          <a:p>
+            <a:fld id="{C5EF2332-01BF-834F-8236-50238282D533}" type="slidenum">
+              <a:rPr lang="en-US" smtClean="0"/>
+              <a:t>5</a:t>
+            </a:fld>
+            <a:endParaRPr lang="en-US"/>
           </a:p>
         </p:txBody>
       </p:sp>
@@ -5439,6 +7063,35 @@
           </a:p>
         </p:txBody>
       </p:sp>
+      <p:sp>
+        <p:nvSpPr>
+          <p:cNvPr id="29" name="Slide Number Placeholder 28">
+            <a:extLst>
+              <a:ext uri="{FF2B5EF4-FFF2-40B4-BE49-F238E27FC236}">
+                <a16:creationId xmlns:a16="http://schemas.microsoft.com/office/drawing/2014/main" id="{0EE1FACC-9578-7743-8363-6259B59A2557}"/>
+              </a:ext>
+            </a:extLst>
+          </p:cNvPr>
+          <p:cNvSpPr>
+            <a:spLocks noGrp="1"/>
+          </p:cNvSpPr>
+          <p:nvPr>
+            <p:ph type="sldNum" sz="quarter" idx="12"/>
+          </p:nvPr>
+        </p:nvSpPr>
+        <p:spPr/>
+        <p:txBody>
+          <a:bodyPr/>
+          <a:lstStyle/>
+          <a:p>
+            <a:fld id="{C5EF2332-01BF-834F-8236-50238282D533}" type="slidenum">
+              <a:rPr lang="en-US" smtClean="0"/>
+              <a:t>6</a:t>
+            </a:fld>
+            <a:endParaRPr lang="en-US"/>
+          </a:p>
+        </p:txBody>
+      </p:sp>
     </p:spTree>
     <p:extLst>
       <p:ext uri="{BB962C8B-B14F-4D97-AF65-F5344CB8AC3E}">
@@ -5769,6 +7422,35 @@
           </a:p>
         </p:txBody>
       </p:sp>
+      <p:sp>
+        <p:nvSpPr>
+          <p:cNvPr id="2" name="Slide Number Placeholder 1">
+            <a:extLst>
+              <a:ext uri="{FF2B5EF4-FFF2-40B4-BE49-F238E27FC236}">
+                <a16:creationId xmlns:a16="http://schemas.microsoft.com/office/drawing/2014/main" id="{13D9B04E-8410-894D-97BB-39BD727B0EC3}"/>
+              </a:ext>
+            </a:extLst>
+          </p:cNvPr>
+          <p:cNvSpPr>
+            <a:spLocks noGrp="1"/>
+          </p:cNvSpPr>
+          <p:nvPr>
+            <p:ph type="sldNum" sz="quarter" idx="12"/>
+          </p:nvPr>
+        </p:nvSpPr>
+        <p:spPr/>
+        <p:txBody>
+          <a:bodyPr/>
+          <a:lstStyle/>
+          <a:p>
+            <a:fld id="{C5EF2332-01BF-834F-8236-50238282D533}" type="slidenum">
+              <a:rPr lang="en-US" smtClean="0"/>
+              <a:t>7</a:t>
+            </a:fld>
+            <a:endParaRPr lang="en-US"/>
+          </a:p>
+        </p:txBody>
+      </p:sp>
     </p:spTree>
   </p:cSld>
   <p:clrMapOvr>
@@ -5778,7 +7460,7 @@
 </file>
 
 <file path=ppt/slides/slide8.xml><?xml version="1.0" encoding="utf-8"?>
-<p:sld xmlns:a="http://schemas.openxmlformats.org/drawingml/2006/main" xmlns:r="http://schemas.openxmlformats.org/officeDocument/2006/relationships" xmlns:p="http://schemas.openxmlformats.org/presentationml/2006/main">
+<p:sld xmlns:a="http://schemas.openxmlformats.org/drawingml/2006/main" xmlns:r="http://schemas.openxmlformats.org/officeDocument/2006/relationships" xmlns:p="http://schemas.openxmlformats.org/presentationml/2006/main" show="0">
   <p:cSld>
     <p:spTree>
       <p:nvGrpSpPr>
@@ -6232,6 +7914,35 @@
           </a:graphicData>
         </a:graphic>
       </p:graphicFrame>
+      <p:sp>
+        <p:nvSpPr>
+          <p:cNvPr id="3" name="Slide Number Placeholder 2">
+            <a:extLst>
+              <a:ext uri="{FF2B5EF4-FFF2-40B4-BE49-F238E27FC236}">
+                <a16:creationId xmlns:a16="http://schemas.microsoft.com/office/drawing/2014/main" id="{7622F8C7-849C-0442-BB18-6E707A6F83CD}"/>
+              </a:ext>
+            </a:extLst>
+          </p:cNvPr>
+          <p:cNvSpPr>
+            <a:spLocks noGrp="1"/>
+          </p:cNvSpPr>
+          <p:nvPr>
+            <p:ph type="sldNum" sz="quarter" idx="12"/>
+          </p:nvPr>
+        </p:nvSpPr>
+        <p:spPr/>
+        <p:txBody>
+          <a:bodyPr/>
+          <a:lstStyle/>
+          <a:p>
+            <a:fld id="{C5EF2332-01BF-834F-8236-50238282D533}" type="slidenum">
+              <a:rPr lang="en-US" smtClean="0"/>
+              <a:t>8</a:t>
+            </a:fld>
+            <a:endParaRPr lang="en-US"/>
+          </a:p>
+        </p:txBody>
+      </p:sp>
     </p:spTree>
   </p:cSld>
   <p:clrMapOvr>
@@ -6528,6 +8239,35 @@
           </a:graphicData>
         </a:graphic>
       </p:graphicFrame>
+      <p:sp>
+        <p:nvSpPr>
+          <p:cNvPr id="5" name="Slide Number Placeholder 4">
+            <a:extLst>
+              <a:ext uri="{FF2B5EF4-FFF2-40B4-BE49-F238E27FC236}">
+                <a16:creationId xmlns:a16="http://schemas.microsoft.com/office/drawing/2014/main" id="{B59172E5-943E-8B4E-9B59-EF261015205F}"/>
+              </a:ext>
+            </a:extLst>
+          </p:cNvPr>
+          <p:cNvSpPr>
+            <a:spLocks noGrp="1"/>
+          </p:cNvSpPr>
+          <p:nvPr>
+            <p:ph type="sldNum" sz="quarter" idx="12"/>
+          </p:nvPr>
+        </p:nvSpPr>
+        <p:spPr/>
+        <p:txBody>
+          <a:bodyPr/>
+          <a:lstStyle/>
+          <a:p>
+            <a:fld id="{C5EF2332-01BF-834F-8236-50238282D533}" type="slidenum">
+              <a:rPr lang="en-US" smtClean="0"/>
+              <a:t>9</a:t>
+            </a:fld>
+            <a:endParaRPr lang="en-US"/>
+          </a:p>
+        </p:txBody>
+      </p:sp>
     </p:spTree>
     <p:extLst>
       <p:ext uri="{BB962C8B-B14F-4D97-AF65-F5344CB8AC3E}">
@@ -6859,4 +8599,299 @@
   </a:objectDefaults>
   <a:extraClrSchemeLst/>
 </a:theme>
+</file>
+
+<file path=ppt/theme/theme2.xml><?xml version="1.0" encoding="utf-8"?>
+<a:theme xmlns:a="http://schemas.openxmlformats.org/drawingml/2006/main" name="Office Theme">
+  <a:themeElements>
+    <a:clrScheme name="Office">
+      <a:dk1>
+        <a:sysClr val="windowText" lastClr="000000"/>
+      </a:dk1>
+      <a:lt1>
+        <a:sysClr val="window" lastClr="FFFFFF"/>
+      </a:lt1>
+      <a:dk2>
+        <a:srgbClr val="44546A"/>
+      </a:dk2>
+      <a:lt2>
+        <a:srgbClr val="E7E6E6"/>
+      </a:lt2>
+      <a:accent1>
+        <a:srgbClr val="4472C4"/>
+      </a:accent1>
+      <a:accent2>
+        <a:srgbClr val="ED7D31"/>
+      </a:accent2>
+      <a:accent3>
+        <a:srgbClr val="A5A5A5"/>
+      </a:accent3>
+      <a:accent4>
+        <a:srgbClr val="FFC000"/>
+      </a:accent4>
+      <a:accent5>
+        <a:srgbClr val="5B9BD5"/>
+      </a:accent5>
+      <a:accent6>
+        <a:srgbClr val="70AD47"/>
+      </a:accent6>
+      <a:hlink>
+        <a:srgbClr val="0563C1"/>
+      </a:hlink>
+      <a:folHlink>
+        <a:srgbClr val="954F72"/>
+      </a:folHlink>
+    </a:clrScheme>
+    <a:fontScheme name="Office">
+      <a:majorFont>
+        <a:latin typeface="Calibri Light" panose="020F0302020204030204"/>
+        <a:ea typeface=""/>
+        <a:cs typeface=""/>
+        <a:font script="Jpan" typeface="游ゴシック Light"/>
+        <a:font script="Hang" typeface="맑은 고딕"/>
+        <a:font script="Hans" typeface="等线 Light"/>
+        <a:font script="Hant" typeface="新細明體"/>
+        <a:font script="Arab" typeface="Times New Roman"/>
+        <a:font script="Hebr" typeface="Times New Roman"/>
+        <a:font script="Thai" typeface="Angsana New"/>
+        <a:font script="Ethi" typeface="Nyala"/>
+        <a:font script="Beng" typeface="Vrinda"/>
+        <a:font script="Gujr" typeface="Shruti"/>
+        <a:font script="Khmr" typeface="MoolBoran"/>
+        <a:font script="Knda" typeface="Tunga"/>
+        <a:font script="Guru" typeface="Raavi"/>
+        <a:font script="Cans" typeface="Euphemia"/>
+        <a:font script="Cher" typeface="Plantagenet Cherokee"/>
+        <a:font script="Yiii" typeface="Microsoft Yi Baiti"/>
+        <a:font script="Tibt" typeface="Microsoft Himalaya"/>
+        <a:font script="Thaa" typeface="MV Boli"/>
+        <a:font script="Deva" typeface="Mangal"/>
+        <a:font script="Telu" typeface="Gautami"/>
+        <a:font script="Taml" typeface="Latha"/>
+        <a:font script="Syrc" typeface="Estrangelo Edessa"/>
+        <a:font script="Orya" typeface="Kalinga"/>
+        <a:font script="Mlym" typeface="Kartika"/>
+        <a:font script="Laoo" typeface="DokChampa"/>
+        <a:font script="Sinh" typeface="Iskoola Pota"/>
+        <a:font script="Mong" typeface="Mongolian Baiti"/>
+        <a:font script="Viet" typeface="Times New Roman"/>
+        <a:font script="Uigh" typeface="Microsoft Uighur"/>
+        <a:font script="Geor" typeface="Sylfaen"/>
+        <a:font script="Armn" typeface="Arial"/>
+        <a:font script="Bugi" typeface="Leelawadee UI"/>
+        <a:font script="Bopo" typeface="Microsoft JhengHei"/>
+        <a:font script="Java" typeface="Javanese Text"/>
+        <a:font script="Lisu" typeface="Segoe UI"/>
+        <a:font script="Mymr" typeface="Myanmar Text"/>
+        <a:font script="Nkoo" typeface="Ebrima"/>
+        <a:font script="Olck" typeface="Nirmala UI"/>
+        <a:font script="Osma" typeface="Ebrima"/>
+        <a:font script="Phag" typeface="Phagspa"/>
+        <a:font script="Syrn" typeface="Estrangelo Edessa"/>
+        <a:font script="Syrj" typeface="Estrangelo Edessa"/>
+        <a:font script="Syre" typeface="Estrangelo Edessa"/>
+        <a:font script="Sora" typeface="Nirmala UI"/>
+        <a:font script="Tale" typeface="Microsoft Tai Le"/>
+        <a:font script="Talu" typeface="Microsoft New Tai Lue"/>
+        <a:font script="Tfng" typeface="Ebrima"/>
+      </a:majorFont>
+      <a:minorFont>
+        <a:latin typeface="Calibri" panose="020F0502020204030204"/>
+        <a:ea typeface=""/>
+        <a:cs typeface=""/>
+        <a:font script="Jpan" typeface="游ゴシック"/>
+        <a:font script="Hang" typeface="맑은 고딕"/>
+        <a:font script="Hans" typeface="等线"/>
+        <a:font script="Hant" typeface="新細明體"/>
+        <a:font script="Arab" typeface="Arial"/>
+        <a:font script="Hebr" typeface="Arial"/>
+        <a:font script="Thai" typeface="Cordia New"/>
+        <a:font script="Ethi" typeface="Nyala"/>
+        <a:font script="Beng" typeface="Vrinda"/>
+        <a:font script="Gujr" typeface="Shruti"/>
+        <a:font script="Khmr" typeface="DaunPenh"/>
+        <a:font script="Knda" typeface="Tunga"/>
+        <a:font script="Guru" typeface="Raavi"/>
+        <a:font script="Cans" typeface="Euphemia"/>
+        <a:font script="Cher" typeface="Plantagenet Cherokee"/>
+        <a:font script="Yiii" typeface="Microsoft Yi Baiti"/>
+        <a:font script="Tibt" typeface="Microsoft Himalaya"/>
+        <a:font script="Thaa" typeface="MV Boli"/>
+        <a:font script="Deva" typeface="Mangal"/>
+        <a:font script="Telu" typeface="Gautami"/>
+        <a:font script="Taml" typeface="Latha"/>
+        <a:font script="Syrc" typeface="Estrangelo Edessa"/>
+        <a:font script="Orya" typeface="Kalinga"/>
+        <a:font script="Mlym" typeface="Kartika"/>
+        <a:font script="Laoo" typeface="DokChampa"/>
+        <a:font script="Sinh" typeface="Iskoola Pota"/>
+        <a:font script="Mong" typeface="Mongolian Baiti"/>
+        <a:font script="Viet" typeface="Arial"/>
+        <a:font script="Uigh" typeface="Microsoft Uighur"/>
+        <a:font script="Geor" typeface="Sylfaen"/>
+        <a:font script="Armn" typeface="Arial"/>
+        <a:font script="Bugi" typeface="Leelawadee UI"/>
+        <a:font script="Bopo" typeface="Microsoft JhengHei"/>
+        <a:font script="Java" typeface="Javanese Text"/>
+        <a:font script="Lisu" typeface="Segoe UI"/>
+        <a:font script="Mymr" typeface="Myanmar Text"/>
+        <a:font script="Nkoo" typeface="Ebrima"/>
+        <a:font script="Olck" typeface="Nirmala UI"/>
+        <a:font script="Osma" typeface="Ebrima"/>
+        <a:font script="Phag" typeface="Phagspa"/>
+        <a:font script="Syrn" typeface="Estrangelo Edessa"/>
+        <a:font script="Syrj" typeface="Estrangelo Edessa"/>
+        <a:font script="Syre" typeface="Estrangelo Edessa"/>
+        <a:font script="Sora" typeface="Nirmala UI"/>
+        <a:font script="Tale" typeface="Microsoft Tai Le"/>
+        <a:font script="Talu" typeface="Microsoft New Tai Lue"/>
+        <a:font script="Tfng" typeface="Ebrima"/>
+      </a:minorFont>
+    </a:fontScheme>
+    <a:fmtScheme name="Office">
+      <a:fillStyleLst>
+        <a:solidFill>
+          <a:schemeClr val="phClr"/>
+        </a:solidFill>
+        <a:gradFill rotWithShape="1">
+          <a:gsLst>
+            <a:gs pos="0">
+              <a:schemeClr val="phClr">
+                <a:lumMod val="110000"/>
+                <a:satMod val="105000"/>
+                <a:tint val="67000"/>
+              </a:schemeClr>
+            </a:gs>
+            <a:gs pos="50000">
+              <a:schemeClr val="phClr">
+                <a:lumMod val="105000"/>
+                <a:satMod val="103000"/>
+                <a:tint val="73000"/>
+              </a:schemeClr>
+            </a:gs>
+            <a:gs pos="100000">
+              <a:schemeClr val="phClr">
+                <a:lumMod val="105000"/>
+                <a:satMod val="109000"/>
+                <a:tint val="81000"/>
+              </a:schemeClr>
+            </a:gs>
+          </a:gsLst>
+          <a:lin ang="5400000" scaled="0"/>
+        </a:gradFill>
+        <a:gradFill rotWithShape="1">
+          <a:gsLst>
+            <a:gs pos="0">
+              <a:schemeClr val="phClr">
+                <a:satMod val="103000"/>
+                <a:lumMod val="102000"/>
+                <a:tint val="94000"/>
+              </a:schemeClr>
+            </a:gs>
+            <a:gs pos="50000">
+              <a:schemeClr val="phClr">
+                <a:satMod val="110000"/>
+                <a:lumMod val="100000"/>
+                <a:shade val="100000"/>
+              </a:schemeClr>
+            </a:gs>
+            <a:gs pos="100000">
+              <a:schemeClr val="phClr">
+                <a:lumMod val="99000"/>
+                <a:satMod val="120000"/>
+                <a:shade val="78000"/>
+              </a:schemeClr>
+            </a:gs>
+          </a:gsLst>
+          <a:lin ang="5400000" scaled="0"/>
+        </a:gradFill>
+      </a:fillStyleLst>
+      <a:lnStyleLst>
+        <a:ln w="6350" cap="flat" cmpd="sng" algn="ctr">
+          <a:solidFill>
+            <a:schemeClr val="phClr"/>
+          </a:solidFill>
+          <a:prstDash val="solid"/>
+          <a:miter lim="800000"/>
+        </a:ln>
+        <a:ln w="12700" cap="flat" cmpd="sng" algn="ctr">
+          <a:solidFill>
+            <a:schemeClr val="phClr"/>
+          </a:solidFill>
+          <a:prstDash val="solid"/>
+          <a:miter lim="800000"/>
+        </a:ln>
+        <a:ln w="19050" cap="flat" cmpd="sng" algn="ctr">
+          <a:solidFill>
+            <a:schemeClr val="phClr"/>
+          </a:solidFill>
+          <a:prstDash val="solid"/>
+          <a:miter lim="800000"/>
+        </a:ln>
+      </a:lnStyleLst>
+      <a:effectStyleLst>
+        <a:effectStyle>
+          <a:effectLst/>
+        </a:effectStyle>
+        <a:effectStyle>
+          <a:effectLst/>
+        </a:effectStyle>
+        <a:effectStyle>
+          <a:effectLst>
+            <a:outerShdw blurRad="57150" dist="19050" dir="5400000" algn="ctr" rotWithShape="0">
+              <a:srgbClr val="000000">
+                <a:alpha val="63000"/>
+              </a:srgbClr>
+            </a:outerShdw>
+          </a:effectLst>
+        </a:effectStyle>
+      </a:effectStyleLst>
+      <a:bgFillStyleLst>
+        <a:solidFill>
+          <a:schemeClr val="phClr"/>
+        </a:solidFill>
+        <a:solidFill>
+          <a:schemeClr val="phClr">
+            <a:tint val="95000"/>
+            <a:satMod val="170000"/>
+          </a:schemeClr>
+        </a:solidFill>
+        <a:gradFill rotWithShape="1">
+          <a:gsLst>
+            <a:gs pos="0">
+              <a:schemeClr val="phClr">
+                <a:tint val="93000"/>
+                <a:satMod val="150000"/>
+                <a:shade val="98000"/>
+                <a:lumMod val="102000"/>
+              </a:schemeClr>
+            </a:gs>
+            <a:gs pos="50000">
+              <a:schemeClr val="phClr">
+                <a:tint val="98000"/>
+                <a:satMod val="130000"/>
+                <a:shade val="90000"/>
+                <a:lumMod val="103000"/>
+              </a:schemeClr>
+            </a:gs>
+            <a:gs pos="100000">
+              <a:schemeClr val="phClr">
+                <a:shade val="63000"/>
+                <a:satMod val="120000"/>
+              </a:schemeClr>
+            </a:gs>
+          </a:gsLst>
+          <a:lin ang="5400000" scaled="0"/>
+        </a:gradFill>
+      </a:bgFillStyleLst>
+    </a:fmtScheme>
+  </a:themeElements>
+  <a:objectDefaults/>
+  <a:extraClrSchemeLst/>
+  <a:extLst>
+    <a:ext uri="{05A4C25C-085E-4340-85A3-A5531E510DB2}">
+      <thm15:themeFamily xmlns:thm15="http://schemas.microsoft.com/office/thememl/2012/main" name="Office Theme" id="{62F939B6-93AF-4DB8-9C6B-D6C7DFDC589F}" vid="{4A3C46E8-61CC-4603-A589-7422A47A8E4A}"/>
+    </a:ext>
+  </a:extLst>
+</a:theme>
 </file>
</xml_diff>

<commit_message>
Added Workshop intro slide
</commit_message>
<xml_diff>
--- a/adeline/Adeline_TOST_edit.pptx
+++ b/adeline/Adeline_TOST_edit.pptx
@@ -5,20 +5,21 @@
     <p:sldMasterId id="2147483648" r:id="rId1"/>
   </p:sldMasterIdLst>
   <p:notesMasterIdLst>
-    <p:notesMasterId r:id="rId13"/>
+    <p:notesMasterId r:id="rId14"/>
   </p:notesMasterIdLst>
   <p:sldIdLst>
-    <p:sldId id="256" r:id="rId2"/>
-    <p:sldId id="269" r:id="rId3"/>
-    <p:sldId id="258" r:id="rId4"/>
-    <p:sldId id="262" r:id="rId5"/>
-    <p:sldId id="264" r:id="rId6"/>
-    <p:sldId id="268" r:id="rId7"/>
-    <p:sldId id="265" r:id="rId8"/>
-    <p:sldId id="257" r:id="rId9"/>
-    <p:sldId id="270" r:id="rId10"/>
-    <p:sldId id="267" r:id="rId11"/>
-    <p:sldId id="271" r:id="rId12"/>
+    <p:sldId id="272" r:id="rId2"/>
+    <p:sldId id="256" r:id="rId3"/>
+    <p:sldId id="269" r:id="rId4"/>
+    <p:sldId id="258" r:id="rId5"/>
+    <p:sldId id="262" r:id="rId6"/>
+    <p:sldId id="264" r:id="rId7"/>
+    <p:sldId id="268" r:id="rId8"/>
+    <p:sldId id="265" r:id="rId9"/>
+    <p:sldId id="257" r:id="rId10"/>
+    <p:sldId id="270" r:id="rId11"/>
+    <p:sldId id="267" r:id="rId12"/>
+    <p:sldId id="271" r:id="rId13"/>
   </p:sldIdLst>
   <p:sldSz cx="9144000" cy="6858000" type="screen4x3"/>
   <p:notesSz cx="6858000" cy="9144000"/>
@@ -218,7 +219,7 @@
           <a:p>
             <a:fld id="{E266D47B-39A1-7F49-8522-F75EBFC44535}" type="datetimeFigureOut">
               <a:rPr lang="en-US" smtClean="0"/>
-              <a:t>6/16/20</a:t>
+              <a:t>6/17/20</a:t>
             </a:fld>
             <a:endParaRPr lang="en-US"/>
           </a:p>
@@ -664,7 +665,7 @@
           <a:p>
             <a:fld id="{E32DE90A-DAE6-8940-944F-A2716F426D78}" type="datetime1">
               <a:rPr lang="en-US" smtClean="0"/>
-              <a:t>6/16/20</a:t>
+              <a:t>6/17/20</a:t>
             </a:fld>
             <a:endParaRPr lang="en-US"/>
           </a:p>
@@ -832,7 +833,7 @@
           <a:p>
             <a:fld id="{05F31D31-4031-0843-ACCE-5752DA23E4A8}" type="datetime1">
               <a:rPr lang="en-US" smtClean="0"/>
-              <a:t>6/16/20</a:t>
+              <a:t>6/17/20</a:t>
             </a:fld>
             <a:endParaRPr lang="en-US"/>
           </a:p>
@@ -1010,7 +1011,7 @@
           <a:p>
             <a:fld id="{08454EFC-2055-FB41-88EC-3E1BBE43240B}" type="datetime1">
               <a:rPr lang="en-US" smtClean="0"/>
-              <a:t>6/16/20</a:t>
+              <a:t>6/17/20</a:t>
             </a:fld>
             <a:endParaRPr lang="en-US"/>
           </a:p>
@@ -1178,7 +1179,7 @@
           <a:p>
             <a:fld id="{98F8C21C-DA6A-F04A-9A75-37AD5770AA21}" type="datetime1">
               <a:rPr lang="en-US" smtClean="0"/>
-              <a:t>6/16/20</a:t>
+              <a:t>6/17/20</a:t>
             </a:fld>
             <a:endParaRPr lang="en-US"/>
           </a:p>
@@ -1423,7 +1424,7 @@
           <a:p>
             <a:fld id="{7B24982F-DCE5-5749-95D3-8EFC7ABAD800}" type="datetime1">
               <a:rPr lang="en-US" smtClean="0"/>
-              <a:t>6/16/20</a:t>
+              <a:t>6/17/20</a:t>
             </a:fld>
             <a:endParaRPr lang="en-US"/>
           </a:p>
@@ -1708,7 +1709,7 @@
           <a:p>
             <a:fld id="{BE8DDC09-582C-D847-8C4E-51C4A7648ED7}" type="datetime1">
               <a:rPr lang="en-US" smtClean="0"/>
-              <a:t>6/16/20</a:t>
+              <a:t>6/17/20</a:t>
             </a:fld>
             <a:endParaRPr lang="en-US"/>
           </a:p>
@@ -2127,7 +2128,7 @@
           <a:p>
             <a:fld id="{AE41971E-8717-0441-A256-B09A43E8E63E}" type="datetime1">
               <a:rPr lang="en-US" smtClean="0"/>
-              <a:t>6/16/20</a:t>
+              <a:t>6/17/20</a:t>
             </a:fld>
             <a:endParaRPr lang="en-US"/>
           </a:p>
@@ -2244,7 +2245,7 @@
           <a:p>
             <a:fld id="{D96E6D69-62D5-124D-AA64-4C92E99A9820}" type="datetime1">
               <a:rPr lang="en-US" smtClean="0"/>
-              <a:t>6/16/20</a:t>
+              <a:t>6/17/20</a:t>
             </a:fld>
             <a:endParaRPr lang="en-US"/>
           </a:p>
@@ -2339,7 +2340,7 @@
           <a:p>
             <a:fld id="{29A8CA78-8944-0C4A-A6C3-B89414650DDE}" type="datetime1">
               <a:rPr lang="en-US" smtClean="0"/>
-              <a:t>6/16/20</a:t>
+              <a:t>6/17/20</a:t>
             </a:fld>
             <a:endParaRPr lang="en-US"/>
           </a:p>
@@ -2614,7 +2615,7 @@
           <a:p>
             <a:fld id="{7B2E0C6E-27EA-D145-AA00-4BCBE49E470F}" type="datetime1">
               <a:rPr lang="en-US" smtClean="0"/>
-              <a:t>6/16/20</a:t>
+              <a:t>6/17/20</a:t>
             </a:fld>
             <a:endParaRPr lang="en-US"/>
           </a:p>
@@ -2866,7 +2867,7 @@
           <a:p>
             <a:fld id="{33CBAC1E-D494-B948-9F78-150D461BA535}" type="datetime1">
               <a:rPr lang="en-US" smtClean="0"/>
-              <a:t>6/16/20</a:t>
+              <a:t>6/17/20</a:t>
             </a:fld>
             <a:endParaRPr lang="en-US"/>
           </a:p>
@@ -3077,7 +3078,7 @@
           <a:p>
             <a:fld id="{400A4D65-0675-3346-B867-5AE953C8DF1D}" type="datetime1">
               <a:rPr lang="en-US" smtClean="0"/>
-              <a:t>6/16/20</a:t>
+              <a:t>6/17/20</a:t>
             </a:fld>
             <a:endParaRPr lang="en-US"/>
           </a:p>
@@ -3439,6 +3440,14 @@
 <file path=ppt/slides/slide1.xml><?xml version="1.0" encoding="utf-8"?>
 <p:sld xmlns:a="http://schemas.openxmlformats.org/drawingml/2006/main" xmlns:r="http://schemas.openxmlformats.org/officeDocument/2006/relationships" xmlns:p="http://schemas.openxmlformats.org/presentationml/2006/main">
   <p:cSld>
+    <p:bg>
+      <p:bgPr>
+        <a:solidFill>
+          <a:schemeClr val="bg1"/>
+        </a:solidFill>
+        <a:effectLst/>
+      </p:bgPr>
+    </p:bg>
     <p:spTree>
       <p:nvGrpSpPr>
         <p:cNvPr id="1" name=""/>
@@ -3455,64 +3464,233 @@
       </p:grpSpPr>
       <p:sp>
         <p:nvSpPr>
-          <p:cNvPr id="2" name="Title 1"/>
+          <p:cNvPr id="2" name="Title 1">
+            <a:extLst>
+              <a:ext uri="{FF2B5EF4-FFF2-40B4-BE49-F238E27FC236}">
+                <a16:creationId xmlns:a16="http://schemas.microsoft.com/office/drawing/2014/main" id="{3D7F5F06-5B9E-0D42-B550-DAE76725174B}"/>
+              </a:ext>
+            </a:extLst>
+          </p:cNvPr>
           <p:cNvSpPr>
             <a:spLocks noGrp="1"/>
           </p:cNvSpPr>
           <p:nvPr>
-            <p:ph type="ctrTitle"/>
+            <p:ph type="title"/>
           </p:nvPr>
         </p:nvSpPr>
         <p:spPr>
           <a:xfrm>
-            <a:off x="685800" y="2130425"/>
-            <a:ext cx="7772400" cy="1470025"/>
+            <a:off x="438665" y="567143"/>
+            <a:ext cx="6898307" cy="994172"/>
           </a:xfrm>
         </p:spPr>
         <p:txBody>
-          <a:bodyPr/>
+          <a:bodyPr vert="horz" lIns="91440" tIns="45720" rIns="91440" bIns="45720" rtlCol="0" anchor="ctr">
+            <a:noAutofit/>
+          </a:bodyPr>
           <a:lstStyle/>
           <a:p>
-            <a:pPr marL="0" lvl="0" indent="0">
-              <a:buNone/>
+            <a:pPr defTabSz="914400">
+              <a:lnSpc>
+                <a:spcPct val="90000"/>
+              </a:lnSpc>
             </a:pPr>
             <a:r>
-              <a:t>Statistical test for NO difference</a:t>
-            </a:r>
-          </a:p>
-        </p:txBody>
-      </p:sp>
-      <p:sp>
-        <p:nvSpPr>
-          <p:cNvPr id="3" name="Subtitle 2"/>
+              <a:rPr lang="en-US" sz="3600" b="0" kern="1200" dirty="0">
+                <a:solidFill>
+                  <a:schemeClr val="tx1"/>
+                </a:solidFill>
+                <a:latin typeface="+mj-lt"/>
+                <a:ea typeface="+mj-ea"/>
+                <a:cs typeface="+mj-cs"/>
+              </a:rPr>
+              <a:t>Safe Summer Stats Workshop 2020</a:t>
+            </a:r>
+            <a:br>
+              <a:rPr lang="en-US" sz="3600" b="0" kern="1200" dirty="0">
+                <a:solidFill>
+                  <a:schemeClr val="tx1"/>
+                </a:solidFill>
+                <a:latin typeface="+mj-lt"/>
+                <a:ea typeface="+mj-ea"/>
+                <a:cs typeface="+mj-cs"/>
+              </a:rPr>
+            </a:br>
+            <a:endParaRPr lang="en-US" sz="3600" b="0" kern="1200" dirty="0">
+              <a:solidFill>
+                <a:schemeClr val="tx1"/>
+              </a:solidFill>
+              <a:latin typeface="+mj-lt"/>
+              <a:ea typeface="+mj-ea"/>
+              <a:cs typeface="+mj-cs"/>
+            </a:endParaRPr>
+          </a:p>
+        </p:txBody>
+      </p:sp>
+      <p:sp>
+        <p:nvSpPr>
+          <p:cNvPr id="4" name="Text Placeholder 3">
+            <a:extLst>
+              <a:ext uri="{FF2B5EF4-FFF2-40B4-BE49-F238E27FC236}">
+                <a16:creationId xmlns:a16="http://schemas.microsoft.com/office/drawing/2014/main" id="{775B5DA5-14E7-F340-8821-A8602AC1F3FA}"/>
+              </a:ext>
+            </a:extLst>
+          </p:cNvPr>
           <p:cNvSpPr>
             <a:spLocks noGrp="1"/>
           </p:cNvSpPr>
           <p:nvPr>
-            <p:ph type="subTitle" idx="1"/>
+            <p:ph type="body" sz="half" idx="2"/>
           </p:nvPr>
         </p:nvSpPr>
         <p:spPr>
           <a:xfrm>
-            <a:off x="1371600" y="3886200"/>
-            <a:ext cx="6400800" cy="1752600"/>
+            <a:off x="1004721" y="939254"/>
+            <a:ext cx="5508485" cy="3351532"/>
           </a:xfrm>
         </p:spPr>
         <p:txBody>
-          <a:bodyPr>
-            <a:normAutofit fontScale="92500" lnSpcReduction="10000"/>
+          <a:bodyPr vert="horz" lIns="91440" tIns="45720" rIns="91440" bIns="45720" rtlCol="0" anchor="ctr">
+            <a:normAutofit/>
           </a:bodyPr>
           <a:lstStyle/>
           <a:p>
-            <a:pPr marL="0" lvl="0" indent="0">
-              <a:buNone/>
+            <a:pPr marL="342900" indent="-228600" defTabSz="914400">
+              <a:lnSpc>
+                <a:spcPct val="90000"/>
+              </a:lnSpc>
+              <a:buFont typeface="Arial" panose="020B0604020202020204" pitchFamily="34" charset="0"/>
+              <a:buChar char="•"/>
             </a:pPr>
             <a:r>
-              <a:t>Equivalence Testing for Psychological Research: A Tutorial</a:t>
-            </a:r>
-            <a:br/>
-            <a:br/>
-            <a:endParaRPr/>
+              <a:rPr lang="en-US" sz="1800" dirty="0"/>
+              <a:t>The era of free virtual meetings!</a:t>
+            </a:r>
+          </a:p>
+          <a:p>
+            <a:pPr marL="342900" indent="-228600" defTabSz="914400">
+              <a:lnSpc>
+                <a:spcPct val="90000"/>
+              </a:lnSpc>
+              <a:buFont typeface="Arial" panose="020B0604020202020204" pitchFamily="34" charset="0"/>
+              <a:buChar char="•"/>
+            </a:pPr>
+            <a:r>
+              <a:rPr lang="en-US" sz="1800" dirty="0"/>
+              <a:t>Visit Erin Nishimura’s lab at: </a:t>
+            </a:r>
+            <a:r>
+              <a:rPr lang="en-US" sz="1800" dirty="0" err="1"/>
+              <a:t>onishlab.colostate.edu</a:t>
+            </a:r>
+            <a:endParaRPr lang="en-US" sz="1800" dirty="0"/>
+          </a:p>
+          <a:p>
+            <a:pPr marL="800100" lvl="1" indent="-228600" defTabSz="914400">
+              <a:lnSpc>
+                <a:spcPct val="90000"/>
+              </a:lnSpc>
+              <a:buFont typeface="Arial" panose="020B0604020202020204" pitchFamily="34" charset="0"/>
+              <a:buChar char="•"/>
+            </a:pPr>
+            <a:r>
+              <a:rPr lang="en-US" sz="1800" dirty="0"/>
+              <a:t>Writing workshop – July 16th</a:t>
+            </a:r>
+          </a:p>
+          <a:p>
+            <a:pPr marL="800100" lvl="1" indent="-228600" defTabSz="914400">
+              <a:lnSpc>
+                <a:spcPct val="90000"/>
+              </a:lnSpc>
+              <a:buFont typeface="Arial" panose="020B0604020202020204" pitchFamily="34" charset="0"/>
+              <a:buChar char="•"/>
+            </a:pPr>
+            <a:r>
+              <a:rPr lang="en-US" sz="1800" dirty="0"/>
+              <a:t>Science communication workshop – August 6</a:t>
+            </a:r>
+            <a:r>
+              <a:rPr lang="en-US" sz="1800" baseline="30000" dirty="0"/>
+              <a:t>th</a:t>
+            </a:r>
+            <a:endParaRPr lang="en-US" sz="1800" dirty="0"/>
+          </a:p>
+          <a:p>
+            <a:pPr marL="342900" indent="-228600" defTabSz="914400">
+              <a:lnSpc>
+                <a:spcPct val="90000"/>
+              </a:lnSpc>
+              <a:buFont typeface="Arial" panose="020B0604020202020204" pitchFamily="34" charset="0"/>
+              <a:buChar char="•"/>
+            </a:pPr>
+            <a:r>
+              <a:rPr lang="en-US" sz="1800" dirty="0"/>
+              <a:t>This is informal! Ask questions! Discuss!</a:t>
+            </a:r>
+          </a:p>
+        </p:txBody>
+      </p:sp>
+      <p:sp>
+        <p:nvSpPr>
+          <p:cNvPr id="33" name="Rectangle 23">
+            <a:extLst>
+              <a:ext uri="{FF2B5EF4-FFF2-40B4-BE49-F238E27FC236}">
+                <a16:creationId xmlns:a16="http://schemas.microsoft.com/office/drawing/2014/main" id="{59A309A7-1751-4ABE-A3C1-EEC40366AD89}"/>
+              </a:ext>
+              <a:ext uri="{C183D7F6-B498-43B3-948B-1728B52AA6E4}">
+                <adec:decorative xmlns:adec="http://schemas.microsoft.com/office/drawing/2017/decorative" val="1"/>
+              </a:ext>
+            </a:extLst>
+          </p:cNvPr>
+          <p:cNvSpPr>
+            <a:spLocks noGrp="1" noRot="1" noChangeAspect="1" noMove="1" noResize="1" noEditPoints="1" noAdjustHandles="1" noChangeArrowheads="1" noChangeShapeType="1" noTextEdit="1"/>
+          </p:cNvSpPr>
+          <p:nvPr>
+            <p:extLst>
+              <p:ext uri="{386F3935-93C4-4BCD-93E2-E3B085C9AB24}">
+                <p16:designElem xmlns:p16="http://schemas.microsoft.com/office/powerpoint/2015/main" val="1"/>
+              </p:ext>
+            </p:extLst>
+          </p:nvPr>
+        </p:nvSpPr>
+        <p:spPr>
+          <a:xfrm>
+            <a:off x="7566660" y="0"/>
+            <a:ext cx="1577340" cy="6858000"/>
+          </a:xfrm>
+          <a:prstGeom prst="rect">
+            <a:avLst/>
+          </a:prstGeom>
+          <a:solidFill>
+            <a:srgbClr val="3F4264"/>
+          </a:solidFill>
+          <a:ln>
+            <a:noFill/>
+          </a:ln>
+        </p:spPr>
+        <p:style>
+          <a:lnRef idx="2">
+            <a:schemeClr val="accent1">
+              <a:shade val="50000"/>
+            </a:schemeClr>
+          </a:lnRef>
+          <a:fillRef idx="1">
+            <a:schemeClr val="accent1"/>
+          </a:fillRef>
+          <a:effectRef idx="0">
+            <a:schemeClr val="accent1"/>
+          </a:effectRef>
+          <a:fontRef idx="minor">
+            <a:schemeClr val="lt1"/>
+          </a:fontRef>
+        </p:style>
+        <p:txBody>
+          <a:bodyPr rtlCol="0" anchor="ctr"/>
+          <a:lstStyle/>
+          <a:p>
+            <a:pPr algn="ctr"/>
+            <a:endParaRPr lang="en-US" sz="1350"/>
           </a:p>
         </p:txBody>
       </p:sp>
@@ -3521,7 +3699,7 @@
           <p:cNvPr id="5" name="Slide Number Placeholder 4">
             <a:extLst>
               <a:ext uri="{FF2B5EF4-FFF2-40B4-BE49-F238E27FC236}">
-                <a16:creationId xmlns:a16="http://schemas.microsoft.com/office/drawing/2014/main" id="{D95717F3-6462-D14D-BCCC-F9310880E449}"/>
+                <a16:creationId xmlns:a16="http://schemas.microsoft.com/office/drawing/2014/main" id="{15F4CA92-9AAA-594B-B7CA-872B90BD1C88}"/>
               </a:ext>
             </a:extLst>
           </p:cNvPr>
@@ -3532,20 +3710,417 @@
             <p:ph type="sldNum" sz="quarter" idx="12"/>
           </p:nvPr>
         </p:nvSpPr>
-        <p:spPr/>
-        <p:txBody>
-          <a:bodyPr/>
+        <p:spPr>
+          <a:xfrm>
+            <a:off x="7756072" y="5624513"/>
+            <a:ext cx="759278" cy="273844"/>
+          </a:xfrm>
+        </p:spPr>
+        <p:txBody>
+          <a:bodyPr vert="horz" lIns="91440" tIns="45720" rIns="91440" bIns="45720" rtlCol="0" anchor="ctr">
+            <a:normAutofit/>
+          </a:bodyPr>
           <a:lstStyle/>
           <a:p>
+            <a:pPr defTabSz="914400">
+              <a:lnSpc>
+                <a:spcPct val="90000"/>
+              </a:lnSpc>
+              <a:spcAft>
+                <a:spcPts val="600"/>
+              </a:spcAft>
+            </a:pPr>
             <a:fld id="{C5EF2332-01BF-834F-8236-50238282D533}" type="slidenum">
-              <a:rPr lang="en-US" smtClean="0"/>
+              <a:rPr lang="en-US">
+                <a:solidFill>
+                  <a:srgbClr val="FFFFFF"/>
+                </a:solidFill>
+              </a:rPr>
+              <a:pPr defTabSz="914400">
+                <a:lnSpc>
+                  <a:spcPct val="90000"/>
+                </a:lnSpc>
+                <a:spcAft>
+                  <a:spcPts val="600"/>
+                </a:spcAft>
+              </a:pPr>
               <a:t>1</a:t>
             </a:fld>
-            <a:endParaRPr lang="en-US"/>
+            <a:endParaRPr lang="en-US">
+              <a:solidFill>
+                <a:srgbClr val="FFFFFF"/>
+              </a:solidFill>
+            </a:endParaRPr>
+          </a:p>
+        </p:txBody>
+      </p:sp>
+      <p:sp>
+        <p:nvSpPr>
+          <p:cNvPr id="34" name="Oval 25">
+            <a:extLst>
+              <a:ext uri="{FF2B5EF4-FFF2-40B4-BE49-F238E27FC236}">
+                <a16:creationId xmlns:a16="http://schemas.microsoft.com/office/drawing/2014/main" id="{967D8EB6-EAE1-4F9C-B398-83321E287204}"/>
+              </a:ext>
+              <a:ext uri="{C183D7F6-B498-43B3-948B-1728B52AA6E4}">
+                <adec:decorative xmlns:adec="http://schemas.microsoft.com/office/drawing/2017/decorative" val="1"/>
+              </a:ext>
+            </a:extLst>
+          </p:cNvPr>
+          <p:cNvSpPr>
+            <a:spLocks noGrp="1" noRot="1" noChangeAspect="1" noMove="1" noResize="1" noEditPoints="1" noAdjustHandles="1" noChangeArrowheads="1" noChangeShapeType="1" noTextEdit="1"/>
+          </p:cNvSpPr>
+          <p:nvPr>
+            <p:extLst>
+              <p:ext uri="{386F3935-93C4-4BCD-93E2-E3B085C9AB24}">
+                <p16:designElem xmlns:p16="http://schemas.microsoft.com/office/powerpoint/2015/main" val="1"/>
+              </p:ext>
+            </p:extLst>
+          </p:nvPr>
+        </p:nvSpPr>
+        <p:spPr>
+          <a:xfrm>
+            <a:off x="6497138" y="2357641"/>
+            <a:ext cx="2167815" cy="2167815"/>
+          </a:xfrm>
+          <a:prstGeom prst="ellipse">
+            <a:avLst/>
+          </a:prstGeom>
+          <a:solidFill>
+            <a:srgbClr val="FFFFFF"/>
+          </a:solidFill>
+          <a:ln w="22225">
+            <a:solidFill>
+              <a:srgbClr val="6AAFFF"/>
+            </a:solidFill>
+          </a:ln>
+        </p:spPr>
+        <p:style>
+          <a:lnRef idx="2">
+            <a:schemeClr val="accent1">
+              <a:shade val="50000"/>
+            </a:schemeClr>
+          </a:lnRef>
+          <a:fillRef idx="1">
+            <a:schemeClr val="accent1"/>
+          </a:fillRef>
+          <a:effectRef idx="0">
+            <a:schemeClr val="accent1"/>
+          </a:effectRef>
+          <a:fontRef idx="minor">
+            <a:schemeClr val="lt1"/>
+          </a:fontRef>
+        </p:style>
+        <p:txBody>
+          <a:bodyPr rtlCol="0" anchor="ctr"/>
+          <a:lstStyle/>
+          <a:p>
+            <a:pPr algn="ctr"/>
+            <a:endParaRPr lang="en-US" sz="1350"/>
+          </a:p>
+        </p:txBody>
+      </p:sp>
+      <p:pic>
+        <p:nvPicPr>
+          <p:cNvPr id="16" name="Picture 15">
+            <a:extLst>
+              <a:ext uri="{FF2B5EF4-FFF2-40B4-BE49-F238E27FC236}">
+                <a16:creationId xmlns:a16="http://schemas.microsoft.com/office/drawing/2014/main" id="{EBAB7039-3B85-9A49-9008-F19F80387794}"/>
+              </a:ext>
+            </a:extLst>
+          </p:cNvPr>
+          <p:cNvPicPr>
+            <a:picLocks noChangeAspect="1"/>
+          </p:cNvPicPr>
+          <p:nvPr/>
+        </p:nvPicPr>
+        <p:blipFill rotWithShape="1">
+          <a:blip r:embed="rId2">
+            <a:alphaModFix/>
+          </a:blip>
+          <a:srcRect l="4744" r="3933"/>
+          <a:stretch/>
+        </p:blipFill>
+        <p:spPr>
+          <a:xfrm>
+            <a:off x="6598028" y="2461923"/>
+            <a:ext cx="1937263" cy="1934153"/>
+          </a:xfrm>
+          <a:custGeom>
+            <a:avLst/>
+            <a:gdLst/>
+            <a:ahLst/>
+            <a:cxnLst/>
+            <a:rect l="l" t="t" r="r" b="b"/>
+            <a:pathLst>
+              <a:path w="6057610" h="6057610">
+                <a:moveTo>
+                  <a:pt x="3028805" y="0"/>
+                </a:moveTo>
+                <a:cubicBezTo>
+                  <a:pt x="4701568" y="0"/>
+                  <a:pt x="6057610" y="1356042"/>
+                  <a:pt x="6057610" y="3028805"/>
+                </a:cubicBezTo>
+                <a:cubicBezTo>
+                  <a:pt x="6057610" y="4701568"/>
+                  <a:pt x="4701568" y="6057610"/>
+                  <a:pt x="3028805" y="6057610"/>
+                </a:cubicBezTo>
+                <a:cubicBezTo>
+                  <a:pt x="1356042" y="6057610"/>
+                  <a:pt x="0" y="4701568"/>
+                  <a:pt x="0" y="3028805"/>
+                </a:cubicBezTo>
+                <a:cubicBezTo>
+                  <a:pt x="0" y="1356042"/>
+                  <a:pt x="1356042" y="0"/>
+                  <a:pt x="3028805" y="0"/>
+                </a:cubicBezTo>
+                <a:close/>
+              </a:path>
+            </a:pathLst>
+          </a:custGeom>
+          <a:effectLst>
+            <a:softEdge rad="0"/>
+          </a:effectLst>
+        </p:spPr>
+      </p:pic>
+      <p:sp>
+        <p:nvSpPr>
+          <p:cNvPr id="19" name="Text Placeholder 3">
+            <a:extLst>
+              <a:ext uri="{FF2B5EF4-FFF2-40B4-BE49-F238E27FC236}">
+                <a16:creationId xmlns:a16="http://schemas.microsoft.com/office/drawing/2014/main" id="{3F2FAA27-80EE-F14B-904D-699ECCB838AB}"/>
+              </a:ext>
+            </a:extLst>
+          </p:cNvPr>
+          <p:cNvSpPr txBox="1">
+            <a:spLocks/>
+          </p:cNvSpPr>
+          <p:nvPr/>
+        </p:nvSpPr>
+        <p:spPr>
+          <a:xfrm>
+            <a:off x="1132116" y="3951513"/>
+            <a:ext cx="6248398" cy="2906487"/>
+          </a:xfrm>
+          <a:prstGeom prst="rect">
+            <a:avLst/>
+          </a:prstGeom>
+        </p:spPr>
+        <p:txBody>
+          <a:bodyPr vert="horz" lIns="91440" tIns="45720" rIns="91440" bIns="45720" rtlCol="0">
+            <a:normAutofit/>
+          </a:bodyPr>
+          <a:lstStyle>
+            <a:lvl1pPr marL="0" indent="0" algn="l" defTabSz="457200" rtl="0" eaLnBrk="1" latinLnBrk="0" hangingPunct="1">
+              <a:spcBef>
+                <a:spcPct val="20000"/>
+              </a:spcBef>
+              <a:buFont typeface="Arial"/>
+              <a:buNone/>
+              <a:defRPr sz="1400" kern="1200">
+                <a:solidFill>
+                  <a:schemeClr val="tx1"/>
+                </a:solidFill>
+                <a:latin typeface="+mn-lt"/>
+                <a:ea typeface="+mn-ea"/>
+                <a:cs typeface="+mn-cs"/>
+              </a:defRPr>
+            </a:lvl1pPr>
+            <a:lvl2pPr marL="457200" indent="0" algn="l" defTabSz="457200" rtl="0" eaLnBrk="1" latinLnBrk="0" hangingPunct="1">
+              <a:spcBef>
+                <a:spcPct val="20000"/>
+              </a:spcBef>
+              <a:buFont typeface="Arial"/>
+              <a:buNone/>
+              <a:defRPr sz="1200" kern="1200">
+                <a:solidFill>
+                  <a:schemeClr val="tx1"/>
+                </a:solidFill>
+                <a:latin typeface="+mn-lt"/>
+                <a:ea typeface="+mn-ea"/>
+                <a:cs typeface="+mn-cs"/>
+              </a:defRPr>
+            </a:lvl2pPr>
+            <a:lvl3pPr marL="914400" indent="0" algn="l" defTabSz="457200" rtl="0" eaLnBrk="1" latinLnBrk="0" hangingPunct="1">
+              <a:spcBef>
+                <a:spcPct val="20000"/>
+              </a:spcBef>
+              <a:buFont typeface="Arial"/>
+              <a:buNone/>
+              <a:defRPr sz="1000" kern="1200">
+                <a:solidFill>
+                  <a:schemeClr val="tx1"/>
+                </a:solidFill>
+                <a:latin typeface="+mn-lt"/>
+                <a:ea typeface="+mn-ea"/>
+                <a:cs typeface="+mn-cs"/>
+              </a:defRPr>
+            </a:lvl3pPr>
+            <a:lvl4pPr marL="1371600" indent="0" algn="l" defTabSz="457200" rtl="0" eaLnBrk="1" latinLnBrk="0" hangingPunct="1">
+              <a:spcBef>
+                <a:spcPct val="20000"/>
+              </a:spcBef>
+              <a:buFont typeface="Arial"/>
+              <a:buNone/>
+              <a:defRPr sz="900" kern="1200">
+                <a:solidFill>
+                  <a:schemeClr val="tx1"/>
+                </a:solidFill>
+                <a:latin typeface="+mn-lt"/>
+                <a:ea typeface="+mn-ea"/>
+                <a:cs typeface="+mn-cs"/>
+              </a:defRPr>
+            </a:lvl4pPr>
+            <a:lvl5pPr marL="1828800" indent="0" algn="l" defTabSz="457200" rtl="0" eaLnBrk="1" latinLnBrk="0" hangingPunct="1">
+              <a:spcBef>
+                <a:spcPct val="20000"/>
+              </a:spcBef>
+              <a:buFont typeface="Arial"/>
+              <a:buNone/>
+              <a:defRPr sz="900" kern="1200">
+                <a:solidFill>
+                  <a:schemeClr val="tx1"/>
+                </a:solidFill>
+                <a:latin typeface="+mn-lt"/>
+                <a:ea typeface="+mn-ea"/>
+                <a:cs typeface="+mn-cs"/>
+              </a:defRPr>
+            </a:lvl5pPr>
+            <a:lvl6pPr marL="2286000" indent="0" algn="l" defTabSz="457200" rtl="0" eaLnBrk="1" latinLnBrk="0" hangingPunct="1">
+              <a:spcBef>
+                <a:spcPct val="20000"/>
+              </a:spcBef>
+              <a:buFont typeface="Arial"/>
+              <a:buNone/>
+              <a:defRPr sz="900" kern="1200">
+                <a:solidFill>
+                  <a:schemeClr val="tx1"/>
+                </a:solidFill>
+                <a:latin typeface="+mn-lt"/>
+                <a:ea typeface="+mn-ea"/>
+                <a:cs typeface="+mn-cs"/>
+              </a:defRPr>
+            </a:lvl6pPr>
+            <a:lvl7pPr marL="2743200" indent="0" algn="l" defTabSz="457200" rtl="0" eaLnBrk="1" latinLnBrk="0" hangingPunct="1">
+              <a:spcBef>
+                <a:spcPct val="20000"/>
+              </a:spcBef>
+              <a:buFont typeface="Arial"/>
+              <a:buNone/>
+              <a:defRPr sz="900" kern="1200">
+                <a:solidFill>
+                  <a:schemeClr val="tx1"/>
+                </a:solidFill>
+                <a:latin typeface="+mn-lt"/>
+                <a:ea typeface="+mn-ea"/>
+                <a:cs typeface="+mn-cs"/>
+              </a:defRPr>
+            </a:lvl7pPr>
+            <a:lvl8pPr marL="3200400" indent="0" algn="l" defTabSz="457200" rtl="0" eaLnBrk="1" latinLnBrk="0" hangingPunct="1">
+              <a:spcBef>
+                <a:spcPct val="20000"/>
+              </a:spcBef>
+              <a:buFont typeface="Arial"/>
+              <a:buNone/>
+              <a:defRPr sz="900" kern="1200">
+                <a:solidFill>
+                  <a:schemeClr val="tx1"/>
+                </a:solidFill>
+                <a:latin typeface="+mn-lt"/>
+                <a:ea typeface="+mn-ea"/>
+                <a:cs typeface="+mn-cs"/>
+              </a:defRPr>
+            </a:lvl8pPr>
+            <a:lvl9pPr marL="3657600" indent="0" algn="l" defTabSz="457200" rtl="0" eaLnBrk="1" latinLnBrk="0" hangingPunct="1">
+              <a:spcBef>
+                <a:spcPct val="20000"/>
+              </a:spcBef>
+              <a:buFont typeface="Arial"/>
+              <a:buNone/>
+              <a:defRPr sz="900" kern="1200">
+                <a:solidFill>
+                  <a:schemeClr val="tx1"/>
+                </a:solidFill>
+                <a:latin typeface="+mn-lt"/>
+                <a:ea typeface="+mn-ea"/>
+                <a:cs typeface="+mn-cs"/>
+              </a:defRPr>
+            </a:lvl9pPr>
+          </a:lstStyle>
+          <a:p>
+            <a:r>
+              <a:rPr lang="en-US" sz="1800" dirty="0"/>
+              <a:t>Program:</a:t>
+            </a:r>
+          </a:p>
+          <a:p>
+            <a:pPr marL="342900" indent="-342900">
+              <a:buFont typeface="+mj-lt"/>
+              <a:buAutoNum type="arabicPeriod"/>
+            </a:pPr>
+            <a:r>
+              <a:rPr lang="en-US" sz="1800" dirty="0"/>
+              <a:t>Mikaela Elder – Regression</a:t>
+            </a:r>
+          </a:p>
+          <a:p>
+            <a:pPr marL="342900" indent="-342900">
+              <a:buFont typeface="+mj-lt"/>
+              <a:buAutoNum type="arabicPeriod"/>
+            </a:pPr>
+            <a:r>
+              <a:rPr lang="en-US" sz="1800" dirty="0"/>
+              <a:t>Rob Williams – Permutation Test</a:t>
+            </a:r>
+          </a:p>
+          <a:p>
+            <a:pPr marL="342900" indent="-342900">
+              <a:buFont typeface="+mj-lt"/>
+              <a:buAutoNum type="arabicPeriod"/>
+            </a:pPr>
+            <a:r>
+              <a:rPr lang="en-US" sz="1800" dirty="0"/>
+              <a:t>Adeline Williams – Chi-square</a:t>
+            </a:r>
+          </a:p>
+          <a:p>
+            <a:pPr marL="342900" indent="-342900">
+              <a:buFont typeface="+mj-lt"/>
+              <a:buAutoNum type="arabicPeriod"/>
+            </a:pPr>
+            <a:r>
+              <a:rPr lang="en-US" sz="1800" dirty="0"/>
+              <a:t>Adeline and David King – Equivalence Testing</a:t>
+            </a:r>
+          </a:p>
+          <a:p>
+            <a:pPr marL="342900" indent="-342900">
+              <a:buFont typeface="+mj-lt"/>
+              <a:buAutoNum type="arabicPeriod"/>
+            </a:pPr>
+            <a:r>
+              <a:rPr lang="en-US" sz="1800" dirty="0"/>
+              <a:t>Ben </a:t>
+            </a:r>
+            <a:r>
+              <a:rPr lang="en-US" sz="1800" dirty="0" err="1"/>
+              <a:t>Prytherch</a:t>
+            </a:r>
+            <a:r>
+              <a:rPr lang="en-US" sz="1800" dirty="0"/>
+              <a:t> – Effect Size and Power Analysis</a:t>
+            </a:r>
           </a:p>
         </p:txBody>
       </p:sp>
     </p:spTree>
+    <p:extLst>
+      <p:ext uri="{BB962C8B-B14F-4D97-AF65-F5344CB8AC3E}">
+        <p14:creationId xmlns:p14="http://schemas.microsoft.com/office/powerpoint/2010/main" val="3101875610"/>
+      </p:ext>
+    </p:extLst>
   </p:cSld>
   <p:clrMapOvr>
     <a:masterClrMapping/>
@@ -3572,6 +4147,336 @@
       </p:grpSpPr>
       <p:sp>
         <p:nvSpPr>
+          <p:cNvPr id="2" name="Title 1">
+            <a:extLst>
+              <a:ext uri="{FF2B5EF4-FFF2-40B4-BE49-F238E27FC236}">
+                <a16:creationId xmlns:a16="http://schemas.microsoft.com/office/drawing/2014/main" id="{95F686EA-4AC7-404E-B406-B716583EAAD8}"/>
+              </a:ext>
+            </a:extLst>
+          </p:cNvPr>
+          <p:cNvSpPr>
+            <a:spLocks noGrp="1"/>
+          </p:cNvSpPr>
+          <p:nvPr>
+            <p:ph type="title"/>
+          </p:nvPr>
+        </p:nvSpPr>
+        <p:spPr/>
+        <p:txBody>
+          <a:bodyPr/>
+          <a:lstStyle/>
+          <a:p>
+            <a:r>
+              <a:rPr lang="en-US" dirty="0"/>
+              <a:t>Possible outcomes</a:t>
+            </a:r>
+          </a:p>
+        </p:txBody>
+      </p:sp>
+      <p:graphicFrame>
+        <p:nvGraphicFramePr>
+          <p:cNvPr id="4" name="Content Placeholder 3">
+            <a:extLst>
+              <a:ext uri="{FF2B5EF4-FFF2-40B4-BE49-F238E27FC236}">
+                <a16:creationId xmlns:a16="http://schemas.microsoft.com/office/drawing/2014/main" id="{C5CA10F5-F822-A049-B9F4-6E1274FE4994}"/>
+              </a:ext>
+            </a:extLst>
+          </p:cNvPr>
+          <p:cNvGraphicFramePr>
+            <a:graphicFrameLocks noGrp="1"/>
+          </p:cNvGraphicFramePr>
+          <p:nvPr>
+            <p:ph idx="1"/>
+            <p:extLst>
+              <p:ext uri="{D42A27DB-BD31-4B8C-83A1-F6EECF244321}">
+                <p14:modId xmlns:p14="http://schemas.microsoft.com/office/powerpoint/2010/main" val="4229305324"/>
+              </p:ext>
+            </p:extLst>
+          </p:nvPr>
+        </p:nvGraphicFramePr>
+        <p:xfrm>
+          <a:off x="457200" y="1600200"/>
+          <a:ext cx="8229600" cy="4175760"/>
+        </p:xfrm>
+        <a:graphic>
+          <a:graphicData uri="http://schemas.openxmlformats.org/drawingml/2006/table">
+            <a:tbl>
+              <a:tblPr firstRow="1" firstCol="1" bandRow="1">
+                <a:tableStyleId>{21E4AEA4-8DFA-4A89-87EB-49C32662AFE0}</a:tableStyleId>
+              </a:tblPr>
+              <a:tblGrid>
+                <a:gridCol w="2743200">
+                  <a:extLst>
+                    <a:ext uri="{9D8B030D-6E8A-4147-A177-3AD203B41FA5}">
+                      <a16:colId xmlns:a16="http://schemas.microsoft.com/office/drawing/2014/main" val="506920365"/>
+                    </a:ext>
+                  </a:extLst>
+                </a:gridCol>
+                <a:gridCol w="2743200">
+                  <a:extLst>
+                    <a:ext uri="{9D8B030D-6E8A-4147-A177-3AD203B41FA5}">
+                      <a16:colId xmlns:a16="http://schemas.microsoft.com/office/drawing/2014/main" val="1827387139"/>
+                    </a:ext>
+                  </a:extLst>
+                </a:gridCol>
+                <a:gridCol w="2743200">
+                  <a:extLst>
+                    <a:ext uri="{9D8B030D-6E8A-4147-A177-3AD203B41FA5}">
+                      <a16:colId xmlns:a16="http://schemas.microsoft.com/office/drawing/2014/main" val="3924368828"/>
+                    </a:ext>
+                  </a:extLst>
+                </a:gridCol>
+              </a:tblGrid>
+              <a:tr h="1356360">
+                <a:tc>
+                  <a:txBody>
+                    <a:bodyPr/>
+                    <a:lstStyle/>
+                    <a:p>
+                      <a:endParaRPr lang="en-US" dirty="0"/>
+                    </a:p>
+                  </a:txBody>
+                  <a:tcPr/>
+                </a:tc>
+                <a:tc>
+                  <a:txBody>
+                    <a:bodyPr/>
+                    <a:lstStyle/>
+                    <a:p>
+                      <a:r>
+                        <a:rPr lang="en-US" dirty="0"/>
+                        <a:t>t-test for difference</a:t>
+                      </a:r>
+                    </a:p>
+                    <a:p>
+                      <a:r>
+                        <a:rPr lang="en-US" dirty="0"/>
+                        <a:t>Reject null</a:t>
+                      </a:r>
+                    </a:p>
+                  </a:txBody>
+                  <a:tcPr/>
+                </a:tc>
+                <a:tc>
+                  <a:txBody>
+                    <a:bodyPr/>
+                    <a:lstStyle/>
+                    <a:p>
+                      <a:r>
+                        <a:rPr lang="en-US" dirty="0"/>
+                        <a:t>t-test for difference</a:t>
+                      </a:r>
+                    </a:p>
+                    <a:p>
+                      <a:r>
+                        <a:rPr lang="en-US" dirty="0"/>
+                        <a:t>Fail to Reject null</a:t>
+                      </a:r>
+                    </a:p>
+                  </a:txBody>
+                  <a:tcPr/>
+                </a:tc>
+                <a:extLst>
+                  <a:ext uri="{0D108BD9-81ED-4DB2-BD59-A6C34878D82A}">
+                    <a16:rowId xmlns:a16="http://schemas.microsoft.com/office/drawing/2014/main" val="2097796339"/>
+                  </a:ext>
+                </a:extLst>
+              </a:tr>
+              <a:tr h="1356360">
+                <a:tc>
+                  <a:txBody>
+                    <a:bodyPr/>
+                    <a:lstStyle/>
+                    <a:p>
+                      <a:r>
+                        <a:rPr lang="en-US" dirty="0"/>
+                        <a:t>Two one-sided tests:</a:t>
+                      </a:r>
+                    </a:p>
+                    <a:p>
+                      <a:r>
+                        <a:rPr lang="en-US" dirty="0"/>
+                        <a:t>both tests reject null</a:t>
+                      </a:r>
+                    </a:p>
+                  </a:txBody>
+                  <a:tcPr/>
+                </a:tc>
+                <a:tc>
+                  <a:txBody>
+                    <a:bodyPr/>
+                    <a:lstStyle/>
+                    <a:p>
+                      <a:r>
+                        <a:rPr lang="en-US" b="1" dirty="0"/>
+                        <a:t>Different, but within equivalence bounds. </a:t>
+                      </a:r>
+                      <a:r>
+                        <a:rPr lang="en-US" dirty="0"/>
+                        <a:t>Two groups are different</a:t>
+                      </a:r>
+                    </a:p>
+                    <a:p>
+                      <a:r>
+                        <a:rPr lang="en-US" dirty="0"/>
+                        <a:t>(but not enough to exclude the equivalence bounds)</a:t>
+                      </a:r>
+                    </a:p>
+                  </a:txBody>
+                  <a:tcPr/>
+                </a:tc>
+                <a:tc>
+                  <a:txBody>
+                    <a:bodyPr/>
+                    <a:lstStyle/>
+                    <a:p>
+                      <a:r>
+                        <a:rPr lang="en-US" b="1" dirty="0"/>
+                        <a:t>Equivalent.</a:t>
+                      </a:r>
+                      <a:r>
+                        <a:rPr lang="en-US" dirty="0"/>
+                        <a:t> Two groups are equivalent. (</a:t>
+                      </a:r>
+                      <a:r>
+                        <a:rPr lang="en-US" i="1" dirty="0"/>
+                        <a:t>and</a:t>
+                      </a:r>
+                      <a:r>
+                        <a:rPr lang="en-US" dirty="0"/>
+                        <a:t> not different).</a:t>
+                      </a:r>
+                    </a:p>
+                  </a:txBody>
+                  <a:tcPr/>
+                </a:tc>
+                <a:extLst>
+                  <a:ext uri="{0D108BD9-81ED-4DB2-BD59-A6C34878D82A}">
+                    <a16:rowId xmlns:a16="http://schemas.microsoft.com/office/drawing/2014/main" val="1351486283"/>
+                  </a:ext>
+                </a:extLst>
+              </a:tr>
+              <a:tr h="1356360">
+                <a:tc>
+                  <a:txBody>
+                    <a:bodyPr/>
+                    <a:lstStyle/>
+                    <a:p>
+                      <a:r>
+                        <a:rPr lang="en-US" dirty="0"/>
+                        <a:t>Two one-sided tests</a:t>
+                      </a:r>
+                    </a:p>
+                    <a:p>
+                      <a:r>
+                        <a:rPr lang="en-US" dirty="0"/>
+                        <a:t>either test Fails To Reject</a:t>
+                      </a:r>
+                    </a:p>
+                  </a:txBody>
+                  <a:tcPr/>
+                </a:tc>
+                <a:tc>
+                  <a:txBody>
+                    <a:bodyPr/>
+                    <a:lstStyle/>
+                    <a:p>
+                      <a:r>
+                        <a:rPr lang="en-US" b="1" dirty="0"/>
+                        <a:t>Different and exceeding equivalence bounds.</a:t>
+                      </a:r>
+                    </a:p>
+                  </a:txBody>
+                  <a:tcPr/>
+                </a:tc>
+                <a:tc>
+                  <a:txBody>
+                    <a:bodyPr/>
+                    <a:lstStyle/>
+                    <a:p>
+                      <a:r>
+                        <a:rPr lang="en-US" b="1" dirty="0"/>
+                        <a:t>Inconclusive. </a:t>
+                      </a:r>
+                      <a:r>
+                        <a:rPr lang="en-US" dirty="0"/>
+                        <a:t>There is not enough statistical evidence to determine difference or equivalence.</a:t>
+                      </a:r>
+                    </a:p>
+                  </a:txBody>
+                  <a:tcPr/>
+                </a:tc>
+                <a:extLst>
+                  <a:ext uri="{0D108BD9-81ED-4DB2-BD59-A6C34878D82A}">
+                    <a16:rowId xmlns:a16="http://schemas.microsoft.com/office/drawing/2014/main" val="4076205216"/>
+                  </a:ext>
+                </a:extLst>
+              </a:tr>
+            </a:tbl>
+          </a:graphicData>
+        </a:graphic>
+      </p:graphicFrame>
+      <p:sp>
+        <p:nvSpPr>
+          <p:cNvPr id="5" name="Slide Number Placeholder 4">
+            <a:extLst>
+              <a:ext uri="{FF2B5EF4-FFF2-40B4-BE49-F238E27FC236}">
+                <a16:creationId xmlns:a16="http://schemas.microsoft.com/office/drawing/2014/main" id="{B59172E5-943E-8B4E-9B59-EF261015205F}"/>
+              </a:ext>
+            </a:extLst>
+          </p:cNvPr>
+          <p:cNvSpPr>
+            <a:spLocks noGrp="1"/>
+          </p:cNvSpPr>
+          <p:nvPr>
+            <p:ph type="sldNum" sz="quarter" idx="12"/>
+          </p:nvPr>
+        </p:nvSpPr>
+        <p:spPr/>
+        <p:txBody>
+          <a:bodyPr/>
+          <a:lstStyle/>
+          <a:p>
+            <a:fld id="{C5EF2332-01BF-834F-8236-50238282D533}" type="slidenum">
+              <a:rPr lang="en-US" smtClean="0"/>
+              <a:t>10</a:t>
+            </a:fld>
+            <a:endParaRPr lang="en-US"/>
+          </a:p>
+        </p:txBody>
+      </p:sp>
+    </p:spTree>
+    <p:extLst>
+      <p:ext uri="{BB962C8B-B14F-4D97-AF65-F5344CB8AC3E}">
+        <p14:creationId xmlns:p14="http://schemas.microsoft.com/office/powerpoint/2010/main" val="714221789"/>
+      </p:ext>
+    </p:extLst>
+  </p:cSld>
+  <p:clrMapOvr>
+    <a:masterClrMapping/>
+  </p:clrMapOvr>
+</p:sld>
+</file>
+
+<file path=ppt/slides/slide11.xml><?xml version="1.0" encoding="utf-8"?>
+<p:sld xmlns:a="http://schemas.openxmlformats.org/drawingml/2006/main" xmlns:r="http://schemas.openxmlformats.org/officeDocument/2006/relationships" xmlns:p="http://schemas.openxmlformats.org/presentationml/2006/main">
+  <p:cSld>
+    <p:spTree>
+      <p:nvGrpSpPr>
+        <p:cNvPr id="1" name=""/>
+        <p:cNvGrpSpPr/>
+        <p:nvPr/>
+      </p:nvGrpSpPr>
+      <p:grpSpPr>
+        <a:xfrm>
+          <a:off x="0" y="0"/>
+          <a:ext cx="0" cy="0"/>
+          <a:chOff x="0" y="0"/>
+          <a:chExt cx="0" cy="0"/>
+        </a:xfrm>
+      </p:grpSpPr>
+      <p:sp>
+        <p:nvSpPr>
           <p:cNvPr id="2" name="Title 1"/>
           <p:cNvSpPr>
             <a:spLocks noGrp="1"/>
@@ -3791,7 +4696,7 @@
           <a:p>
             <a:fld id="{C5EF2332-01BF-834F-8236-50238282D533}" type="slidenum">
               <a:rPr lang="en-US" smtClean="0"/>
-              <a:t>10</a:t>
+              <a:t>11</a:t>
             </a:fld>
             <a:endParaRPr lang="en-US"/>
           </a:p>
@@ -4367,7 +5272,7 @@
 </p:sld>
 </file>
 
-<file path=ppt/slides/slide11.xml><?xml version="1.0" encoding="utf-8"?>
+<file path=ppt/slides/slide12.xml><?xml version="1.0" encoding="utf-8"?>
 <p:sld xmlns:a="http://schemas.openxmlformats.org/drawingml/2006/main" xmlns:r="http://schemas.openxmlformats.org/officeDocument/2006/relationships" xmlns:p="http://schemas.openxmlformats.org/presentationml/2006/main">
   <p:cSld>
     <p:spTree>
@@ -4520,7 +5425,7 @@
           <a:p>
             <a:fld id="{C5EF2332-01BF-834F-8236-50238282D533}" type="slidenum">
               <a:rPr lang="en-US" smtClean="0"/>
-              <a:t>11</a:t>
+              <a:t>12</a:t>
             </a:fld>
             <a:endParaRPr lang="en-US"/>
           </a:p>
@@ -4893,6 +5798,302 @@
       </p:grpSpPr>
       <p:sp>
         <p:nvSpPr>
+          <p:cNvPr id="2" name="Title 1"/>
+          <p:cNvSpPr>
+            <a:spLocks noGrp="1"/>
+          </p:cNvSpPr>
+          <p:nvPr>
+            <p:ph type="ctrTitle"/>
+          </p:nvPr>
+        </p:nvSpPr>
+        <p:spPr>
+          <a:xfrm>
+            <a:off x="718457" y="1684110"/>
+            <a:ext cx="7772400" cy="1470025"/>
+          </a:xfrm>
+        </p:spPr>
+        <p:txBody>
+          <a:bodyPr/>
+          <a:lstStyle/>
+          <a:p>
+            <a:pPr marL="0" lvl="0" indent="0">
+              <a:buNone/>
+            </a:pPr>
+            <a:r>
+              <a:rPr lang="en-US" dirty="0"/>
+              <a:t>Equivalence testing:</a:t>
+            </a:r>
+            <a:br>
+              <a:rPr lang="en-US" dirty="0"/>
+            </a:br>
+            <a:r>
+              <a:rPr dirty="0"/>
+              <a:t>Statistical test for NO difference</a:t>
+            </a:r>
+          </a:p>
+        </p:txBody>
+      </p:sp>
+      <p:sp>
+        <p:nvSpPr>
+          <p:cNvPr id="5" name="Slide Number Placeholder 4">
+            <a:extLst>
+              <a:ext uri="{FF2B5EF4-FFF2-40B4-BE49-F238E27FC236}">
+                <a16:creationId xmlns:a16="http://schemas.microsoft.com/office/drawing/2014/main" id="{D95717F3-6462-D14D-BCCC-F9310880E449}"/>
+              </a:ext>
+            </a:extLst>
+          </p:cNvPr>
+          <p:cNvSpPr>
+            <a:spLocks noGrp="1"/>
+          </p:cNvSpPr>
+          <p:nvPr>
+            <p:ph type="sldNum" sz="quarter" idx="12"/>
+          </p:nvPr>
+        </p:nvSpPr>
+        <p:spPr/>
+        <p:txBody>
+          <a:bodyPr/>
+          <a:lstStyle/>
+          <a:p>
+            <a:fld id="{C5EF2332-01BF-834F-8236-50238282D533}" type="slidenum">
+              <a:rPr lang="en-US" smtClean="0"/>
+              <a:t>2</a:t>
+            </a:fld>
+            <a:endParaRPr lang="en-US"/>
+          </a:p>
+        </p:txBody>
+      </p:sp>
+      <p:sp>
+        <p:nvSpPr>
+          <p:cNvPr id="7" name="Subtitle 2">
+            <a:extLst>
+              <a:ext uri="{FF2B5EF4-FFF2-40B4-BE49-F238E27FC236}">
+                <a16:creationId xmlns:a16="http://schemas.microsoft.com/office/drawing/2014/main" id="{76F98194-AC2A-D245-9480-BFA7879A0746}"/>
+              </a:ext>
+            </a:extLst>
+          </p:cNvPr>
+          <p:cNvSpPr txBox="1">
+            <a:spLocks/>
+          </p:cNvSpPr>
+          <p:nvPr/>
+        </p:nvSpPr>
+        <p:spPr>
+          <a:xfrm>
+            <a:off x="707572" y="3886202"/>
+            <a:ext cx="7761514" cy="1752600"/>
+          </a:xfrm>
+          <a:prstGeom prst="rect">
+            <a:avLst/>
+          </a:prstGeom>
+        </p:spPr>
+        <p:txBody>
+          <a:bodyPr vert="horz" lIns="91440" tIns="45720" rIns="91440" bIns="45720" rtlCol="0">
+            <a:normAutofit/>
+          </a:bodyPr>
+          <a:lstStyle>
+            <a:lvl1pPr marL="0" indent="0" algn="ctr" defTabSz="457200" rtl="0" eaLnBrk="1" latinLnBrk="0" hangingPunct="1">
+              <a:spcBef>
+                <a:spcPct val="20000"/>
+              </a:spcBef>
+              <a:buFont typeface="Arial"/>
+              <a:buNone/>
+              <a:defRPr sz="3200" kern="1200">
+                <a:solidFill>
+                  <a:schemeClr val="tx1">
+                    <a:tint val="75000"/>
+                  </a:schemeClr>
+                </a:solidFill>
+                <a:latin typeface="+mn-lt"/>
+                <a:ea typeface="+mn-ea"/>
+                <a:cs typeface="+mn-cs"/>
+              </a:defRPr>
+            </a:lvl1pPr>
+            <a:lvl2pPr marL="457200" indent="0" algn="ctr" defTabSz="457200" rtl="0" eaLnBrk="1" latinLnBrk="0" hangingPunct="1">
+              <a:spcBef>
+                <a:spcPct val="20000"/>
+              </a:spcBef>
+              <a:buFont typeface="Arial"/>
+              <a:buNone/>
+              <a:defRPr sz="2800" kern="1200">
+                <a:solidFill>
+                  <a:schemeClr val="tx1">
+                    <a:tint val="75000"/>
+                  </a:schemeClr>
+                </a:solidFill>
+                <a:latin typeface="+mn-lt"/>
+                <a:ea typeface="+mn-ea"/>
+                <a:cs typeface="+mn-cs"/>
+              </a:defRPr>
+            </a:lvl2pPr>
+            <a:lvl3pPr marL="914400" indent="0" algn="ctr" defTabSz="457200" rtl="0" eaLnBrk="1" latinLnBrk="0" hangingPunct="1">
+              <a:spcBef>
+                <a:spcPct val="20000"/>
+              </a:spcBef>
+              <a:buFont typeface="Arial"/>
+              <a:buNone/>
+              <a:defRPr sz="2400" kern="1200">
+                <a:solidFill>
+                  <a:schemeClr val="tx1">
+                    <a:tint val="75000"/>
+                  </a:schemeClr>
+                </a:solidFill>
+                <a:latin typeface="+mn-lt"/>
+                <a:ea typeface="+mn-ea"/>
+                <a:cs typeface="+mn-cs"/>
+              </a:defRPr>
+            </a:lvl3pPr>
+            <a:lvl4pPr marL="1371600" indent="0" algn="ctr" defTabSz="457200" rtl="0" eaLnBrk="1" latinLnBrk="0" hangingPunct="1">
+              <a:spcBef>
+                <a:spcPct val="20000"/>
+              </a:spcBef>
+              <a:buFont typeface="Arial"/>
+              <a:buNone/>
+              <a:defRPr sz="2000" kern="1200">
+                <a:solidFill>
+                  <a:schemeClr val="tx1">
+                    <a:tint val="75000"/>
+                  </a:schemeClr>
+                </a:solidFill>
+                <a:latin typeface="+mn-lt"/>
+                <a:ea typeface="+mn-ea"/>
+                <a:cs typeface="+mn-cs"/>
+              </a:defRPr>
+            </a:lvl4pPr>
+            <a:lvl5pPr marL="1828800" indent="0" algn="ctr" defTabSz="457200" rtl="0" eaLnBrk="1" latinLnBrk="0" hangingPunct="1">
+              <a:spcBef>
+                <a:spcPct val="20000"/>
+              </a:spcBef>
+              <a:buFont typeface="Arial"/>
+              <a:buNone/>
+              <a:defRPr sz="2000" kern="1200">
+                <a:solidFill>
+                  <a:schemeClr val="tx1">
+                    <a:tint val="75000"/>
+                  </a:schemeClr>
+                </a:solidFill>
+                <a:latin typeface="+mn-lt"/>
+                <a:ea typeface="+mn-ea"/>
+                <a:cs typeface="+mn-cs"/>
+              </a:defRPr>
+            </a:lvl5pPr>
+            <a:lvl6pPr marL="2286000" indent="0" algn="ctr" defTabSz="457200" rtl="0" eaLnBrk="1" latinLnBrk="0" hangingPunct="1">
+              <a:spcBef>
+                <a:spcPct val="20000"/>
+              </a:spcBef>
+              <a:buFont typeface="Arial"/>
+              <a:buNone/>
+              <a:defRPr sz="2000" kern="1200">
+                <a:solidFill>
+                  <a:schemeClr val="tx1">
+                    <a:tint val="75000"/>
+                  </a:schemeClr>
+                </a:solidFill>
+                <a:latin typeface="+mn-lt"/>
+                <a:ea typeface="+mn-ea"/>
+                <a:cs typeface="+mn-cs"/>
+              </a:defRPr>
+            </a:lvl6pPr>
+            <a:lvl7pPr marL="2743200" indent="0" algn="ctr" defTabSz="457200" rtl="0" eaLnBrk="1" latinLnBrk="0" hangingPunct="1">
+              <a:spcBef>
+                <a:spcPct val="20000"/>
+              </a:spcBef>
+              <a:buFont typeface="Arial"/>
+              <a:buNone/>
+              <a:defRPr sz="2000" kern="1200">
+                <a:solidFill>
+                  <a:schemeClr val="tx1">
+                    <a:tint val="75000"/>
+                  </a:schemeClr>
+                </a:solidFill>
+                <a:latin typeface="+mn-lt"/>
+                <a:ea typeface="+mn-ea"/>
+                <a:cs typeface="+mn-cs"/>
+              </a:defRPr>
+            </a:lvl7pPr>
+            <a:lvl8pPr marL="3200400" indent="0" algn="ctr" defTabSz="457200" rtl="0" eaLnBrk="1" latinLnBrk="0" hangingPunct="1">
+              <a:spcBef>
+                <a:spcPct val="20000"/>
+              </a:spcBef>
+              <a:buFont typeface="Arial"/>
+              <a:buNone/>
+              <a:defRPr sz="2000" kern="1200">
+                <a:solidFill>
+                  <a:schemeClr val="tx1">
+                    <a:tint val="75000"/>
+                  </a:schemeClr>
+                </a:solidFill>
+                <a:latin typeface="+mn-lt"/>
+                <a:ea typeface="+mn-ea"/>
+                <a:cs typeface="+mn-cs"/>
+              </a:defRPr>
+            </a:lvl8pPr>
+            <a:lvl9pPr marL="3657600" indent="0" algn="ctr" defTabSz="457200" rtl="0" eaLnBrk="1" latinLnBrk="0" hangingPunct="1">
+              <a:spcBef>
+                <a:spcPct val="20000"/>
+              </a:spcBef>
+              <a:buFont typeface="Arial"/>
+              <a:buNone/>
+              <a:defRPr sz="2000" kern="1200">
+                <a:solidFill>
+                  <a:schemeClr val="tx1">
+                    <a:tint val="75000"/>
+                  </a:schemeClr>
+                </a:solidFill>
+                <a:latin typeface="+mn-lt"/>
+                <a:ea typeface="+mn-ea"/>
+                <a:cs typeface="+mn-cs"/>
+              </a:defRPr>
+            </a:lvl9pPr>
+          </a:lstStyle>
+          <a:p>
+            <a:r>
+              <a:rPr lang="en-US" sz="2400" dirty="0" err="1"/>
+              <a:t>Lakens</a:t>
+            </a:r>
+            <a:r>
+              <a:rPr lang="en-US" sz="2400" dirty="0"/>
+              <a:t>, </a:t>
+            </a:r>
+            <a:r>
+              <a:rPr lang="en-US" sz="2400" dirty="0" err="1"/>
+              <a:t>Daniël</a:t>
+            </a:r>
+            <a:r>
+              <a:rPr lang="en-US" sz="2400" dirty="0"/>
+              <a:t>, et al. “Equivalence Testing for Psychological Research: A Tutorial.” Advances in Methods and Practices in Psychological Science, vol. 1, no. 2, 2018</a:t>
+            </a:r>
+          </a:p>
+          <a:p>
+            <a:endParaRPr lang="en-US" sz="2400" dirty="0"/>
+          </a:p>
+        </p:txBody>
+      </p:sp>
+    </p:spTree>
+  </p:cSld>
+  <p:clrMapOvr>
+    <a:masterClrMapping/>
+  </p:clrMapOvr>
+</p:sld>
+</file>
+
+<file path=ppt/slides/slide3.xml><?xml version="1.0" encoding="utf-8"?>
+<p:sld xmlns:a="http://schemas.openxmlformats.org/drawingml/2006/main" xmlns:r="http://schemas.openxmlformats.org/officeDocument/2006/relationships" xmlns:p="http://schemas.openxmlformats.org/presentationml/2006/main">
+  <p:cSld>
+    <p:spTree>
+      <p:nvGrpSpPr>
+        <p:cNvPr id="1" name=""/>
+        <p:cNvGrpSpPr/>
+        <p:nvPr/>
+      </p:nvGrpSpPr>
+      <p:grpSpPr>
+        <a:xfrm>
+          <a:off x="0" y="0"/>
+          <a:ext cx="0" cy="0"/>
+          <a:chOff x="0" y="0"/>
+          <a:chExt cx="0" cy="0"/>
+        </a:xfrm>
+      </p:grpSpPr>
+      <p:sp>
+        <p:nvSpPr>
           <p:cNvPr id="3" name="Content Placeholder 2"/>
           <p:cNvSpPr>
             <a:spLocks noGrp="1"/>
@@ -4977,7 +6178,7 @@
                   </a:schemeClr>
                 </a:solidFill>
               </a:rPr>
-              <a:t>Other methods compare probabilities i.e. p(H</a:t>
+              <a:t>Other methods compare probabilities, i.e., p(H</a:t>
             </a:r>
             <a:r>
               <a:rPr lang="en-US" baseline="-25000" dirty="0">
@@ -5017,7 +6218,7 @@
                   </a:schemeClr>
                 </a:solidFill>
               </a:rPr>
-              <a:t>); Bayesian modeling, mixture models…</a:t>
+              <a:t>) to see which is higher; Bayesian modeling, mixture models…</a:t>
             </a:r>
           </a:p>
           <a:p>
@@ -5394,7 +6595,7 @@
           <a:p>
             <a:fld id="{C5EF2332-01BF-834F-8236-50238282D533}" type="slidenum">
               <a:rPr lang="en-US" smtClean="0"/>
-              <a:t>2</a:t>
+              <a:t>3</a:t>
             </a:fld>
             <a:endParaRPr lang="en-US"/>
           </a:p>
@@ -5688,7 +6889,7 @@
 </p:sld>
 </file>
 
-<file path=ppt/slides/slide3.xml><?xml version="1.0" encoding="utf-8"?>
+<file path=ppt/slides/slide4.xml><?xml version="1.0" encoding="utf-8"?>
 <p:sld xmlns:a="http://schemas.openxmlformats.org/drawingml/2006/main" xmlns:r="http://schemas.openxmlformats.org/officeDocument/2006/relationships" xmlns:p="http://schemas.openxmlformats.org/presentationml/2006/main">
   <p:cSld>
     <p:spTree>
@@ -5831,7 +7032,7 @@
           <a:p>
             <a:fld id="{C5EF2332-01BF-834F-8236-50238282D533}" type="slidenum">
               <a:rPr lang="en-US" smtClean="0"/>
-              <a:t>3</a:t>
+              <a:t>4</a:t>
             </a:fld>
             <a:endParaRPr lang="en-US"/>
           </a:p>
@@ -5845,7 +7046,7 @@
 </p:sld>
 </file>
 
-<file path=ppt/slides/slide4.xml><?xml version="1.0" encoding="utf-8"?>
+<file path=ppt/slides/slide5.xml><?xml version="1.0" encoding="utf-8"?>
 <p:sld xmlns:a="http://schemas.openxmlformats.org/drawingml/2006/main" xmlns:r="http://schemas.openxmlformats.org/officeDocument/2006/relationships" xmlns:p="http://schemas.openxmlformats.org/presentationml/2006/main">
   <p:cSld>
     <p:spTree>
@@ -5999,7 +7200,7 @@
           <a:p>
             <a:fld id="{C5EF2332-01BF-834F-8236-50238282D533}" type="slidenum">
               <a:rPr lang="en-US" smtClean="0"/>
-              <a:t>4</a:t>
+              <a:t>5</a:t>
             </a:fld>
             <a:endParaRPr lang="en-US"/>
           </a:p>
@@ -6013,7 +7214,7 @@
 </p:sld>
 </file>
 
-<file path=ppt/slides/slide5.xml><?xml version="1.0" encoding="utf-8"?>
+<file path=ppt/slides/slide6.xml><?xml version="1.0" encoding="utf-8"?>
 <p:sld xmlns:a="http://schemas.openxmlformats.org/drawingml/2006/main" xmlns:r="http://schemas.openxmlformats.org/officeDocument/2006/relationships" xmlns:p="http://schemas.openxmlformats.org/presentationml/2006/main">
   <p:cSld>
     <p:spTree>
@@ -6347,7 +7548,7 @@
           <a:p>
             <a:fld id="{C5EF2332-01BF-834F-8236-50238282D533}" type="slidenum">
               <a:rPr lang="en-US" smtClean="0"/>
-              <a:t>5</a:t>
+              <a:t>6</a:t>
             </a:fld>
             <a:endParaRPr lang="en-US"/>
           </a:p>
@@ -6361,7 +7562,7 @@
 </p:sld>
 </file>
 
-<file path=ppt/slides/slide6.xml><?xml version="1.0" encoding="utf-8"?>
+<file path=ppt/slides/slide7.xml><?xml version="1.0" encoding="utf-8"?>
 <p:sld xmlns:a="http://schemas.openxmlformats.org/drawingml/2006/main" xmlns:r="http://schemas.openxmlformats.org/officeDocument/2006/relationships" xmlns:p="http://schemas.openxmlformats.org/presentationml/2006/main">
   <p:cSld>
     <p:spTree>
@@ -6606,7 +7807,7 @@
         </p:nvGrpSpPr>
         <p:grpSpPr>
           <a:xfrm>
-            <a:off x="4296696" y="1526456"/>
+            <a:off x="4296696" y="1657086"/>
             <a:ext cx="3726426" cy="610833"/>
             <a:chOff x="4296696" y="1526456"/>
             <a:chExt cx="3726426" cy="610833"/>
@@ -6807,7 +8008,11 @@
             <a:p>
               <a:pPr algn="ctr"/>
               <a:r>
-                <a:rPr lang="en-US" dirty="0"/>
+                <a:rPr lang="en-US" dirty="0">
+                  <a:solidFill>
+                    <a:srgbClr val="654F7F"/>
+                  </a:solidFill>
+                </a:rPr>
                 <a:t>Two one-sided t-test distributions </a:t>
               </a:r>
             </a:p>
@@ -6893,7 +8098,11 @@
             <a:p>
               <a:pPr algn="ctr"/>
               <a:r>
-                <a:rPr lang="en-US" dirty="0"/>
+                <a:rPr lang="en-US" dirty="0">
+                  <a:solidFill>
+                    <a:srgbClr val="953735"/>
+                  </a:solidFill>
+                </a:rPr>
                 <a:t>Original two-sided t-test against 0: distribution </a:t>
               </a:r>
             </a:p>
@@ -7086,7 +8295,7 @@
           <a:p>
             <a:fld id="{C5EF2332-01BF-834F-8236-50238282D533}" type="slidenum">
               <a:rPr lang="en-US" smtClean="0"/>
-              <a:t>6</a:t>
+              <a:t>7</a:t>
             </a:fld>
             <a:endParaRPr lang="en-US"/>
           </a:p>
@@ -7226,6 +8435,96 @@
                                           </p:stCondLst>
                                         </p:cTn>
                                         <p:tgtEl>
+                                          <p:spTgt spid="25"/>
+                                        </p:tgtEl>
+                                        <p:attrNameLst>
+                                          <p:attrName>style.visibility</p:attrName>
+                                        </p:attrNameLst>
+                                      </p:cBhvr>
+                                      <p:to>
+                                        <p:strVal val="visible"/>
+                                      </p:to>
+                                    </p:set>
+                                  </p:childTnLst>
+                                </p:cTn>
+                              </p:par>
+                            </p:childTnLst>
+                          </p:cTn>
+                        </p:par>
+                      </p:childTnLst>
+                    </p:cTn>
+                  </p:par>
+                  <p:par>
+                    <p:cTn id="15" fill="hold">
+                      <p:stCondLst>
+                        <p:cond delay="indefinite"/>
+                      </p:stCondLst>
+                      <p:childTnLst>
+                        <p:par>
+                          <p:cTn id="16" fill="hold">
+                            <p:stCondLst>
+                              <p:cond delay="0"/>
+                            </p:stCondLst>
+                            <p:childTnLst>
+                              <p:par>
+                                <p:cTn id="17" presetID="1" presetClass="entr" presetSubtype="0" fill="hold" nodeType="clickEffect">
+                                  <p:stCondLst>
+                                    <p:cond delay="0"/>
+                                  </p:stCondLst>
+                                  <p:childTnLst>
+                                    <p:set>
+                                      <p:cBhvr>
+                                        <p:cTn id="18" dur="1" fill="hold">
+                                          <p:stCondLst>
+                                            <p:cond delay="0"/>
+                                          </p:stCondLst>
+                                        </p:cTn>
+                                        <p:tgtEl>
+                                          <p:spTgt spid="26"/>
+                                        </p:tgtEl>
+                                        <p:attrNameLst>
+                                          <p:attrName>style.visibility</p:attrName>
+                                        </p:attrNameLst>
+                                      </p:cBhvr>
+                                      <p:to>
+                                        <p:strVal val="visible"/>
+                                      </p:to>
+                                    </p:set>
+                                  </p:childTnLst>
+                                </p:cTn>
+                              </p:par>
+                            </p:childTnLst>
+                          </p:cTn>
+                        </p:par>
+                      </p:childTnLst>
+                    </p:cTn>
+                  </p:par>
+                  <p:par>
+                    <p:cTn id="19" fill="hold">
+                      <p:stCondLst>
+                        <p:cond delay="indefinite"/>
+                      </p:stCondLst>
+                      <p:childTnLst>
+                        <p:par>
+                          <p:cTn id="20" fill="hold">
+                            <p:stCondLst>
+                              <p:cond delay="0"/>
+                            </p:stCondLst>
+                            <p:childTnLst>
+                              <p:par>
+                                <p:cTn id="21" presetID="1" presetClass="entr" presetSubtype="0" fill="hold" nodeType="clickEffect">
+                                  <p:stCondLst>
+                                    <p:cond delay="0"/>
+                                  </p:stCondLst>
+                                  <p:childTnLst>
+                                    <p:set>
+                                      <p:cBhvr>
+                                        <p:cTn id="22" dur="1" fill="hold">
+                                          <p:stCondLst>
+                                            <p:cond delay="0"/>
+                                          </p:stCondLst>
+                                        </p:cTn>
+                                        <p:tgtEl>
                                           <p:spTgt spid="14"/>
                                         </p:tgtEl>
                                         <p:attrNameLst>
@@ -7270,7 +8569,7 @@
 </p:sld>
 </file>
 
-<file path=ppt/slides/slide7.xml><?xml version="1.0" encoding="utf-8"?>
+<file path=ppt/slides/slide8.xml><?xml version="1.0" encoding="utf-8"?>
 <p:sld xmlns:a="http://schemas.openxmlformats.org/drawingml/2006/main" xmlns:r="http://schemas.openxmlformats.org/officeDocument/2006/relationships" xmlns:p="http://schemas.openxmlformats.org/presentationml/2006/main">
   <p:cSld>
     <p:spTree>
@@ -7445,7 +8744,7 @@
           <a:p>
             <a:fld id="{C5EF2332-01BF-834F-8236-50238282D533}" type="slidenum">
               <a:rPr lang="en-US" smtClean="0"/>
-              <a:t>7</a:t>
+              <a:t>8</a:t>
             </a:fld>
             <a:endParaRPr lang="en-US"/>
           </a:p>
@@ -7459,7 +8758,7 @@
 </p:sld>
 </file>
 
-<file path=ppt/slides/slide8.xml><?xml version="1.0" encoding="utf-8"?>
+<file path=ppt/slides/slide9.xml><?xml version="1.0" encoding="utf-8"?>
 <p:sld xmlns:a="http://schemas.openxmlformats.org/drawingml/2006/main" xmlns:r="http://schemas.openxmlformats.org/officeDocument/2006/relationships" xmlns:p="http://schemas.openxmlformats.org/presentationml/2006/main" show="0">
   <p:cSld>
     <p:spTree>
@@ -7937,331 +9236,6 @@
           <a:p>
             <a:fld id="{C5EF2332-01BF-834F-8236-50238282D533}" type="slidenum">
               <a:rPr lang="en-US" smtClean="0"/>
-              <a:t>8</a:t>
-            </a:fld>
-            <a:endParaRPr lang="en-US"/>
-          </a:p>
-        </p:txBody>
-      </p:sp>
-    </p:spTree>
-  </p:cSld>
-  <p:clrMapOvr>
-    <a:masterClrMapping/>
-  </p:clrMapOvr>
-</p:sld>
-</file>
-
-<file path=ppt/slides/slide9.xml><?xml version="1.0" encoding="utf-8"?>
-<p:sld xmlns:a="http://schemas.openxmlformats.org/drawingml/2006/main" xmlns:r="http://schemas.openxmlformats.org/officeDocument/2006/relationships" xmlns:p="http://schemas.openxmlformats.org/presentationml/2006/main">
-  <p:cSld>
-    <p:spTree>
-      <p:nvGrpSpPr>
-        <p:cNvPr id="1" name=""/>
-        <p:cNvGrpSpPr/>
-        <p:nvPr/>
-      </p:nvGrpSpPr>
-      <p:grpSpPr>
-        <a:xfrm>
-          <a:off x="0" y="0"/>
-          <a:ext cx="0" cy="0"/>
-          <a:chOff x="0" y="0"/>
-          <a:chExt cx="0" cy="0"/>
-        </a:xfrm>
-      </p:grpSpPr>
-      <p:sp>
-        <p:nvSpPr>
-          <p:cNvPr id="2" name="Title 1">
-            <a:extLst>
-              <a:ext uri="{FF2B5EF4-FFF2-40B4-BE49-F238E27FC236}">
-                <a16:creationId xmlns:a16="http://schemas.microsoft.com/office/drawing/2014/main" id="{95F686EA-4AC7-404E-B406-B716583EAAD8}"/>
-              </a:ext>
-            </a:extLst>
-          </p:cNvPr>
-          <p:cNvSpPr>
-            <a:spLocks noGrp="1"/>
-          </p:cNvSpPr>
-          <p:nvPr>
-            <p:ph type="title"/>
-          </p:nvPr>
-        </p:nvSpPr>
-        <p:spPr/>
-        <p:txBody>
-          <a:bodyPr/>
-          <a:lstStyle/>
-          <a:p>
-            <a:r>
-              <a:rPr lang="en-US" dirty="0"/>
-              <a:t>Possible outcomes</a:t>
-            </a:r>
-          </a:p>
-        </p:txBody>
-      </p:sp>
-      <p:graphicFrame>
-        <p:nvGraphicFramePr>
-          <p:cNvPr id="4" name="Content Placeholder 3">
-            <a:extLst>
-              <a:ext uri="{FF2B5EF4-FFF2-40B4-BE49-F238E27FC236}">
-                <a16:creationId xmlns:a16="http://schemas.microsoft.com/office/drawing/2014/main" id="{C5CA10F5-F822-A049-B9F4-6E1274FE4994}"/>
-              </a:ext>
-            </a:extLst>
-          </p:cNvPr>
-          <p:cNvGraphicFramePr>
-            <a:graphicFrameLocks noGrp="1"/>
-          </p:cNvGraphicFramePr>
-          <p:nvPr>
-            <p:ph idx="1"/>
-            <p:extLst>
-              <p:ext uri="{D42A27DB-BD31-4B8C-83A1-F6EECF244321}">
-                <p14:modId xmlns:p14="http://schemas.microsoft.com/office/powerpoint/2010/main" val="4229305324"/>
-              </p:ext>
-            </p:extLst>
-          </p:nvPr>
-        </p:nvGraphicFramePr>
-        <p:xfrm>
-          <a:off x="457200" y="1600200"/>
-          <a:ext cx="8229600" cy="4175760"/>
-        </p:xfrm>
-        <a:graphic>
-          <a:graphicData uri="http://schemas.openxmlformats.org/drawingml/2006/table">
-            <a:tbl>
-              <a:tblPr firstRow="1" firstCol="1" bandRow="1">
-                <a:tableStyleId>{21E4AEA4-8DFA-4A89-87EB-49C32662AFE0}</a:tableStyleId>
-              </a:tblPr>
-              <a:tblGrid>
-                <a:gridCol w="2743200">
-                  <a:extLst>
-                    <a:ext uri="{9D8B030D-6E8A-4147-A177-3AD203B41FA5}">
-                      <a16:colId xmlns:a16="http://schemas.microsoft.com/office/drawing/2014/main" val="506920365"/>
-                    </a:ext>
-                  </a:extLst>
-                </a:gridCol>
-                <a:gridCol w="2743200">
-                  <a:extLst>
-                    <a:ext uri="{9D8B030D-6E8A-4147-A177-3AD203B41FA5}">
-                      <a16:colId xmlns:a16="http://schemas.microsoft.com/office/drawing/2014/main" val="1827387139"/>
-                    </a:ext>
-                  </a:extLst>
-                </a:gridCol>
-                <a:gridCol w="2743200">
-                  <a:extLst>
-                    <a:ext uri="{9D8B030D-6E8A-4147-A177-3AD203B41FA5}">
-                      <a16:colId xmlns:a16="http://schemas.microsoft.com/office/drawing/2014/main" val="3924368828"/>
-                    </a:ext>
-                  </a:extLst>
-                </a:gridCol>
-              </a:tblGrid>
-              <a:tr h="1356360">
-                <a:tc>
-                  <a:txBody>
-                    <a:bodyPr/>
-                    <a:lstStyle/>
-                    <a:p>
-                      <a:endParaRPr lang="en-US" dirty="0"/>
-                    </a:p>
-                  </a:txBody>
-                  <a:tcPr/>
-                </a:tc>
-                <a:tc>
-                  <a:txBody>
-                    <a:bodyPr/>
-                    <a:lstStyle/>
-                    <a:p>
-                      <a:r>
-                        <a:rPr lang="en-US" dirty="0"/>
-                        <a:t>t-test for difference</a:t>
-                      </a:r>
-                    </a:p>
-                    <a:p>
-                      <a:r>
-                        <a:rPr lang="en-US" dirty="0"/>
-                        <a:t>Reject null</a:t>
-                      </a:r>
-                    </a:p>
-                  </a:txBody>
-                  <a:tcPr/>
-                </a:tc>
-                <a:tc>
-                  <a:txBody>
-                    <a:bodyPr/>
-                    <a:lstStyle/>
-                    <a:p>
-                      <a:r>
-                        <a:rPr lang="en-US" dirty="0"/>
-                        <a:t>t-test for difference</a:t>
-                      </a:r>
-                    </a:p>
-                    <a:p>
-                      <a:r>
-                        <a:rPr lang="en-US" dirty="0"/>
-                        <a:t>Fail to Reject null</a:t>
-                      </a:r>
-                    </a:p>
-                  </a:txBody>
-                  <a:tcPr/>
-                </a:tc>
-                <a:extLst>
-                  <a:ext uri="{0D108BD9-81ED-4DB2-BD59-A6C34878D82A}">
-                    <a16:rowId xmlns:a16="http://schemas.microsoft.com/office/drawing/2014/main" val="2097796339"/>
-                  </a:ext>
-                </a:extLst>
-              </a:tr>
-              <a:tr h="1356360">
-                <a:tc>
-                  <a:txBody>
-                    <a:bodyPr/>
-                    <a:lstStyle/>
-                    <a:p>
-                      <a:r>
-                        <a:rPr lang="en-US" dirty="0"/>
-                        <a:t>Two one-sided tests:</a:t>
-                      </a:r>
-                    </a:p>
-                    <a:p>
-                      <a:r>
-                        <a:rPr lang="en-US" dirty="0"/>
-                        <a:t>both tests reject null</a:t>
-                      </a:r>
-                    </a:p>
-                  </a:txBody>
-                  <a:tcPr/>
-                </a:tc>
-                <a:tc>
-                  <a:txBody>
-                    <a:bodyPr/>
-                    <a:lstStyle/>
-                    <a:p>
-                      <a:r>
-                        <a:rPr lang="en-US" b="1" dirty="0"/>
-                        <a:t>Different, but within equivalence bounds. </a:t>
-                      </a:r>
-                      <a:r>
-                        <a:rPr lang="en-US" dirty="0"/>
-                        <a:t>Two groups are different</a:t>
-                      </a:r>
-                    </a:p>
-                    <a:p>
-                      <a:r>
-                        <a:rPr lang="en-US" dirty="0"/>
-                        <a:t>(but not enough to exclude the equivalence bounds)</a:t>
-                      </a:r>
-                    </a:p>
-                  </a:txBody>
-                  <a:tcPr/>
-                </a:tc>
-                <a:tc>
-                  <a:txBody>
-                    <a:bodyPr/>
-                    <a:lstStyle/>
-                    <a:p>
-                      <a:r>
-                        <a:rPr lang="en-US" b="1" dirty="0"/>
-                        <a:t>Equivalent.</a:t>
-                      </a:r>
-                      <a:r>
-                        <a:rPr lang="en-US" dirty="0"/>
-                        <a:t> Two groups are equivalent. (</a:t>
-                      </a:r>
-                      <a:r>
-                        <a:rPr lang="en-US" i="1" dirty="0"/>
-                        <a:t>and</a:t>
-                      </a:r>
-                      <a:r>
-                        <a:rPr lang="en-US" dirty="0"/>
-                        <a:t> not different).</a:t>
-                      </a:r>
-                    </a:p>
-                  </a:txBody>
-                  <a:tcPr/>
-                </a:tc>
-                <a:extLst>
-                  <a:ext uri="{0D108BD9-81ED-4DB2-BD59-A6C34878D82A}">
-                    <a16:rowId xmlns:a16="http://schemas.microsoft.com/office/drawing/2014/main" val="1351486283"/>
-                  </a:ext>
-                </a:extLst>
-              </a:tr>
-              <a:tr h="1356360">
-                <a:tc>
-                  <a:txBody>
-                    <a:bodyPr/>
-                    <a:lstStyle/>
-                    <a:p>
-                      <a:r>
-                        <a:rPr lang="en-US" dirty="0"/>
-                        <a:t>Two one-sided tests</a:t>
-                      </a:r>
-                    </a:p>
-                    <a:p>
-                      <a:r>
-                        <a:rPr lang="en-US" dirty="0"/>
-                        <a:t>either test Fails To Reject</a:t>
-                      </a:r>
-                    </a:p>
-                  </a:txBody>
-                  <a:tcPr/>
-                </a:tc>
-                <a:tc>
-                  <a:txBody>
-                    <a:bodyPr/>
-                    <a:lstStyle/>
-                    <a:p>
-                      <a:r>
-                        <a:rPr lang="en-US" b="1" dirty="0"/>
-                        <a:t>Different and exceeding equivalence bounds.</a:t>
-                      </a:r>
-                    </a:p>
-                  </a:txBody>
-                  <a:tcPr/>
-                </a:tc>
-                <a:tc>
-                  <a:txBody>
-                    <a:bodyPr/>
-                    <a:lstStyle/>
-                    <a:p>
-                      <a:r>
-                        <a:rPr lang="en-US" b="1" dirty="0"/>
-                        <a:t>Inconclusive. </a:t>
-                      </a:r>
-                      <a:r>
-                        <a:rPr lang="en-US" dirty="0"/>
-                        <a:t>There is not enough statistical evidence to determine difference or equivalence.</a:t>
-                      </a:r>
-                    </a:p>
-                  </a:txBody>
-                  <a:tcPr/>
-                </a:tc>
-                <a:extLst>
-                  <a:ext uri="{0D108BD9-81ED-4DB2-BD59-A6C34878D82A}">
-                    <a16:rowId xmlns:a16="http://schemas.microsoft.com/office/drawing/2014/main" val="4076205216"/>
-                  </a:ext>
-                </a:extLst>
-              </a:tr>
-            </a:tbl>
-          </a:graphicData>
-        </a:graphic>
-      </p:graphicFrame>
-      <p:sp>
-        <p:nvSpPr>
-          <p:cNvPr id="5" name="Slide Number Placeholder 4">
-            <a:extLst>
-              <a:ext uri="{FF2B5EF4-FFF2-40B4-BE49-F238E27FC236}">
-                <a16:creationId xmlns:a16="http://schemas.microsoft.com/office/drawing/2014/main" id="{B59172E5-943E-8B4E-9B59-EF261015205F}"/>
-              </a:ext>
-            </a:extLst>
-          </p:cNvPr>
-          <p:cNvSpPr>
-            <a:spLocks noGrp="1"/>
-          </p:cNvSpPr>
-          <p:nvPr>
-            <p:ph type="sldNum" sz="quarter" idx="12"/>
-          </p:nvPr>
-        </p:nvSpPr>
-        <p:spPr/>
-        <p:txBody>
-          <a:bodyPr/>
-          <a:lstStyle/>
-          <a:p>
-            <a:fld id="{C5EF2332-01BF-834F-8236-50238282D533}" type="slidenum">
-              <a:rPr lang="en-US" smtClean="0"/>
               <a:t>9</a:t>
             </a:fld>
             <a:endParaRPr lang="en-US"/>
@@ -8269,11 +9243,6 @@
         </p:txBody>
       </p:sp>
     </p:spTree>
-    <p:extLst>
-      <p:ext uri="{BB962C8B-B14F-4D97-AF65-F5344CB8AC3E}">
-        <p14:creationId xmlns:p14="http://schemas.microsoft.com/office/powerpoint/2010/main" val="714221789"/>
-      </p:ext>
-    </p:extLst>
   </p:cSld>
   <p:clrMapOvr>
     <a:masterClrMapping/>

</xml_diff>